<commit_message>
add sequence analysis into suvey slides
</commit_message>
<xml_diff>
--- a/slide/tsdm.pptx
+++ b/slide/tsdm.pptx
@@ -42,6 +42,10 @@
     <p:sldId id="268" r:id="rId36"/>
     <p:sldId id="269" r:id="rId37"/>
     <p:sldId id="270" r:id="rId38"/>
+    <p:sldId id="313" r:id="rId39"/>
+    <p:sldId id="314" r:id="rId40"/>
+    <p:sldId id="315" r:id="rId41"/>
+    <p:sldId id="316" r:id="rId42"/>
   </p:sldIdLst>
   <p:sldSz cx="12192000" cy="6858000"/>
   <p:notesSz cx="6858000" cy="9144000"/>
@@ -142,7 +146,7 @@
   </p:defaultTextStyle>
   <p:extLst>
     <p:ext uri="{EFAFB233-063F-42B5-8137-9DF3F51BA10A}">
-      <p15:sldGuideLst xmlns:p15="http://schemas.microsoft.com/office/powerpoint/2012/main" xmlns=""/>
+      <p15:sldGuideLst xmlns="" xmlns:p15="http://schemas.microsoft.com/office/powerpoint/2012/main"/>
     </p:ext>
   </p:extLst>
 </p:presentation>
@@ -336,7 +340,7 @@
           <a:p>
             <a:fld id="{F77B2EB1-EA88-4503-95EA-93923E5BA59E}" type="datetimeFigureOut">
               <a:rPr lang="en-US" smtClean="0"/>
-              <a:t>2/27/2013</a:t>
+              <a:t>2/28/2013</a:t>
             </a:fld>
             <a:endParaRPr lang="en-US"/>
           </a:p>
@@ -674,7 +678,7 @@
           <a:p>
             <a:fld id="{F77B2EB1-EA88-4503-95EA-93923E5BA59E}" type="datetimeFigureOut">
               <a:rPr lang="en-US" smtClean="0"/>
-              <a:t>2/27/2013</a:t>
+              <a:t>2/28/2013</a:t>
             </a:fld>
             <a:endParaRPr lang="en-US"/>
           </a:p>
@@ -1075,7 +1079,7 @@
           <a:p>
             <a:fld id="{F77B2EB1-EA88-4503-95EA-93923E5BA59E}" type="datetimeFigureOut">
               <a:rPr lang="en-US" smtClean="0"/>
-              <a:t>2/27/2013</a:t>
+              <a:t>2/28/2013</a:t>
             </a:fld>
             <a:endParaRPr lang="en-US"/>
           </a:p>
@@ -1411,7 +1415,7 @@
           <a:p>
             <a:fld id="{F77B2EB1-EA88-4503-95EA-93923E5BA59E}" type="datetimeFigureOut">
               <a:rPr lang="en-US" smtClean="0"/>
-              <a:t>2/27/2013</a:t>
+              <a:t>2/28/2013</a:t>
             </a:fld>
             <a:endParaRPr lang="en-US"/>
           </a:p>
@@ -1731,7 +1735,7 @@
           <a:p>
             <a:fld id="{F77B2EB1-EA88-4503-95EA-93923E5BA59E}" type="datetimeFigureOut">
               <a:rPr lang="en-US" smtClean="0"/>
-              <a:t>2/27/2013</a:t>
+              <a:t>2/28/2013</a:t>
             </a:fld>
             <a:endParaRPr lang="en-US"/>
           </a:p>
@@ -2127,7 +2131,7 @@
           <a:p>
             <a:fld id="{F77B2EB1-EA88-4503-95EA-93923E5BA59E}" type="datetimeFigureOut">
               <a:rPr lang="en-US" smtClean="0"/>
-              <a:t>2/27/2013</a:t>
+              <a:t>2/28/2013</a:t>
             </a:fld>
             <a:endParaRPr lang="en-US"/>
           </a:p>
@@ -2384,7 +2388,7 @@
           <a:p>
             <a:fld id="{F77B2EB1-EA88-4503-95EA-93923E5BA59E}" type="datetimeFigureOut">
               <a:rPr lang="en-US" smtClean="0"/>
-              <a:t>2/27/2013</a:t>
+              <a:t>2/28/2013</a:t>
             </a:fld>
             <a:endParaRPr lang="en-US"/>
           </a:p>
@@ -2646,7 +2650,7 @@
           <a:p>
             <a:fld id="{F77B2EB1-EA88-4503-95EA-93923E5BA59E}" type="datetimeFigureOut">
               <a:rPr lang="en-US" smtClean="0"/>
-              <a:t>2/27/2013</a:t>
+              <a:t>2/28/2013</a:t>
             </a:fld>
             <a:endParaRPr lang="en-US"/>
           </a:p>
@@ -2908,7 +2912,7 @@
           <a:p>
             <a:fld id="{F77B2EB1-EA88-4503-95EA-93923E5BA59E}" type="datetimeFigureOut">
               <a:rPr lang="en-US" smtClean="0"/>
-              <a:t>2/27/2013</a:t>
+              <a:t>2/28/2013</a:t>
             </a:fld>
             <a:endParaRPr lang="en-US"/>
           </a:p>
@@ -3237,7 +3241,7 @@
           <a:p>
             <a:fld id="{F77B2EB1-EA88-4503-95EA-93923E5BA59E}" type="datetimeFigureOut">
               <a:rPr lang="en-US" smtClean="0"/>
-              <a:t>2/27/2013</a:t>
+              <a:t>2/28/2013</a:t>
             </a:fld>
             <a:endParaRPr lang="en-US"/>
           </a:p>
@@ -3560,7 +3564,7 @@
           <a:p>
             <a:fld id="{F77B2EB1-EA88-4503-95EA-93923E5BA59E}" type="datetimeFigureOut">
               <a:rPr lang="en-US" smtClean="0"/>
-              <a:t>2/27/2013</a:t>
+              <a:t>2/28/2013</a:t>
             </a:fld>
             <a:endParaRPr lang="en-US"/>
           </a:p>
@@ -4017,7 +4021,7 @@
           <a:p>
             <a:fld id="{F77B2EB1-EA88-4503-95EA-93923E5BA59E}" type="datetimeFigureOut">
               <a:rPr lang="en-US" smtClean="0"/>
-              <a:t>2/27/2013</a:t>
+              <a:t>2/28/2013</a:t>
             </a:fld>
             <a:endParaRPr lang="en-US"/>
           </a:p>
@@ -4222,7 +4226,7 @@
           <a:p>
             <a:fld id="{F77B2EB1-EA88-4503-95EA-93923E5BA59E}" type="datetimeFigureOut">
               <a:rPr lang="en-US" smtClean="0"/>
-              <a:t>2/27/2013</a:t>
+              <a:t>2/28/2013</a:t>
             </a:fld>
             <a:endParaRPr lang="en-US"/>
           </a:p>
@@ -4399,7 +4403,7 @@
           <a:p>
             <a:fld id="{F77B2EB1-EA88-4503-95EA-93923E5BA59E}" type="datetimeFigureOut">
               <a:rPr lang="en-US" smtClean="0"/>
-              <a:t>2/27/2013</a:t>
+              <a:t>2/28/2013</a:t>
             </a:fld>
             <a:endParaRPr lang="en-US"/>
           </a:p>
@@ -4732,7 +4736,7 @@
           <a:p>
             <a:fld id="{F77B2EB1-EA88-4503-95EA-93923E5BA59E}" type="datetimeFigureOut">
               <a:rPr lang="en-US" smtClean="0"/>
-              <a:t>2/27/2013</a:t>
+              <a:t>2/28/2013</a:t>
             </a:fld>
             <a:endParaRPr lang="en-US"/>
           </a:p>
@@ -5077,7 +5081,7 @@
           <a:p>
             <a:fld id="{F77B2EB1-EA88-4503-95EA-93923E5BA59E}" type="datetimeFigureOut">
               <a:rPr lang="en-US" smtClean="0"/>
-              <a:t>2/27/2013</a:t>
+              <a:t>2/28/2013</a:t>
             </a:fld>
             <a:endParaRPr lang="en-US"/>
           </a:p>
@@ -7194,7 +7198,7 @@
           <a:p>
             <a:fld id="{F77B2EB1-EA88-4503-95EA-93923E5BA59E}" type="datetimeFigureOut">
               <a:rPr lang="en-US" smtClean="0"/>
-              <a:t>2/27/2013</a:t>
+              <a:t>2/28/2013</a:t>
             </a:fld>
             <a:endParaRPr lang="en-US"/>
           </a:p>
@@ -26192,6 +26196,929 @@
 </p:sld>
 </file>
 
+<file path=ppt/slides/slide38.xml><?xml version="1.0" encoding="utf-8"?>
+<p:sld xmlns:a="http://schemas.openxmlformats.org/drawingml/2006/main" xmlns:r="http://schemas.openxmlformats.org/officeDocument/2006/relationships" xmlns:p="http://schemas.openxmlformats.org/presentationml/2006/main">
+  <p:cSld>
+    <p:spTree>
+      <p:nvGrpSpPr>
+        <p:cNvPr id="1" name=""/>
+        <p:cNvGrpSpPr/>
+        <p:nvPr/>
+      </p:nvGrpSpPr>
+      <p:grpSpPr>
+        <a:xfrm>
+          <a:off x="0" y="0"/>
+          <a:ext cx="0" cy="0"/>
+          <a:chOff x="0" y="0"/>
+          <a:chExt cx="0" cy="0"/>
+        </a:xfrm>
+      </p:grpSpPr>
+      <p:sp>
+        <p:nvSpPr>
+          <p:cNvPr id="2" name="标题 1"/>
+          <p:cNvSpPr>
+            <a:spLocks noGrp="1"/>
+          </p:cNvSpPr>
+          <p:nvPr>
+            <p:ph type="title"/>
+          </p:nvPr>
+        </p:nvSpPr>
+        <p:spPr/>
+        <p:txBody>
+          <a:bodyPr/>
+          <a:lstStyle/>
+          <a:p>
+            <a:pPr algn="ctr"/>
+            <a:r>
+              <a:rPr lang="en-US" altLang="zh-CN" dirty="0"/>
+              <a:t> Sequence </a:t>
+            </a:r>
+            <a:r>
+              <a:rPr lang="en-US" altLang="zh-CN" dirty="0" smtClean="0"/>
+              <a:t>Analysis</a:t>
+            </a:r>
+            <a:endParaRPr lang="zh-CN" altLang="en-US" dirty="0"/>
+          </a:p>
+        </p:txBody>
+      </p:sp>
+      <p:sp>
+        <p:nvSpPr>
+          <p:cNvPr id="3" name="内容占位符 2"/>
+          <p:cNvSpPr>
+            <a:spLocks noGrp="1"/>
+          </p:cNvSpPr>
+          <p:nvPr>
+            <p:ph idx="1"/>
+          </p:nvPr>
+        </p:nvSpPr>
+        <p:spPr/>
+        <p:txBody>
+          <a:bodyPr/>
+          <a:lstStyle/>
+          <a:p>
+            <a:r>
+              <a:rPr lang="en-US" altLang="zh-CN" dirty="0" smtClean="0"/>
+              <a:t>Subsequence Matching</a:t>
+            </a:r>
+          </a:p>
+          <a:p>
+            <a:r>
+              <a:rPr lang="en-US" altLang="zh-CN" dirty="0"/>
+              <a:t>F</a:t>
+            </a:r>
+            <a:r>
+              <a:rPr lang="en-US" altLang="zh-CN" dirty="0" smtClean="0"/>
+              <a:t>requent </a:t>
+            </a:r>
+            <a:r>
+              <a:rPr lang="en-US" altLang="zh-CN" dirty="0"/>
+              <a:t>subsequence </a:t>
+            </a:r>
+            <a:r>
+              <a:rPr lang="en-US" altLang="zh-CN" dirty="0" smtClean="0"/>
+              <a:t>mining</a:t>
+            </a:r>
+          </a:p>
+          <a:p>
+            <a:r>
+              <a:rPr lang="en-US" altLang="zh-CN" dirty="0" smtClean="0"/>
+              <a:t>Sequence Prediction</a:t>
+            </a:r>
+          </a:p>
+          <a:p>
+            <a:r>
+              <a:rPr lang="en-US" altLang="zh-CN" dirty="0" smtClean="0"/>
+              <a:t>Bioinformatics Sequence Analysis</a:t>
+            </a:r>
+          </a:p>
+          <a:p>
+            <a:pPr lvl="1"/>
+            <a:r>
+              <a:rPr lang="en-US" altLang="zh-CN" dirty="0"/>
+              <a:t>DNA sequence </a:t>
+            </a:r>
+            <a:r>
+              <a:rPr lang="en-US" altLang="zh-CN" dirty="0" smtClean="0"/>
+              <a:t>alignment</a:t>
+            </a:r>
+          </a:p>
+          <a:p>
+            <a:pPr lvl="1"/>
+            <a:r>
+              <a:rPr lang="en-US" altLang="zh-CN" dirty="0"/>
+              <a:t>M</a:t>
+            </a:r>
+            <a:r>
+              <a:rPr lang="en-US" altLang="zh-CN" dirty="0" smtClean="0"/>
+              <a:t>otif discovery</a:t>
+            </a:r>
+          </a:p>
+          <a:p>
+            <a:pPr lvl="1"/>
+            <a:r>
+              <a:rPr lang="en-US" altLang="zh-CN" dirty="0"/>
+              <a:t>S</a:t>
+            </a:r>
+            <a:r>
+              <a:rPr lang="en-US" altLang="zh-CN" dirty="0" smtClean="0"/>
+              <a:t>equence </a:t>
+            </a:r>
+            <a:r>
+              <a:rPr lang="en-US" altLang="zh-CN" dirty="0"/>
+              <a:t>classification</a:t>
+            </a:r>
+            <a:endParaRPr lang="en-US" altLang="zh-CN" dirty="0" smtClean="0"/>
+          </a:p>
+          <a:p>
+            <a:endParaRPr lang="zh-CN" altLang="en-US" dirty="0"/>
+          </a:p>
+        </p:txBody>
+      </p:sp>
+    </p:spTree>
+    <p:extLst>
+      <p:ext uri="{BB962C8B-B14F-4D97-AF65-F5344CB8AC3E}">
+        <p14:creationId xmlns:p14="http://schemas.microsoft.com/office/powerpoint/2010/main" val="1890565880"/>
+      </p:ext>
+    </p:extLst>
+  </p:cSld>
+  <p:clrMapOvr>
+    <a:masterClrMapping/>
+  </p:clrMapOvr>
+  <p:timing>
+    <p:tnLst>
+      <p:par>
+        <p:cTn id="1" dur="indefinite" restart="never" nodeType="tmRoot"/>
+      </p:par>
+    </p:tnLst>
+  </p:timing>
+</p:sld>
+</file>
+
+<file path=ppt/slides/slide39.xml><?xml version="1.0" encoding="utf-8"?>
+<p:sld xmlns:a="http://schemas.openxmlformats.org/drawingml/2006/main" xmlns:r="http://schemas.openxmlformats.org/officeDocument/2006/relationships" xmlns:p="http://schemas.openxmlformats.org/presentationml/2006/main">
+  <p:cSld>
+    <p:spTree>
+      <p:nvGrpSpPr>
+        <p:cNvPr id="1" name=""/>
+        <p:cNvGrpSpPr/>
+        <p:nvPr/>
+      </p:nvGrpSpPr>
+      <p:grpSpPr>
+        <a:xfrm>
+          <a:off x="0" y="0"/>
+          <a:ext cx="0" cy="0"/>
+          <a:chOff x="0" y="0"/>
+          <a:chExt cx="0" cy="0"/>
+        </a:xfrm>
+      </p:grpSpPr>
+      <p:sp>
+        <p:nvSpPr>
+          <p:cNvPr id="2" name="标题 1"/>
+          <p:cNvSpPr>
+            <a:spLocks noGrp="1"/>
+          </p:cNvSpPr>
+          <p:nvPr>
+            <p:ph type="title"/>
+          </p:nvPr>
+        </p:nvSpPr>
+        <p:spPr/>
+        <p:txBody>
+          <a:bodyPr/>
+          <a:lstStyle/>
+          <a:p>
+            <a:pPr algn="ctr"/>
+            <a:r>
+              <a:rPr lang="en-US" altLang="zh-CN" dirty="0" smtClean="0"/>
+              <a:t>	Frequent </a:t>
+            </a:r>
+            <a:r>
+              <a:rPr lang="en-US" altLang="zh-CN" dirty="0"/>
+              <a:t>subsequence mining</a:t>
+            </a:r>
+            <a:br>
+              <a:rPr lang="en-US" altLang="zh-CN" dirty="0"/>
+            </a:br>
+            <a:endParaRPr lang="zh-CN" altLang="en-US" dirty="0"/>
+          </a:p>
+        </p:txBody>
+      </p:sp>
+      <p:graphicFrame>
+        <p:nvGraphicFramePr>
+          <p:cNvPr id="4" name="内容占位符 3"/>
+          <p:cNvGraphicFramePr>
+            <a:graphicFrameLocks noGrp="1" noChangeAspect="1"/>
+          </p:cNvGraphicFramePr>
+          <p:nvPr>
+            <p:ph idx="1"/>
+            <p:extLst>
+              <p:ext uri="{D42A27DB-BD31-4B8C-83A1-F6EECF244321}">
+                <p14:modId xmlns:p14="http://schemas.microsoft.com/office/powerpoint/2010/main" val="4081073455"/>
+              </p:ext>
+            </p:extLst>
+          </p:nvPr>
+        </p:nvGraphicFramePr>
+        <p:xfrm>
+          <a:off x="1319089" y="1567324"/>
+          <a:ext cx="4020772" cy="2196151"/>
+        </p:xfrm>
+        <a:graphic>
+          <a:graphicData uri="http://schemas.openxmlformats.org/presentationml/2006/ole">
+            <mc:AlternateContent xmlns:mc="http://schemas.openxmlformats.org/markup-compatibility/2006">
+              <mc:Choice xmlns:v="urn:schemas-microsoft-com:vml" Requires="v">
+                <p:oleObj spid="_x0000_s1040" name="點陣圖影像" r:id="rId3" imgW="4638095" imgH="2534004" progId="PBrush">
+                  <p:embed/>
+                </p:oleObj>
+              </mc:Choice>
+              <mc:Fallback>
+                <p:oleObj name="點陣圖影像" r:id="rId3" imgW="4638095" imgH="2534004" progId="PBrush">
+                  <p:embed/>
+                  <p:pic>
+                    <p:nvPicPr>
+                      <p:cNvPr id="0" name="Object 1028"/>
+                      <p:cNvPicPr>
+                        <a:picLocks noChangeAspect="1" noChangeArrowheads="1"/>
+                      </p:cNvPicPr>
+                      <p:nvPr/>
+                    </p:nvPicPr>
+                    <p:blipFill>
+                      <a:blip r:embed="rId4">
+                        <a:extLst>
+                          <a:ext uri="{28A0092B-C50C-407E-A947-70E740481C1C}">
+                            <a14:useLocalDpi xmlns:a14="http://schemas.microsoft.com/office/drawing/2010/main" val="0"/>
+                          </a:ext>
+                        </a:extLst>
+                      </a:blip>
+                      <a:srcRect/>
+                      <a:stretch>
+                        <a:fillRect/>
+                      </a:stretch>
+                    </p:blipFill>
+                    <p:spPr bwMode="auto">
+                      <a:xfrm>
+                        <a:off x="1319089" y="1567324"/>
+                        <a:ext cx="4020772" cy="2196151"/>
+                      </a:xfrm>
+                      <a:prstGeom prst="rect">
+                        <a:avLst/>
+                      </a:prstGeom>
+                      <a:noFill/>
+                      <a:ln>
+                        <a:noFill/>
+                      </a:ln>
+                      <a:effectLst/>
+                    </p:spPr>
+                  </p:pic>
+                </p:oleObj>
+              </mc:Fallback>
+            </mc:AlternateContent>
+          </a:graphicData>
+        </a:graphic>
+      </p:graphicFrame>
+      <p:graphicFrame>
+        <p:nvGraphicFramePr>
+          <p:cNvPr id="5" name="对象 4"/>
+          <p:cNvGraphicFramePr>
+            <a:graphicFrameLocks noChangeAspect="1"/>
+          </p:cNvGraphicFramePr>
+          <p:nvPr>
+            <p:extLst>
+              <p:ext uri="{D42A27DB-BD31-4B8C-83A1-F6EECF244321}">
+                <p14:modId xmlns:p14="http://schemas.microsoft.com/office/powerpoint/2010/main" val="1469899958"/>
+              </p:ext>
+            </p:extLst>
+          </p:nvPr>
+        </p:nvGraphicFramePr>
+        <p:xfrm>
+          <a:off x="7631722" y="1785115"/>
+          <a:ext cx="3511062" cy="1397821"/>
+        </p:xfrm>
+        <a:graphic>
+          <a:graphicData uri="http://schemas.openxmlformats.org/presentationml/2006/ole">
+            <mc:AlternateContent xmlns:mc="http://schemas.openxmlformats.org/markup-compatibility/2006">
+              <mc:Choice xmlns:v="urn:schemas-microsoft-com:vml" Requires="v">
+                <p:oleObj spid="_x0000_s1041" name="BMP 图像" r:id="rId5" imgW="4381560" imgH="1305000" progId="Paint.Picture">
+                  <p:embed/>
+                </p:oleObj>
+              </mc:Choice>
+              <mc:Fallback>
+                <p:oleObj name="BMP 图像" r:id="rId5" imgW="4381560" imgH="1305000" progId="Paint.Picture">
+                  <p:embed/>
+                  <p:pic>
+                    <p:nvPicPr>
+                      <p:cNvPr id="0" name="Object 1030"/>
+                      <p:cNvPicPr>
+                        <a:picLocks noChangeAspect="1" noChangeArrowheads="1"/>
+                      </p:cNvPicPr>
+                      <p:nvPr/>
+                    </p:nvPicPr>
+                    <p:blipFill>
+                      <a:blip r:embed="rId6"/>
+                      <a:srcRect/>
+                      <a:stretch>
+                        <a:fillRect/>
+                      </a:stretch>
+                    </p:blipFill>
+                    <p:spPr bwMode="auto">
+                      <a:xfrm>
+                        <a:off x="7631722" y="1785115"/>
+                        <a:ext cx="3511062" cy="1397821"/>
+                      </a:xfrm>
+                      <a:prstGeom prst="rect">
+                        <a:avLst/>
+                      </a:prstGeom>
+                      <a:noFill/>
+                      <a:ln>
+                        <a:noFill/>
+                      </a:ln>
+                      <a:effectLst/>
+                    </p:spPr>
+                  </p:pic>
+                </p:oleObj>
+              </mc:Fallback>
+            </mc:AlternateContent>
+          </a:graphicData>
+        </a:graphic>
+      </p:graphicFrame>
+      <p:sp>
+        <p:nvSpPr>
+          <p:cNvPr id="6" name="右箭头 5"/>
+          <p:cNvSpPr/>
+          <p:nvPr/>
+        </p:nvSpPr>
+        <p:spPr>
+          <a:xfrm>
+            <a:off x="5621213" y="2387448"/>
+            <a:ext cx="1881553" cy="484632"/>
+          </a:xfrm>
+          <a:prstGeom prst="rightArrow">
+            <a:avLst/>
+          </a:prstGeom>
+        </p:spPr>
+        <p:style>
+          <a:lnRef idx="2">
+            <a:schemeClr val="accent1">
+              <a:shade val="50000"/>
+            </a:schemeClr>
+          </a:lnRef>
+          <a:fillRef idx="1">
+            <a:schemeClr val="accent1"/>
+          </a:fillRef>
+          <a:effectRef idx="0">
+            <a:schemeClr val="accent1"/>
+          </a:effectRef>
+          <a:fontRef idx="minor">
+            <a:schemeClr val="lt1"/>
+          </a:fontRef>
+        </p:style>
+        <p:txBody>
+          <a:bodyPr rtlCol="0" anchor="ctr"/>
+          <a:lstStyle/>
+          <a:p>
+            <a:pPr algn="ctr"/>
+            <a:endParaRPr lang="zh-CN" altLang="en-US"/>
+          </a:p>
+        </p:txBody>
+      </p:sp>
+      <p:sp>
+        <p:nvSpPr>
+          <p:cNvPr id="8" name="TextBox 7"/>
+          <p:cNvSpPr txBox="1"/>
+          <p:nvPr/>
+        </p:nvSpPr>
+        <p:spPr>
+          <a:xfrm>
+            <a:off x="5621214" y="1802673"/>
+            <a:ext cx="1749669" cy="584775"/>
+          </a:xfrm>
+          <a:prstGeom prst="rect">
+            <a:avLst/>
+          </a:prstGeom>
+          <a:noFill/>
+        </p:spPr>
+        <p:txBody>
+          <a:bodyPr wrap="square" rtlCol="0">
+            <a:spAutoFit/>
+          </a:bodyPr>
+          <a:lstStyle/>
+          <a:p>
+            <a:r>
+              <a:rPr lang="en-US" altLang="zh-CN" sz="1600" dirty="0" smtClean="0"/>
+              <a:t>Sequence</a:t>
+            </a:r>
+          </a:p>
+          <a:p>
+            <a:r>
+              <a:rPr lang="en-US" altLang="zh-CN" sz="1600" dirty="0" smtClean="0"/>
+              <a:t>representation</a:t>
+            </a:r>
+            <a:endParaRPr lang="zh-CN" altLang="en-US" sz="1600" dirty="0"/>
+          </a:p>
+        </p:txBody>
+      </p:sp>
+      <p:sp>
+        <p:nvSpPr>
+          <p:cNvPr id="9" name="Rectangle 6"/>
+          <p:cNvSpPr txBox="1">
+            <a:spLocks noChangeArrowheads="1"/>
+          </p:cNvSpPr>
+          <p:nvPr/>
+        </p:nvSpPr>
+        <p:spPr>
+          <a:xfrm>
+            <a:off x="3700094" y="3974123"/>
+            <a:ext cx="5591907" cy="2201252"/>
+          </a:xfrm>
+          <a:prstGeom prst="rect">
+            <a:avLst/>
+          </a:prstGeom>
+        </p:spPr>
+        <p:txBody>
+          <a:bodyPr vert="horz" lIns="91440" tIns="45720" rIns="91440" bIns="45720" rtlCol="0">
+            <a:normAutofit/>
+          </a:bodyPr>
+          <a:lstStyle>
+            <a:lvl1pPr marL="342900" indent="-342900" algn="l" defTabSz="457200" rtl="0" eaLnBrk="1" latinLnBrk="0" hangingPunct="1">
+              <a:spcBef>
+                <a:spcPts val="1000"/>
+              </a:spcBef>
+              <a:spcAft>
+                <a:spcPts val="0"/>
+              </a:spcAft>
+              <a:buClr>
+                <a:schemeClr val="accent1"/>
+              </a:buClr>
+              <a:buFont typeface="Wingdings 3" charset="2"/>
+              <a:buChar char=""/>
+              <a:defRPr sz="1800" kern="1200">
+                <a:solidFill>
+                  <a:schemeClr val="tx1">
+                    <a:lumMod val="75000"/>
+                    <a:lumOff val="25000"/>
+                  </a:schemeClr>
+                </a:solidFill>
+                <a:latin typeface="+mn-lt"/>
+                <a:ea typeface="+mn-ea"/>
+                <a:cs typeface="+mn-cs"/>
+              </a:defRPr>
+            </a:lvl1pPr>
+            <a:lvl2pPr marL="742950" indent="-285750" algn="l" defTabSz="457200" rtl="0" eaLnBrk="1" latinLnBrk="0" hangingPunct="1">
+              <a:spcBef>
+                <a:spcPts val="1000"/>
+              </a:spcBef>
+              <a:spcAft>
+                <a:spcPts val="0"/>
+              </a:spcAft>
+              <a:buClr>
+                <a:schemeClr val="accent1"/>
+              </a:buClr>
+              <a:buFont typeface="Wingdings 3" charset="2"/>
+              <a:buChar char=""/>
+              <a:defRPr sz="1600" kern="1200">
+                <a:solidFill>
+                  <a:schemeClr val="tx1">
+                    <a:lumMod val="75000"/>
+                    <a:lumOff val="25000"/>
+                  </a:schemeClr>
+                </a:solidFill>
+                <a:latin typeface="+mn-lt"/>
+                <a:ea typeface="+mn-ea"/>
+                <a:cs typeface="+mn-cs"/>
+              </a:defRPr>
+            </a:lvl2pPr>
+            <a:lvl3pPr marL="1143000" indent="-228600" algn="l" defTabSz="457200" rtl="0" eaLnBrk="1" latinLnBrk="0" hangingPunct="1">
+              <a:spcBef>
+                <a:spcPts val="1000"/>
+              </a:spcBef>
+              <a:spcAft>
+                <a:spcPts val="0"/>
+              </a:spcAft>
+              <a:buClr>
+                <a:schemeClr val="accent1"/>
+              </a:buClr>
+              <a:buFont typeface="Wingdings 3" charset="2"/>
+              <a:buChar char=""/>
+              <a:defRPr sz="1400" kern="1200">
+                <a:solidFill>
+                  <a:schemeClr val="tx1">
+                    <a:lumMod val="75000"/>
+                    <a:lumOff val="25000"/>
+                  </a:schemeClr>
+                </a:solidFill>
+                <a:latin typeface="+mn-lt"/>
+                <a:ea typeface="+mn-ea"/>
+                <a:cs typeface="+mn-cs"/>
+              </a:defRPr>
+            </a:lvl3pPr>
+            <a:lvl4pPr marL="1600200" indent="-228600" algn="l" defTabSz="457200" rtl="0" eaLnBrk="1" latinLnBrk="0" hangingPunct="1">
+              <a:spcBef>
+                <a:spcPts val="1000"/>
+              </a:spcBef>
+              <a:spcAft>
+                <a:spcPts val="0"/>
+              </a:spcAft>
+              <a:buClr>
+                <a:schemeClr val="accent1"/>
+              </a:buClr>
+              <a:buFont typeface="Wingdings 3" charset="2"/>
+              <a:buChar char=""/>
+              <a:defRPr sz="1200" kern="1200">
+                <a:solidFill>
+                  <a:schemeClr val="tx1">
+                    <a:lumMod val="75000"/>
+                    <a:lumOff val="25000"/>
+                  </a:schemeClr>
+                </a:solidFill>
+                <a:latin typeface="+mn-lt"/>
+                <a:ea typeface="+mn-ea"/>
+                <a:cs typeface="+mn-cs"/>
+              </a:defRPr>
+            </a:lvl4pPr>
+            <a:lvl5pPr marL="2057400" indent="-228600" algn="l" defTabSz="457200" rtl="0" eaLnBrk="1" latinLnBrk="0" hangingPunct="1">
+              <a:spcBef>
+                <a:spcPts val="1000"/>
+              </a:spcBef>
+              <a:spcAft>
+                <a:spcPts val="0"/>
+              </a:spcAft>
+              <a:buClr>
+                <a:schemeClr val="accent1"/>
+              </a:buClr>
+              <a:buFont typeface="Wingdings 3" charset="2"/>
+              <a:buChar char=""/>
+              <a:defRPr sz="1200" kern="1200">
+                <a:solidFill>
+                  <a:schemeClr val="tx1">
+                    <a:lumMod val="75000"/>
+                    <a:lumOff val="25000"/>
+                  </a:schemeClr>
+                </a:solidFill>
+                <a:latin typeface="+mn-lt"/>
+                <a:ea typeface="+mn-ea"/>
+                <a:cs typeface="+mn-cs"/>
+              </a:defRPr>
+            </a:lvl5pPr>
+            <a:lvl6pPr marL="2514600" indent="-228600" algn="l" defTabSz="457200" rtl="0" eaLnBrk="1" latinLnBrk="0" hangingPunct="1">
+              <a:spcBef>
+                <a:spcPts val="1000"/>
+              </a:spcBef>
+              <a:spcAft>
+                <a:spcPts val="0"/>
+              </a:spcAft>
+              <a:buClr>
+                <a:schemeClr val="accent1"/>
+              </a:buClr>
+              <a:buFont typeface="Wingdings 3" charset="2"/>
+              <a:buChar char=""/>
+              <a:defRPr sz="1200" kern="1200">
+                <a:solidFill>
+                  <a:schemeClr val="tx1">
+                    <a:lumMod val="75000"/>
+                    <a:lumOff val="25000"/>
+                  </a:schemeClr>
+                </a:solidFill>
+                <a:latin typeface="+mn-lt"/>
+                <a:ea typeface="+mn-ea"/>
+                <a:cs typeface="+mn-cs"/>
+              </a:defRPr>
+            </a:lvl6pPr>
+            <a:lvl7pPr marL="2971800" indent="-228600" algn="l" defTabSz="457200" rtl="0" eaLnBrk="1" latinLnBrk="0" hangingPunct="1">
+              <a:spcBef>
+                <a:spcPts val="1000"/>
+              </a:spcBef>
+              <a:spcAft>
+                <a:spcPts val="0"/>
+              </a:spcAft>
+              <a:buClr>
+                <a:schemeClr val="accent1"/>
+              </a:buClr>
+              <a:buFont typeface="Wingdings 3" charset="2"/>
+              <a:buChar char=""/>
+              <a:defRPr sz="1200" kern="1200">
+                <a:solidFill>
+                  <a:schemeClr val="tx1">
+                    <a:lumMod val="75000"/>
+                    <a:lumOff val="25000"/>
+                  </a:schemeClr>
+                </a:solidFill>
+                <a:latin typeface="+mn-lt"/>
+                <a:ea typeface="+mn-ea"/>
+                <a:cs typeface="+mn-cs"/>
+              </a:defRPr>
+            </a:lvl7pPr>
+            <a:lvl8pPr marL="3429000" indent="-228600" algn="l" defTabSz="457200" rtl="0" eaLnBrk="1" latinLnBrk="0" hangingPunct="1">
+              <a:spcBef>
+                <a:spcPts val="1000"/>
+              </a:spcBef>
+              <a:spcAft>
+                <a:spcPts val="0"/>
+              </a:spcAft>
+              <a:buClr>
+                <a:schemeClr val="accent1"/>
+              </a:buClr>
+              <a:buFont typeface="Wingdings 3" charset="2"/>
+              <a:buChar char=""/>
+              <a:defRPr sz="1200" kern="1200">
+                <a:solidFill>
+                  <a:schemeClr val="tx1">
+                    <a:lumMod val="75000"/>
+                    <a:lumOff val="25000"/>
+                  </a:schemeClr>
+                </a:solidFill>
+                <a:latin typeface="+mn-lt"/>
+                <a:ea typeface="+mn-ea"/>
+                <a:cs typeface="+mn-cs"/>
+              </a:defRPr>
+            </a:lvl8pPr>
+            <a:lvl9pPr marL="3886200" indent="-228600" algn="l" defTabSz="457200" rtl="0" eaLnBrk="1" latinLnBrk="0" hangingPunct="1">
+              <a:spcBef>
+                <a:spcPts val="1000"/>
+              </a:spcBef>
+              <a:spcAft>
+                <a:spcPts val="0"/>
+              </a:spcAft>
+              <a:buClr>
+                <a:schemeClr val="accent1"/>
+              </a:buClr>
+              <a:buFont typeface="Wingdings 3" charset="2"/>
+              <a:buChar char=""/>
+              <a:defRPr sz="1200" kern="1200">
+                <a:solidFill>
+                  <a:schemeClr val="tx1">
+                    <a:lumMod val="75000"/>
+                    <a:lumOff val="25000"/>
+                  </a:schemeClr>
+                </a:solidFill>
+                <a:latin typeface="+mn-lt"/>
+                <a:ea typeface="+mn-ea"/>
+                <a:cs typeface="+mn-cs"/>
+              </a:defRPr>
+            </a:lvl9pPr>
+          </a:lstStyle>
+          <a:p>
+            <a:r>
+              <a:rPr lang="en-US" altLang="zh-TW" dirty="0" smtClean="0"/>
+              <a:t>S= ({a}, {b, c}) is a sequence </a:t>
+            </a:r>
+          </a:p>
+          <a:p>
+            <a:r>
+              <a:rPr lang="en-US" altLang="zh-TW" dirty="0" smtClean="0"/>
+              <a:t>The support of S is </a:t>
+            </a:r>
+            <a:r>
+              <a:rPr lang="en-US" altLang="zh-TW" dirty="0" err="1" smtClean="0"/>
+              <a:t>Sup</a:t>
+            </a:r>
+            <a:r>
+              <a:rPr lang="en-US" altLang="zh-TW" baseline="-25000" dirty="0" err="1" smtClean="0"/>
+              <a:t>D</a:t>
+            </a:r>
+            <a:r>
+              <a:rPr lang="en-US" altLang="zh-TW" dirty="0" smtClean="0"/>
+              <a:t>(S)</a:t>
+            </a:r>
+          </a:p>
+          <a:p>
+            <a:r>
+              <a:rPr lang="en-US" altLang="zh-TW" dirty="0" smtClean="0"/>
+              <a:t>Frequent sequential pattern:</a:t>
+            </a:r>
+          </a:p>
+          <a:p>
+            <a:pPr>
+              <a:buFont typeface="Wingdings" pitchFamily="2" charset="2"/>
+              <a:buNone/>
+            </a:pPr>
+            <a:r>
+              <a:rPr lang="en-US" altLang="zh-TW" dirty="0" smtClean="0"/>
+              <a:t>      </a:t>
+            </a:r>
+            <a:r>
+              <a:rPr lang="en-US" altLang="zh-TW" dirty="0" err="1" smtClean="0"/>
+              <a:t>Sup</a:t>
+            </a:r>
+            <a:r>
+              <a:rPr lang="en-US" altLang="zh-TW" baseline="-25000" dirty="0" err="1" smtClean="0"/>
+              <a:t>D</a:t>
+            </a:r>
+            <a:r>
+              <a:rPr lang="en-US" altLang="zh-TW" dirty="0" smtClean="0"/>
+              <a:t>(S)   &gt;= Min Support</a:t>
+            </a:r>
+          </a:p>
+          <a:p>
+            <a:r>
+              <a:rPr lang="en-US" altLang="zh-TW" dirty="0" err="1" smtClean="0"/>
+              <a:t>Sup</a:t>
+            </a:r>
+            <a:r>
+              <a:rPr lang="en-US" altLang="zh-TW" baseline="-25000" dirty="0" err="1" smtClean="0"/>
+              <a:t>D</a:t>
+            </a:r>
+            <a:r>
+              <a:rPr lang="en-US" altLang="zh-TW" dirty="0" smtClean="0"/>
+              <a:t>(S) = </a:t>
+            </a:r>
+            <a:r>
+              <a:rPr lang="en-US" altLang="zh-TW" dirty="0" err="1" smtClean="0"/>
+              <a:t>Sup</a:t>
+            </a:r>
+            <a:r>
+              <a:rPr lang="en-US" altLang="zh-TW" baseline="-25000" dirty="0" err="1" smtClean="0"/>
+              <a:t>D</a:t>
+            </a:r>
+            <a:r>
+              <a:rPr lang="en-US" altLang="zh-TW" dirty="0" smtClean="0"/>
+              <a:t> ({a}, {b, c} ) = 2 </a:t>
+            </a:r>
+            <a:endParaRPr lang="en-US" altLang="zh-TW" dirty="0"/>
+          </a:p>
+        </p:txBody>
+      </p:sp>
+      <p:sp>
+        <p:nvSpPr>
+          <p:cNvPr id="24" name="矩形 23"/>
+          <p:cNvSpPr/>
+          <p:nvPr/>
+        </p:nvSpPr>
+        <p:spPr>
+          <a:xfrm>
+            <a:off x="8669216" y="2224453"/>
+            <a:ext cx="228599" cy="162995"/>
+          </a:xfrm>
+          <a:prstGeom prst="rect">
+            <a:avLst/>
+          </a:prstGeom>
+          <a:noFill/>
+        </p:spPr>
+        <p:style>
+          <a:lnRef idx="2">
+            <a:schemeClr val="accent1">
+              <a:shade val="50000"/>
+            </a:schemeClr>
+          </a:lnRef>
+          <a:fillRef idx="1">
+            <a:schemeClr val="accent1"/>
+          </a:fillRef>
+          <a:effectRef idx="0">
+            <a:schemeClr val="accent1"/>
+          </a:effectRef>
+          <a:fontRef idx="minor">
+            <a:schemeClr val="lt1"/>
+          </a:fontRef>
+        </p:style>
+        <p:txBody>
+          <a:bodyPr rtlCol="0" anchor="ctr"/>
+          <a:lstStyle/>
+          <a:p>
+            <a:pPr algn="ctr"/>
+            <a:endParaRPr lang="zh-CN" altLang="en-US"/>
+          </a:p>
+        </p:txBody>
+      </p:sp>
+      <p:sp>
+        <p:nvSpPr>
+          <p:cNvPr id="26" name="矩形 25"/>
+          <p:cNvSpPr/>
+          <p:nvPr/>
+        </p:nvSpPr>
+        <p:spPr>
+          <a:xfrm>
+            <a:off x="9504483" y="2224454"/>
+            <a:ext cx="404448" cy="183510"/>
+          </a:xfrm>
+          <a:prstGeom prst="rect">
+            <a:avLst/>
+          </a:prstGeom>
+          <a:noFill/>
+        </p:spPr>
+        <p:style>
+          <a:lnRef idx="2">
+            <a:schemeClr val="accent1">
+              <a:shade val="50000"/>
+            </a:schemeClr>
+          </a:lnRef>
+          <a:fillRef idx="1">
+            <a:schemeClr val="accent1"/>
+          </a:fillRef>
+          <a:effectRef idx="0">
+            <a:schemeClr val="accent1"/>
+          </a:effectRef>
+          <a:fontRef idx="minor">
+            <a:schemeClr val="lt1"/>
+          </a:fontRef>
+        </p:style>
+        <p:txBody>
+          <a:bodyPr rtlCol="0" anchor="ctr"/>
+          <a:lstStyle/>
+          <a:p>
+            <a:pPr algn="ctr"/>
+            <a:endParaRPr lang="zh-CN" altLang="en-US"/>
+          </a:p>
+        </p:txBody>
+      </p:sp>
+      <p:sp>
+        <p:nvSpPr>
+          <p:cNvPr id="28" name="矩形 27"/>
+          <p:cNvSpPr/>
+          <p:nvPr/>
+        </p:nvSpPr>
+        <p:spPr>
+          <a:xfrm flipV="1">
+            <a:off x="9768253" y="2872080"/>
+            <a:ext cx="422031" cy="205228"/>
+          </a:xfrm>
+          <a:prstGeom prst="rect">
+            <a:avLst/>
+          </a:prstGeom>
+          <a:noFill/>
+        </p:spPr>
+        <p:style>
+          <a:lnRef idx="2">
+            <a:schemeClr val="accent1">
+              <a:shade val="50000"/>
+            </a:schemeClr>
+          </a:lnRef>
+          <a:fillRef idx="1">
+            <a:schemeClr val="accent1"/>
+          </a:fillRef>
+          <a:effectRef idx="0">
+            <a:schemeClr val="accent1"/>
+          </a:effectRef>
+          <a:fontRef idx="minor">
+            <a:schemeClr val="lt1"/>
+          </a:fontRef>
+        </p:style>
+        <p:txBody>
+          <a:bodyPr rtlCol="0" anchor="ctr"/>
+          <a:lstStyle/>
+          <a:p>
+            <a:pPr algn="ctr"/>
+            <a:endParaRPr lang="zh-CN" altLang="en-US"/>
+          </a:p>
+        </p:txBody>
+      </p:sp>
+      <p:sp>
+        <p:nvSpPr>
+          <p:cNvPr id="29" name="矩形 28"/>
+          <p:cNvSpPr/>
+          <p:nvPr/>
+        </p:nvSpPr>
+        <p:spPr>
+          <a:xfrm>
+            <a:off x="9177701" y="2914313"/>
+            <a:ext cx="228599" cy="162995"/>
+          </a:xfrm>
+          <a:prstGeom prst="rect">
+            <a:avLst/>
+          </a:prstGeom>
+          <a:noFill/>
+        </p:spPr>
+        <p:style>
+          <a:lnRef idx="2">
+            <a:schemeClr val="accent1">
+              <a:shade val="50000"/>
+            </a:schemeClr>
+          </a:lnRef>
+          <a:fillRef idx="1">
+            <a:schemeClr val="accent1"/>
+          </a:fillRef>
+          <a:effectRef idx="0">
+            <a:schemeClr val="accent1"/>
+          </a:effectRef>
+          <a:fontRef idx="minor">
+            <a:schemeClr val="lt1"/>
+          </a:fontRef>
+        </p:style>
+        <p:txBody>
+          <a:bodyPr rtlCol="0" anchor="ctr"/>
+          <a:lstStyle/>
+          <a:p>
+            <a:pPr algn="ctr"/>
+            <a:endParaRPr lang="zh-CN" altLang="en-US"/>
+          </a:p>
+        </p:txBody>
+      </p:sp>
+    </p:spTree>
+    <p:extLst>
+      <p:ext uri="{BB962C8B-B14F-4D97-AF65-F5344CB8AC3E}">
+        <p14:creationId xmlns:p14="http://schemas.microsoft.com/office/powerpoint/2010/main" val="3895996448"/>
+      </p:ext>
+    </p:extLst>
+  </p:cSld>
+  <p:clrMapOvr>
+    <a:masterClrMapping/>
+  </p:clrMapOvr>
+  <p:timing>
+    <p:tnLst>
+      <p:par>
+        <p:cTn id="1" dur="indefinite" restart="never" nodeType="tmRoot"/>
+      </p:par>
+    </p:tnLst>
+  </p:timing>
+</p:sld>
+</file>
+
 <file path=ppt/slides/slide4.xml><?xml version="1.0" encoding="utf-8"?>
 <p:sld xmlns:a="http://schemas.openxmlformats.org/drawingml/2006/main" xmlns:r="http://schemas.openxmlformats.org/officeDocument/2006/relationships" xmlns:p="http://schemas.openxmlformats.org/presentationml/2006/main">
   <p:cSld>
@@ -26321,6 +27248,1112 @@
       </p:par>
     </p:tnLst>
   </p:timing>
+</p:sld>
+</file>
+
+<file path=ppt/slides/slide40.xml><?xml version="1.0" encoding="utf-8"?>
+<p:sld xmlns:a="http://schemas.openxmlformats.org/drawingml/2006/main" xmlns:r="http://schemas.openxmlformats.org/officeDocument/2006/relationships" xmlns:p="http://schemas.openxmlformats.org/presentationml/2006/main">
+  <p:cSld>
+    <p:spTree>
+      <p:nvGrpSpPr>
+        <p:cNvPr id="1" name=""/>
+        <p:cNvGrpSpPr/>
+        <p:nvPr/>
+      </p:nvGrpSpPr>
+      <p:grpSpPr>
+        <a:xfrm>
+          <a:off x="0" y="0"/>
+          <a:ext cx="0" cy="0"/>
+          <a:chOff x="0" y="0"/>
+          <a:chExt cx="0" cy="0"/>
+        </a:xfrm>
+      </p:grpSpPr>
+      <p:sp>
+        <p:nvSpPr>
+          <p:cNvPr id="2" name="标题 1"/>
+          <p:cNvSpPr>
+            <a:spLocks noGrp="1"/>
+          </p:cNvSpPr>
+          <p:nvPr>
+            <p:ph type="title"/>
+          </p:nvPr>
+        </p:nvSpPr>
+        <p:spPr>
+          <a:xfrm>
+            <a:off x="2584133" y="228456"/>
+            <a:ext cx="8911687" cy="1280890"/>
+          </a:xfrm>
+        </p:spPr>
+        <p:txBody>
+          <a:bodyPr/>
+          <a:lstStyle/>
+          <a:p>
+            <a:pPr algn="ctr"/>
+            <a:r>
+              <a:rPr lang="en-US" altLang="zh-CN" dirty="0"/>
+              <a:t>Frequent subsequence mining</a:t>
+            </a:r>
+            <a:endParaRPr lang="zh-CN" altLang="en-US" dirty="0"/>
+          </a:p>
+        </p:txBody>
+      </p:sp>
+      <p:sp>
+        <p:nvSpPr>
+          <p:cNvPr id="3" name="内容占位符 2"/>
+          <p:cNvSpPr>
+            <a:spLocks noGrp="1"/>
+          </p:cNvSpPr>
+          <p:nvPr>
+            <p:ph idx="1"/>
+          </p:nvPr>
+        </p:nvSpPr>
+        <p:spPr>
+          <a:xfrm>
+            <a:off x="6972300" y="2133600"/>
+            <a:ext cx="4532312" cy="3777622"/>
+          </a:xfrm>
+        </p:spPr>
+        <p:txBody>
+          <a:bodyPr/>
+          <a:lstStyle/>
+          <a:p>
+            <a:r>
+              <a:rPr lang="en-US" altLang="zh-TW" dirty="0"/>
+              <a:t>S = ({a, b, c}, {a, b</a:t>
+            </a:r>
+            <a:r>
+              <a:rPr lang="en-US" altLang="zh-TW" dirty="0" smtClean="0"/>
+              <a:t>})</a:t>
+            </a:r>
+          </a:p>
+          <a:p>
+            <a:r>
+              <a:rPr lang="en-US" altLang="zh-TW" dirty="0"/>
+              <a:t>Sequence-extended sequence </a:t>
+            </a:r>
+          </a:p>
+          <a:p>
+            <a:pPr lvl="1"/>
+            <a:r>
+              <a:rPr lang="en-US" altLang="zh-TW" dirty="0" smtClean="0"/>
+              <a:t>S’=({</a:t>
+            </a:r>
+            <a:r>
+              <a:rPr lang="en-US" altLang="zh-TW" dirty="0" err="1" smtClean="0"/>
+              <a:t>a,b,c</a:t>
+            </a:r>
+            <a:r>
+              <a:rPr lang="en-US" altLang="zh-TW" dirty="0" smtClean="0"/>
+              <a:t>},{</a:t>
+            </a:r>
+            <a:r>
+              <a:rPr lang="en-US" altLang="zh-TW" dirty="0" err="1" smtClean="0"/>
+              <a:t>a,b</a:t>
+            </a:r>
+            <a:r>
+              <a:rPr lang="en-US" altLang="zh-TW" dirty="0" smtClean="0"/>
+              <a:t>},{d})</a:t>
+            </a:r>
+          </a:p>
+          <a:p>
+            <a:r>
+              <a:rPr lang="en-US" altLang="zh-TW" dirty="0" smtClean="0"/>
+              <a:t>Item-extended sequence</a:t>
+            </a:r>
+          </a:p>
+          <a:p>
+            <a:pPr lvl="1"/>
+            <a:r>
+              <a:rPr lang="en-US" altLang="zh-TW" dirty="0" smtClean="0"/>
+              <a:t>S’=({</a:t>
+            </a:r>
+            <a:r>
+              <a:rPr lang="en-US" altLang="zh-TW" dirty="0" err="1" smtClean="0"/>
+              <a:t>a,b,c</a:t>
+            </a:r>
+            <a:r>
+              <a:rPr lang="en-US" altLang="zh-TW" dirty="0" smtClean="0"/>
+              <a:t>},{</a:t>
+            </a:r>
+            <a:r>
+              <a:rPr lang="en-US" altLang="zh-TW" dirty="0" err="1" smtClean="0"/>
+              <a:t>a,b,d</a:t>
+            </a:r>
+            <a:r>
+              <a:rPr lang="en-US" altLang="zh-TW" dirty="0" smtClean="0"/>
+              <a:t>}</a:t>
+            </a:r>
+          </a:p>
+          <a:p>
+            <a:endParaRPr lang="en-US" altLang="zh-TW" dirty="0"/>
+          </a:p>
+        </p:txBody>
+      </p:sp>
+      <p:pic>
+        <p:nvPicPr>
+          <p:cNvPr id="3078" name="Picture 6"/>
+          <p:cNvPicPr>
+            <a:picLocks noChangeAspect="1" noChangeArrowheads="1"/>
+          </p:cNvPicPr>
+          <p:nvPr/>
+        </p:nvPicPr>
+        <p:blipFill>
+          <a:blip r:embed="rId2">
+            <a:extLst>
+              <a:ext uri="{28A0092B-C50C-407E-A947-70E740481C1C}">
+                <a14:useLocalDpi xmlns:a14="http://schemas.microsoft.com/office/drawing/2010/main" val="0"/>
+              </a:ext>
+            </a:extLst>
+          </a:blip>
+          <a:srcRect/>
+          <a:stretch>
+            <a:fillRect/>
+          </a:stretch>
+        </p:blipFill>
+        <p:spPr bwMode="auto">
+          <a:xfrm>
+            <a:off x="1889614" y="933450"/>
+            <a:ext cx="4505325" cy="5924550"/>
+          </a:xfrm>
+          <a:prstGeom prst="rect">
+            <a:avLst/>
+          </a:prstGeom>
+          <a:noFill/>
+          <a:ln>
+            <a:noFill/>
+          </a:ln>
+          <a:extLst>
+            <a:ext uri="{909E8E84-426E-40DD-AFC4-6F175D3DCCD1}">
+              <a14:hiddenFill xmlns:a14="http://schemas.microsoft.com/office/drawing/2010/main">
+                <a:solidFill>
+                  <a:schemeClr val="accent1"/>
+                </a:solidFill>
+              </a14:hiddenFill>
+            </a:ext>
+            <a:ext uri="{91240B29-F687-4F45-9708-019B960494DF}">
+              <a14:hiddenLine xmlns:a14="http://schemas.microsoft.com/office/drawing/2010/main" w="9525">
+                <a:solidFill>
+                  <a:schemeClr val="tx1"/>
+                </a:solidFill>
+                <a:miter lim="800000"/>
+                <a:headEnd/>
+                <a:tailEnd/>
+              </a14:hiddenLine>
+            </a:ext>
+          </a:extLst>
+        </p:spPr>
+      </p:pic>
+    </p:spTree>
+    <p:extLst>
+      <p:ext uri="{BB962C8B-B14F-4D97-AF65-F5344CB8AC3E}">
+        <p14:creationId xmlns:p14="http://schemas.microsoft.com/office/powerpoint/2010/main" val="568983300"/>
+      </p:ext>
+    </p:extLst>
+  </p:cSld>
+  <p:clrMapOvr>
+    <a:masterClrMapping/>
+  </p:clrMapOvr>
+  <p:timing>
+    <p:tnLst>
+      <p:par>
+        <p:cTn id="1" dur="indefinite" restart="never" nodeType="tmRoot"/>
+      </p:par>
+    </p:tnLst>
+  </p:timing>
+</p:sld>
+</file>
+
+<file path=ppt/slides/slide41.xml><?xml version="1.0" encoding="utf-8"?>
+<p:sld xmlns:a="http://schemas.openxmlformats.org/drawingml/2006/main" xmlns:r="http://schemas.openxmlformats.org/officeDocument/2006/relationships" xmlns:p="http://schemas.openxmlformats.org/presentationml/2006/main">
+  <p:cSld>
+    <p:spTree>
+      <p:nvGrpSpPr>
+        <p:cNvPr id="1" name=""/>
+        <p:cNvGrpSpPr/>
+        <p:nvPr/>
+      </p:nvGrpSpPr>
+      <p:grpSpPr>
+        <a:xfrm>
+          <a:off x="0" y="0"/>
+          <a:ext cx="0" cy="0"/>
+          <a:chOff x="0" y="0"/>
+          <a:chExt cx="0" cy="0"/>
+        </a:xfrm>
+      </p:grpSpPr>
+      <p:sp>
+        <p:nvSpPr>
+          <p:cNvPr id="2" name="标题 1"/>
+          <p:cNvSpPr>
+            <a:spLocks noGrp="1"/>
+          </p:cNvSpPr>
+          <p:nvPr>
+            <p:ph type="title"/>
+          </p:nvPr>
+        </p:nvSpPr>
+        <p:spPr/>
+        <p:txBody>
+          <a:bodyPr/>
+          <a:lstStyle/>
+          <a:p>
+            <a:pPr algn="ctr"/>
+            <a:r>
+              <a:rPr lang="en-US" altLang="zh-CN" dirty="0"/>
+              <a:t>Frequent subsequence mining</a:t>
+            </a:r>
+            <a:endParaRPr lang="zh-CN" altLang="en-US" dirty="0"/>
+          </a:p>
+        </p:txBody>
+      </p:sp>
+      <mc:AlternateContent xmlns:mc="http://schemas.openxmlformats.org/markup-compatibility/2006">
+        <mc:Choice xmlns:a14="http://schemas.microsoft.com/office/drawing/2010/main" Requires="a14">
+          <p:sp>
+            <p:nvSpPr>
+              <p:cNvPr id="3" name="内容占位符 2"/>
+              <p:cNvSpPr>
+                <a:spLocks noGrp="1"/>
+              </p:cNvSpPr>
+              <p:nvPr>
+                <p:ph idx="1"/>
+              </p:nvPr>
+            </p:nvSpPr>
+            <p:spPr/>
+            <p:txBody>
+              <a:bodyPr/>
+              <a:lstStyle/>
+              <a:p>
+                <a:r>
+                  <a:rPr lang="en-US" altLang="zh-CN" b="0" dirty="0" smtClean="0"/>
+                  <a:t>Pruning </a:t>
+                </a:r>
+                <a14:m>
+                  <m:oMath xmlns:m="http://schemas.openxmlformats.org/officeDocument/2006/math">
+                    <m:sSub>
+                      <m:sSubPr>
+                        <m:ctrlPr>
+                          <a:rPr lang="en-US" altLang="zh-CN" b="0" i="1" smtClean="0">
+                            <a:latin typeface="Cambria Math"/>
+                          </a:rPr>
+                        </m:ctrlPr>
+                      </m:sSubPr>
+                      <m:e>
+                        <m:r>
+                          <a:rPr lang="en-US" altLang="zh-CN" b="0" i="1" smtClean="0">
+                            <a:latin typeface="Cambria Math"/>
+                          </a:rPr>
+                          <m:t>𝑆</m:t>
+                        </m:r>
+                      </m:e>
+                      <m:sub>
+                        <m:r>
+                          <a:rPr lang="en-US" altLang="zh-CN" b="0" i="1" smtClean="0">
+                            <a:latin typeface="Cambria Math"/>
+                          </a:rPr>
+                          <m:t>𝑚</m:t>
+                        </m:r>
+                      </m:sub>
+                    </m:sSub>
+                    <m:r>
+                      <a:rPr lang="en-US" altLang="zh-CN" b="0" i="0" smtClean="0">
+                        <a:latin typeface="Cambria Math"/>
+                      </a:rPr>
+                      <m:t> </m:t>
+                    </m:r>
+                    <m:r>
+                      <m:rPr>
+                        <m:sty m:val="p"/>
+                      </m:rPr>
+                      <a:rPr lang="en-US" altLang="zh-CN" b="0" i="0" smtClean="0">
+                        <a:latin typeface="Cambria Math"/>
+                      </a:rPr>
+                      <m:t>and</m:t>
+                    </m:r>
+                    <m:r>
+                      <a:rPr lang="en-US" altLang="zh-CN" b="0" i="0" smtClean="0">
+                        <a:latin typeface="Cambria Math"/>
+                      </a:rPr>
+                      <m:t> </m:t>
+                    </m:r>
+                    <m:sSub>
+                      <m:sSubPr>
+                        <m:ctrlPr>
+                          <a:rPr lang="en-US" altLang="zh-CN" b="0" i="0" smtClean="0">
+                            <a:latin typeface="Cambria Math"/>
+                          </a:rPr>
+                        </m:ctrlPr>
+                      </m:sSubPr>
+                      <m:e>
+                        <m:r>
+                          <m:rPr>
+                            <m:sty m:val="p"/>
+                          </m:rPr>
+                          <a:rPr lang="en-US" altLang="zh-CN" b="0" i="0" smtClean="0">
+                            <a:latin typeface="Cambria Math"/>
+                          </a:rPr>
+                          <m:t>I</m:t>
+                        </m:r>
+                      </m:e>
+                      <m:sub>
+                        <m:r>
+                          <m:rPr>
+                            <m:sty m:val="p"/>
+                          </m:rPr>
+                          <a:rPr lang="en-US" altLang="zh-CN" b="0" i="0" smtClean="0">
+                            <a:latin typeface="Cambria Math"/>
+                          </a:rPr>
+                          <m:t>n</m:t>
+                        </m:r>
+                      </m:sub>
+                    </m:sSub>
+                  </m:oMath>
+                </a14:m>
+                <a:endParaRPr lang="en-US" altLang="zh-CN" dirty="0" smtClean="0"/>
+              </a:p>
+              <a:p>
+                <a:r>
+                  <a:rPr lang="en-US" altLang="zh-CN" dirty="0" smtClean="0"/>
+                  <a:t>S-step pruning</a:t>
+                </a:r>
+              </a:p>
+              <a:p>
+                <a:pPr lvl="1"/>
+                <a:r>
+                  <a:rPr lang="en-US" altLang="zh-CN" dirty="0" smtClean="0"/>
+                  <a:t>Sequence s and its s-extended sequence </a:t>
+                </a:r>
+                <a14:m>
+                  <m:oMath xmlns:m="http://schemas.openxmlformats.org/officeDocument/2006/math">
+                    <m:sSub>
+                      <m:sSubPr>
+                        <m:ctrlPr>
+                          <a:rPr lang="en-US" altLang="zh-CN" b="0" i="1" smtClean="0">
+                            <a:latin typeface="Cambria Math"/>
+                          </a:rPr>
+                        </m:ctrlPr>
+                      </m:sSubPr>
+                      <m:e>
+                        <m:r>
+                          <a:rPr lang="en-US" altLang="zh-CN" b="0" i="1" smtClean="0">
+                            <a:latin typeface="Cambria Math"/>
+                          </a:rPr>
+                          <m:t>𝑠</m:t>
+                        </m:r>
+                      </m:e>
+                      <m:sub>
+                        <m:r>
+                          <a:rPr lang="en-US" altLang="zh-CN" b="0" i="1" smtClean="0">
+                            <a:latin typeface="Cambria Math"/>
+                          </a:rPr>
+                          <m:t>𝑎</m:t>
+                        </m:r>
+                      </m:sub>
+                    </m:sSub>
+                    <m:r>
+                      <a:rPr lang="en-US" altLang="zh-CN" b="0" i="1" smtClean="0">
+                        <a:latin typeface="Cambria Math"/>
+                      </a:rPr>
+                      <m:t>=(</m:t>
+                    </m:r>
+                    <m:r>
+                      <a:rPr lang="en-US" altLang="zh-CN" b="0" i="1" smtClean="0">
+                        <a:latin typeface="Cambria Math"/>
+                      </a:rPr>
+                      <m:t>𝑠</m:t>
+                    </m:r>
+                    <m:r>
+                      <a:rPr lang="en-US" altLang="zh-CN" b="0" i="1" smtClean="0">
+                        <a:latin typeface="Cambria Math"/>
+                      </a:rPr>
+                      <m:t>,</m:t>
+                    </m:r>
+                    <m:d>
+                      <m:dPr>
+                        <m:begChr m:val="{"/>
+                        <m:endChr m:val="}"/>
+                        <m:ctrlPr>
+                          <a:rPr lang="en-US" altLang="zh-CN" b="0" i="1" smtClean="0">
+                            <a:latin typeface="Cambria Math"/>
+                          </a:rPr>
+                        </m:ctrlPr>
+                      </m:dPr>
+                      <m:e>
+                        <m:sSub>
+                          <m:sSubPr>
+                            <m:ctrlPr>
+                              <a:rPr lang="en-US" altLang="zh-CN" b="0" i="1" smtClean="0">
+                                <a:latin typeface="Cambria Math"/>
+                              </a:rPr>
+                            </m:ctrlPr>
+                          </m:sSubPr>
+                          <m:e>
+                            <m:r>
+                              <a:rPr lang="en-US" altLang="zh-CN" b="0" i="1" smtClean="0">
+                                <a:latin typeface="Cambria Math"/>
+                              </a:rPr>
+                              <m:t>𝑖</m:t>
+                            </m:r>
+                          </m:e>
+                          <m:sub>
+                            <m:r>
+                              <a:rPr lang="en-US" altLang="zh-CN" b="0" i="1" smtClean="0">
+                                <a:latin typeface="Cambria Math"/>
+                              </a:rPr>
+                              <m:t>𝑗</m:t>
+                            </m:r>
+                          </m:sub>
+                        </m:sSub>
+                      </m:e>
+                    </m:d>
+                    <m:r>
+                      <a:rPr lang="en-US" altLang="zh-CN" b="0" i="1" smtClean="0">
+                        <a:latin typeface="Cambria Math"/>
+                      </a:rPr>
+                      <m:t>)</m:t>
+                    </m:r>
+                  </m:oMath>
+                </a14:m>
+                <a:r>
+                  <a:rPr lang="zh-CN" altLang="en-US" dirty="0" smtClean="0"/>
+                  <a:t> </a:t>
+                </a:r>
+                <a:r>
+                  <a:rPr lang="en-US" altLang="zh-CN" dirty="0" smtClean="0"/>
+                  <a:t>and </a:t>
+                </a:r>
+                <a14:m>
+                  <m:oMath xmlns:m="http://schemas.openxmlformats.org/officeDocument/2006/math">
+                    <m:sSub>
+                      <m:sSubPr>
+                        <m:ctrlPr>
+                          <a:rPr lang="en-US" altLang="zh-CN" b="0" i="1" smtClean="0">
+                            <a:latin typeface="Cambria Math"/>
+                          </a:rPr>
+                        </m:ctrlPr>
+                      </m:sSubPr>
+                      <m:e>
+                        <m:r>
+                          <a:rPr lang="en-US" altLang="zh-CN" b="0" i="1" smtClean="0">
+                            <a:latin typeface="Cambria Math"/>
+                          </a:rPr>
+                          <m:t>𝑠</m:t>
+                        </m:r>
+                      </m:e>
+                      <m:sub>
+                        <m:r>
+                          <a:rPr lang="en-US" altLang="zh-CN" b="0" i="1" smtClean="0">
+                            <a:latin typeface="Cambria Math"/>
+                          </a:rPr>
+                          <m:t>𝑏</m:t>
+                        </m:r>
+                      </m:sub>
+                    </m:sSub>
+                    <m:r>
+                      <a:rPr lang="en-US" altLang="zh-CN" b="0" i="1" smtClean="0">
+                        <a:latin typeface="Cambria Math"/>
+                      </a:rPr>
+                      <m:t>=</m:t>
+                    </m:r>
+                    <m:d>
+                      <m:dPr>
+                        <m:ctrlPr>
+                          <a:rPr lang="en-US" altLang="zh-CN" b="0" i="1" smtClean="0">
+                            <a:latin typeface="Cambria Math"/>
+                          </a:rPr>
+                        </m:ctrlPr>
+                      </m:dPr>
+                      <m:e>
+                        <m:r>
+                          <a:rPr lang="en-US" altLang="zh-CN" b="0" i="1" smtClean="0">
+                            <a:latin typeface="Cambria Math"/>
+                          </a:rPr>
+                          <m:t>𝑠</m:t>
+                        </m:r>
+                        <m:r>
+                          <a:rPr lang="en-US" altLang="zh-CN" b="0" i="1" smtClean="0">
+                            <a:latin typeface="Cambria Math"/>
+                          </a:rPr>
+                          <m:t>,</m:t>
+                        </m:r>
+                        <m:d>
+                          <m:dPr>
+                            <m:begChr m:val="{"/>
+                            <m:endChr m:val="}"/>
+                            <m:ctrlPr>
+                              <a:rPr lang="en-US" altLang="zh-CN" b="0" i="1" smtClean="0">
+                                <a:latin typeface="Cambria Math"/>
+                              </a:rPr>
+                            </m:ctrlPr>
+                          </m:dPr>
+                          <m:e>
+                            <m:sSub>
+                              <m:sSubPr>
+                                <m:ctrlPr>
+                                  <a:rPr lang="en-US" altLang="zh-CN" b="0" i="1" smtClean="0">
+                                    <a:latin typeface="Cambria Math"/>
+                                  </a:rPr>
+                                </m:ctrlPr>
+                              </m:sSubPr>
+                              <m:e>
+                                <m:r>
+                                  <a:rPr lang="en-US" altLang="zh-CN" b="0" i="1" smtClean="0">
+                                    <a:latin typeface="Cambria Math"/>
+                                  </a:rPr>
+                                  <m:t>𝑖</m:t>
+                                </m:r>
+                              </m:e>
+                              <m:sub>
+                                <m:r>
+                                  <a:rPr lang="en-US" altLang="zh-CN" b="0" i="1" smtClean="0">
+                                    <a:latin typeface="Cambria Math"/>
+                                  </a:rPr>
+                                  <m:t>𝑘</m:t>
+                                </m:r>
+                              </m:sub>
+                            </m:sSub>
+                          </m:e>
+                        </m:d>
+                      </m:e>
+                    </m:d>
+                  </m:oMath>
+                </a14:m>
+                <a:endParaRPr lang="en-US" altLang="zh-CN" b="0" dirty="0" smtClean="0"/>
+              </a:p>
+              <a:p>
+                <a:pPr lvl="1"/>
+                <a14:m>
+                  <m:oMath xmlns:m="http://schemas.openxmlformats.org/officeDocument/2006/math">
+                    <m:sSub>
+                      <m:sSubPr>
+                        <m:ctrlPr>
+                          <a:rPr lang="en-US" altLang="zh-CN" b="0" i="1" smtClean="0">
+                            <a:latin typeface="Cambria Math"/>
+                          </a:rPr>
+                        </m:ctrlPr>
+                      </m:sSubPr>
+                      <m:e>
+                        <m:r>
+                          <a:rPr lang="en-US" altLang="zh-CN" b="0" i="1" smtClean="0">
+                            <a:latin typeface="Cambria Math"/>
+                          </a:rPr>
+                          <m:t>𝑠</m:t>
+                        </m:r>
+                      </m:e>
+                      <m:sub>
+                        <m:r>
+                          <a:rPr lang="en-US" altLang="zh-CN" b="0" i="1" smtClean="0">
+                            <a:latin typeface="Cambria Math"/>
+                          </a:rPr>
+                          <m:t>𝑎</m:t>
+                        </m:r>
+                      </m:sub>
+                    </m:sSub>
+                  </m:oMath>
+                </a14:m>
+                <a:r>
+                  <a:rPr lang="zh-CN" altLang="en-US" dirty="0" smtClean="0"/>
+                  <a:t> </a:t>
+                </a:r>
+                <a:r>
+                  <a:rPr lang="en-US" altLang="zh-CN" dirty="0" smtClean="0"/>
+                  <a:t>is frequent and </a:t>
+                </a:r>
+                <a14:m>
+                  <m:oMath xmlns:m="http://schemas.openxmlformats.org/officeDocument/2006/math">
+                    <m:sSub>
+                      <m:sSubPr>
+                        <m:ctrlPr>
+                          <a:rPr lang="en-US" altLang="zh-CN" b="0" i="1" smtClean="0">
+                            <a:latin typeface="Cambria Math"/>
+                          </a:rPr>
+                        </m:ctrlPr>
+                      </m:sSubPr>
+                      <m:e>
+                        <m:r>
+                          <a:rPr lang="en-US" altLang="zh-CN" b="0" i="1" smtClean="0">
+                            <a:latin typeface="Cambria Math"/>
+                          </a:rPr>
+                          <m:t>𝑠</m:t>
+                        </m:r>
+                      </m:e>
+                      <m:sub>
+                        <m:r>
+                          <a:rPr lang="en-US" altLang="zh-CN" b="0" i="1" smtClean="0">
+                            <a:latin typeface="Cambria Math"/>
+                          </a:rPr>
+                          <m:t>𝑏</m:t>
+                        </m:r>
+                      </m:sub>
+                    </m:sSub>
+                  </m:oMath>
+                </a14:m>
+                <a:r>
+                  <a:rPr lang="zh-CN" altLang="en-US" dirty="0" smtClean="0"/>
+                  <a:t> </a:t>
+                </a:r>
+                <a:r>
+                  <a:rPr lang="en-US" altLang="zh-CN" dirty="0" smtClean="0"/>
+                  <a:t>is not frequent</a:t>
+                </a:r>
+                <a:r>
+                  <a:rPr lang="en-US" altLang="zh-CN" dirty="0" smtClean="0">
+                    <a:sym typeface="Wingdings" pitchFamily="2" charset="2"/>
+                  </a:rPr>
+                  <a:t></a:t>
+                </a:r>
+                <a14:m>
+                  <m:oMath xmlns:m="http://schemas.openxmlformats.org/officeDocument/2006/math">
+                    <m:d>
+                      <m:dPr>
+                        <m:ctrlPr>
+                          <a:rPr lang="en-US" altLang="zh-CN" b="0" i="1" smtClean="0">
+                            <a:latin typeface="Cambria Math"/>
+                            <a:sym typeface="Wingdings" pitchFamily="2" charset="2"/>
+                          </a:rPr>
+                        </m:ctrlPr>
+                      </m:dPr>
+                      <m:e>
+                        <m:r>
+                          <a:rPr lang="en-US" altLang="zh-CN" b="0" i="1" smtClean="0">
+                            <a:latin typeface="Cambria Math"/>
+                            <a:sym typeface="Wingdings" pitchFamily="2" charset="2"/>
+                          </a:rPr>
+                          <m:t>𝑠</m:t>
+                        </m:r>
+                        <m:r>
+                          <a:rPr lang="en-US" altLang="zh-CN" b="0" i="1" smtClean="0">
+                            <a:latin typeface="Cambria Math"/>
+                            <a:sym typeface="Wingdings" pitchFamily="2" charset="2"/>
+                          </a:rPr>
+                          <m:t>,</m:t>
+                        </m:r>
+                        <m:d>
+                          <m:dPr>
+                            <m:begChr m:val="{"/>
+                            <m:endChr m:val="}"/>
+                            <m:ctrlPr>
+                              <a:rPr lang="en-US" altLang="zh-CN" b="0" i="1" smtClean="0">
+                                <a:latin typeface="Cambria Math"/>
+                                <a:sym typeface="Wingdings" pitchFamily="2" charset="2"/>
+                              </a:rPr>
+                            </m:ctrlPr>
+                          </m:dPr>
+                          <m:e>
+                            <m:sSub>
+                              <m:sSubPr>
+                                <m:ctrlPr>
+                                  <a:rPr lang="en-US" altLang="zh-CN" b="0" i="1" smtClean="0">
+                                    <a:latin typeface="Cambria Math"/>
+                                    <a:sym typeface="Wingdings" pitchFamily="2" charset="2"/>
+                                  </a:rPr>
+                                </m:ctrlPr>
+                              </m:sSubPr>
+                              <m:e>
+                                <m:r>
+                                  <a:rPr lang="en-US" altLang="zh-CN" b="0" i="1" smtClean="0">
+                                    <a:latin typeface="Cambria Math"/>
+                                    <a:sym typeface="Wingdings" pitchFamily="2" charset="2"/>
+                                  </a:rPr>
+                                  <m:t>𝑖</m:t>
+                                </m:r>
+                              </m:e>
+                              <m:sub>
+                                <m:r>
+                                  <a:rPr lang="en-US" altLang="zh-CN" b="0" i="1" smtClean="0">
+                                    <a:latin typeface="Cambria Math"/>
+                                    <a:sym typeface="Wingdings" pitchFamily="2" charset="2"/>
+                                  </a:rPr>
+                                  <m:t>𝑗</m:t>
+                                </m:r>
+                              </m:sub>
+                            </m:sSub>
+                          </m:e>
+                        </m:d>
+                        <m:r>
+                          <a:rPr lang="en-US" altLang="zh-CN" b="0" i="1" smtClean="0">
+                            <a:latin typeface="Cambria Math"/>
+                            <a:sym typeface="Wingdings" pitchFamily="2" charset="2"/>
+                          </a:rPr>
+                          <m:t>,</m:t>
+                        </m:r>
+                        <m:d>
+                          <m:dPr>
+                            <m:begChr m:val="{"/>
+                            <m:endChr m:val="}"/>
+                            <m:ctrlPr>
+                              <a:rPr lang="en-US" altLang="zh-CN" b="0" i="1" smtClean="0">
+                                <a:latin typeface="Cambria Math"/>
+                                <a:sym typeface="Wingdings" pitchFamily="2" charset="2"/>
+                              </a:rPr>
+                            </m:ctrlPr>
+                          </m:dPr>
+                          <m:e>
+                            <m:sSub>
+                              <m:sSubPr>
+                                <m:ctrlPr>
+                                  <a:rPr lang="en-US" altLang="zh-CN" b="0" i="1" smtClean="0">
+                                    <a:latin typeface="Cambria Math"/>
+                                    <a:sym typeface="Wingdings" pitchFamily="2" charset="2"/>
+                                  </a:rPr>
+                                </m:ctrlPr>
+                              </m:sSubPr>
+                              <m:e>
+                                <m:r>
+                                  <a:rPr lang="en-US" altLang="zh-CN" b="0" i="1" smtClean="0">
+                                    <a:latin typeface="Cambria Math"/>
+                                    <a:sym typeface="Wingdings" pitchFamily="2" charset="2"/>
+                                  </a:rPr>
+                                  <m:t>𝑖</m:t>
+                                </m:r>
+                              </m:e>
+                              <m:sub>
+                                <m:r>
+                                  <a:rPr lang="en-US" altLang="zh-CN" b="0" i="1" smtClean="0">
+                                    <a:latin typeface="Cambria Math"/>
+                                    <a:sym typeface="Wingdings" pitchFamily="2" charset="2"/>
+                                  </a:rPr>
+                                  <m:t>𝑘</m:t>
+                                </m:r>
+                              </m:sub>
+                            </m:sSub>
+                          </m:e>
+                        </m:d>
+                      </m:e>
+                    </m:d>
+                    <m:r>
+                      <a:rPr lang="en-US" altLang="zh-CN" b="0" i="1" smtClean="0">
+                        <a:latin typeface="Cambria Math"/>
+                        <a:sym typeface="Wingdings" pitchFamily="2" charset="2"/>
+                      </a:rPr>
+                      <m:t>𝑎𝑛𝑑</m:t>
+                    </m:r>
+                    <m:r>
+                      <a:rPr lang="en-US" altLang="zh-CN" b="0" i="1" smtClean="0">
+                        <a:latin typeface="Cambria Math"/>
+                        <a:sym typeface="Wingdings" pitchFamily="2" charset="2"/>
+                      </a:rPr>
+                      <m:t> </m:t>
+                    </m:r>
+                    <m:d>
+                      <m:dPr>
+                        <m:ctrlPr>
+                          <a:rPr lang="en-US" altLang="zh-CN" b="0" i="1" smtClean="0">
+                            <a:latin typeface="Cambria Math"/>
+                            <a:sym typeface="Wingdings" pitchFamily="2" charset="2"/>
+                          </a:rPr>
+                        </m:ctrlPr>
+                      </m:dPr>
+                      <m:e>
+                        <m:r>
+                          <a:rPr lang="en-US" altLang="zh-CN" b="0" i="1" smtClean="0">
+                            <a:latin typeface="Cambria Math"/>
+                            <a:sym typeface="Wingdings" pitchFamily="2" charset="2"/>
+                          </a:rPr>
+                          <m:t>𝑠</m:t>
+                        </m:r>
+                        <m:r>
+                          <a:rPr lang="en-US" altLang="zh-CN" b="0" i="1" smtClean="0">
+                            <a:latin typeface="Cambria Math"/>
+                            <a:sym typeface="Wingdings" pitchFamily="2" charset="2"/>
+                          </a:rPr>
+                          <m:t>,</m:t>
+                        </m:r>
+                        <m:d>
+                          <m:dPr>
+                            <m:begChr m:val="{"/>
+                            <m:endChr m:val="}"/>
+                            <m:ctrlPr>
+                              <a:rPr lang="en-US" altLang="zh-CN" b="0" i="1" smtClean="0">
+                                <a:latin typeface="Cambria Math"/>
+                                <a:sym typeface="Wingdings" pitchFamily="2" charset="2"/>
+                              </a:rPr>
+                            </m:ctrlPr>
+                          </m:dPr>
+                          <m:e>
+                            <m:sSub>
+                              <m:sSubPr>
+                                <m:ctrlPr>
+                                  <a:rPr lang="en-US" altLang="zh-CN" b="0" i="1" smtClean="0">
+                                    <a:latin typeface="Cambria Math"/>
+                                    <a:sym typeface="Wingdings" pitchFamily="2" charset="2"/>
+                                  </a:rPr>
+                                </m:ctrlPr>
+                              </m:sSubPr>
+                              <m:e>
+                                <m:r>
+                                  <a:rPr lang="en-US" altLang="zh-CN" b="0" i="1" smtClean="0">
+                                    <a:latin typeface="Cambria Math"/>
+                                    <a:sym typeface="Wingdings" pitchFamily="2" charset="2"/>
+                                  </a:rPr>
+                                  <m:t>𝑖</m:t>
+                                </m:r>
+                              </m:e>
+                              <m:sub>
+                                <m:r>
+                                  <a:rPr lang="en-US" altLang="zh-CN" b="0" i="1" smtClean="0">
+                                    <a:latin typeface="Cambria Math"/>
+                                    <a:sym typeface="Wingdings" pitchFamily="2" charset="2"/>
+                                  </a:rPr>
+                                  <m:t>𝑗</m:t>
+                                </m:r>
+                              </m:sub>
+                            </m:sSub>
+                            <m:r>
+                              <a:rPr lang="en-US" altLang="zh-CN" b="0" i="1" smtClean="0">
+                                <a:latin typeface="Cambria Math"/>
+                                <a:sym typeface="Wingdings" pitchFamily="2" charset="2"/>
+                              </a:rPr>
+                              <m:t>, </m:t>
+                            </m:r>
+                            <m:sSub>
+                              <m:sSubPr>
+                                <m:ctrlPr>
+                                  <a:rPr lang="en-US" altLang="zh-CN" b="0" i="1" smtClean="0">
+                                    <a:latin typeface="Cambria Math"/>
+                                    <a:sym typeface="Wingdings" pitchFamily="2" charset="2"/>
+                                  </a:rPr>
+                                </m:ctrlPr>
+                              </m:sSubPr>
+                              <m:e>
+                                <m:r>
+                                  <a:rPr lang="en-US" altLang="zh-CN" b="0" i="1" smtClean="0">
+                                    <a:latin typeface="Cambria Math"/>
+                                    <a:sym typeface="Wingdings" pitchFamily="2" charset="2"/>
+                                  </a:rPr>
+                                  <m:t>𝑖</m:t>
+                                </m:r>
+                              </m:e>
+                              <m:sub>
+                                <m:r>
+                                  <a:rPr lang="en-US" altLang="zh-CN" b="0" i="1" smtClean="0">
+                                    <a:latin typeface="Cambria Math"/>
+                                    <a:sym typeface="Wingdings" pitchFamily="2" charset="2"/>
+                                  </a:rPr>
+                                  <m:t>𝑘</m:t>
+                                </m:r>
+                              </m:sub>
+                            </m:sSub>
+                          </m:e>
+                        </m:d>
+                      </m:e>
+                    </m:d>
+                  </m:oMath>
+                </a14:m>
+                <a:r>
+                  <a:rPr lang="en-US" altLang="zh-CN" dirty="0" smtClean="0"/>
+                  <a:t> is not frequent</a:t>
+                </a:r>
+              </a:p>
+              <a:p>
+                <a:pPr lvl="1"/>
+                <a:r>
+                  <a:rPr lang="en-US" altLang="zh-CN" dirty="0" smtClean="0"/>
+                  <a:t>Remove </a:t>
+                </a:r>
+                <a14:m>
+                  <m:oMath xmlns:m="http://schemas.openxmlformats.org/officeDocument/2006/math">
+                    <m:sSub>
+                      <m:sSubPr>
+                        <m:ctrlPr>
+                          <a:rPr lang="en-US" altLang="zh-CN" b="0" i="1" smtClean="0">
+                            <a:latin typeface="Cambria Math"/>
+                          </a:rPr>
+                        </m:ctrlPr>
+                      </m:sSubPr>
+                      <m:e>
+                        <m:r>
+                          <a:rPr lang="en-US" altLang="zh-CN" b="0" i="1" smtClean="0">
+                            <a:latin typeface="Cambria Math"/>
+                          </a:rPr>
+                          <m:t>𝑖</m:t>
+                        </m:r>
+                      </m:e>
+                      <m:sub>
+                        <m:r>
+                          <a:rPr lang="en-US" altLang="zh-CN" b="0" i="1" smtClean="0">
+                            <a:latin typeface="Cambria Math"/>
+                          </a:rPr>
+                          <m:t>𝑘</m:t>
+                        </m:r>
+                      </m:sub>
+                    </m:sSub>
+                  </m:oMath>
+                </a14:m>
+                <a:r>
+                  <a:rPr lang="zh-CN" altLang="en-US" dirty="0" smtClean="0"/>
+                  <a:t> </a:t>
+                </a:r>
+                <a:r>
+                  <a:rPr lang="en-US" altLang="zh-CN" dirty="0" smtClean="0"/>
+                  <a:t>from </a:t>
+                </a:r>
+                <a14:m>
+                  <m:oMath xmlns:m="http://schemas.openxmlformats.org/officeDocument/2006/math">
+                    <m:sSub>
+                      <m:sSubPr>
+                        <m:ctrlPr>
+                          <a:rPr lang="en-US" altLang="zh-CN" b="0" i="1" smtClean="0">
+                            <a:latin typeface="Cambria Math"/>
+                          </a:rPr>
+                        </m:ctrlPr>
+                      </m:sSubPr>
+                      <m:e>
+                        <m:r>
+                          <a:rPr lang="en-US" altLang="zh-CN" b="0" i="1" smtClean="0">
+                            <a:latin typeface="Cambria Math"/>
+                          </a:rPr>
+                          <m:t>𝑆</m:t>
+                        </m:r>
+                      </m:e>
+                      <m:sub>
+                        <m:sSub>
+                          <m:sSubPr>
+                            <m:ctrlPr>
+                              <a:rPr lang="en-US" altLang="zh-CN" b="0" i="1" smtClean="0">
+                                <a:latin typeface="Cambria Math"/>
+                              </a:rPr>
+                            </m:ctrlPr>
+                          </m:sSubPr>
+                          <m:e>
+                            <m:r>
+                              <a:rPr lang="en-US" altLang="zh-CN" b="0" i="1" smtClean="0">
+                                <a:latin typeface="Cambria Math"/>
+                              </a:rPr>
+                              <m:t>𝑠</m:t>
+                            </m:r>
+                          </m:e>
+                          <m:sub>
+                            <m:r>
+                              <a:rPr lang="en-US" altLang="zh-CN" b="0" i="1" smtClean="0">
+                                <a:latin typeface="Cambria Math"/>
+                              </a:rPr>
+                              <m:t>𝑎</m:t>
+                            </m:r>
+                          </m:sub>
+                        </m:sSub>
+                      </m:sub>
+                    </m:sSub>
+                    <m:r>
+                      <a:rPr lang="en-US" altLang="zh-CN" b="0" i="1" smtClean="0">
+                        <a:latin typeface="Cambria Math"/>
+                      </a:rPr>
+                      <m:t> </m:t>
+                    </m:r>
+                    <m:r>
+                      <a:rPr lang="en-US" altLang="zh-CN" b="0" i="1" smtClean="0">
+                        <a:latin typeface="Cambria Math"/>
+                      </a:rPr>
+                      <m:t>𝑎𝑛𝑑</m:t>
+                    </m:r>
+                    <m:r>
+                      <a:rPr lang="en-US" altLang="zh-CN" b="0" i="1" smtClean="0">
+                        <a:latin typeface="Cambria Math"/>
+                      </a:rPr>
+                      <m:t> </m:t>
+                    </m:r>
+                    <m:sSub>
+                      <m:sSubPr>
+                        <m:ctrlPr>
+                          <a:rPr lang="en-US" altLang="zh-CN" b="0" i="1" smtClean="0">
+                            <a:latin typeface="Cambria Math"/>
+                          </a:rPr>
+                        </m:ctrlPr>
+                      </m:sSubPr>
+                      <m:e>
+                        <m:r>
+                          <a:rPr lang="en-US" altLang="zh-CN" b="0" i="1" smtClean="0">
+                            <a:latin typeface="Cambria Math"/>
+                          </a:rPr>
+                          <m:t>𝐼</m:t>
+                        </m:r>
+                      </m:e>
+                      <m:sub>
+                        <m:sSub>
+                          <m:sSubPr>
+                            <m:ctrlPr>
+                              <a:rPr lang="en-US" altLang="zh-CN" b="0" i="1" smtClean="0">
+                                <a:latin typeface="Cambria Math"/>
+                              </a:rPr>
+                            </m:ctrlPr>
+                          </m:sSubPr>
+                          <m:e>
+                            <m:r>
+                              <a:rPr lang="en-US" altLang="zh-CN" b="0" i="1" smtClean="0">
+                                <a:latin typeface="Cambria Math"/>
+                              </a:rPr>
+                              <m:t>𝑠</m:t>
+                            </m:r>
+                          </m:e>
+                          <m:sub>
+                            <m:r>
+                              <a:rPr lang="en-US" altLang="zh-CN" b="0" i="1" smtClean="0">
+                                <a:latin typeface="Cambria Math"/>
+                              </a:rPr>
+                              <m:t>𝑎</m:t>
+                            </m:r>
+                          </m:sub>
+                        </m:sSub>
+                      </m:sub>
+                    </m:sSub>
+                  </m:oMath>
+                </a14:m>
+                <a:endParaRPr lang="en-US" altLang="zh-CN" dirty="0" smtClean="0"/>
+              </a:p>
+              <a:p>
+                <a:r>
+                  <a:rPr lang="en-US" altLang="zh-CN" dirty="0" smtClean="0"/>
+                  <a:t>I-step pruning</a:t>
+                </a:r>
+              </a:p>
+              <a:p>
+                <a:pPr lvl="1"/>
+                <a:endParaRPr lang="zh-CN" altLang="en-US" dirty="0"/>
+              </a:p>
+            </p:txBody>
+          </p:sp>
+        </mc:Choice>
+        <mc:Fallback>
+          <p:sp>
+            <p:nvSpPr>
+              <p:cNvPr id="3" name="内容占位符 2"/>
+              <p:cNvSpPr>
+                <a:spLocks noGrp="1" noRot="1" noChangeAspect="1" noMove="1" noResize="1" noEditPoints="1" noAdjustHandles="1" noChangeArrowheads="1" noChangeShapeType="1" noTextEdit="1"/>
+              </p:cNvSpPr>
+              <p:nvPr>
+                <p:ph idx="1"/>
+              </p:nvPr>
+            </p:nvSpPr>
+            <p:spPr>
+              <a:blipFill rotWithShape="1">
+                <a:blip r:embed="rId2"/>
+                <a:stretch>
+                  <a:fillRect l="-479" t="-806"/>
+                </a:stretch>
+              </a:blipFill>
+            </p:spPr>
+            <p:txBody>
+              <a:bodyPr/>
+              <a:lstStyle/>
+              <a:p>
+                <a:r>
+                  <a:rPr lang="zh-CN" altLang="en-US">
+                    <a:noFill/>
+                  </a:rPr>
+                  <a:t> </a:t>
+                </a:r>
+              </a:p>
+            </p:txBody>
+          </p:sp>
+        </mc:Fallback>
+      </mc:AlternateContent>
+    </p:spTree>
+    <p:extLst>
+      <p:ext uri="{BB962C8B-B14F-4D97-AF65-F5344CB8AC3E}">
+        <p14:creationId xmlns:p14="http://schemas.microsoft.com/office/powerpoint/2010/main" val="3239876161"/>
+      </p:ext>
+    </p:extLst>
+  </p:cSld>
+  <p:clrMapOvr>
+    <a:masterClrMapping/>
+  </p:clrMapOvr>
 </p:sld>
 </file>
 
@@ -28205,7 +30238,7 @@
   <a:extraClrSchemeLst/>
   <a:extLst>
     <a:ext uri="{05A4C25C-085E-4340-85A3-A5531E510DB2}">
-      <thm15:themeFamily xmlns:thm15="http://schemas.microsoft.com/office/thememl/2012/main" xmlns="" name="Wisp" id="{7CB32D59-10C0-40DD-B7BD-2E94284A981C}" vid="{24B1A44C-C006-48B2-A4D7-E5549B3D8CD4}"/>
+      <thm15:themeFamily xmlns="" xmlns:thm15="http://schemas.microsoft.com/office/thememl/2012/main" name="Wisp" id="{7CB32D59-10C0-40DD-B7BD-2E94284A981C}" vid="{24B1A44C-C006-48B2-A4D7-E5549B3D8CD4}"/>
     </a:ext>
   </a:extLst>
 </a:theme>

</xml_diff>

<commit_message>
finish sequential pattern minning
</commit_message>
<xml_diff>
--- a/slide/tsdm.pptx
+++ b/slide/tsdm.pptx
@@ -46,6 +46,9 @@
     <p:sldId id="314" r:id="rId40"/>
     <p:sldId id="315" r:id="rId41"/>
     <p:sldId id="316" r:id="rId42"/>
+    <p:sldId id="317" r:id="rId43"/>
+    <p:sldId id="318" r:id="rId44"/>
+    <p:sldId id="319" r:id="rId45"/>
   </p:sldIdLst>
   <p:sldSz cx="12192000" cy="6858000"/>
   <p:notesSz cx="6858000" cy="9144000"/>
@@ -146,7 +149,7 @@
   </p:defaultTextStyle>
   <p:extLst>
     <p:ext uri="{EFAFB233-063F-42B5-8137-9DF3F51BA10A}">
-      <p15:sldGuideLst xmlns="" xmlns:p15="http://schemas.microsoft.com/office/powerpoint/2012/main"/>
+      <p15:sldGuideLst xmlns:p15="http://schemas.microsoft.com/office/powerpoint/2012/main" xmlns=""/>
     </p:ext>
   </p:extLst>
 </p:presentation>
@@ -26425,7 +26428,7 @@
           <a:graphicData uri="http://schemas.openxmlformats.org/presentationml/2006/ole">
             <mc:AlternateContent xmlns:mc="http://schemas.openxmlformats.org/markup-compatibility/2006">
               <mc:Choice xmlns:v="urn:schemas-microsoft-com:vml" Requires="v">
-                <p:oleObj spid="_x0000_s1040" name="點陣圖影像" r:id="rId3" imgW="4638095" imgH="2534004" progId="PBrush">
+                <p:oleObj spid="_x0000_s1048" name="點陣圖影像" r:id="rId3" imgW="4638095" imgH="2534004" progId="PBrush">
                   <p:embed/>
                 </p:oleObj>
               </mc:Choice>
@@ -26496,7 +26499,7 @@
           <a:graphicData uri="http://schemas.openxmlformats.org/presentationml/2006/ole">
             <mc:AlternateContent xmlns:mc="http://schemas.openxmlformats.org/markup-compatibility/2006">
               <mc:Choice xmlns:v="urn:schemas-microsoft-com:vml" Requires="v">
-                <p:oleObj spid="_x0000_s1041" name="BMP 图像" r:id="rId5" imgW="4381560" imgH="1305000" progId="Paint.Picture">
+                <p:oleObj spid="_x0000_s1049" name="BMP 图像" r:id="rId5" imgW="4381560" imgH="1305000" progId="Paint.Picture">
                   <p:embed/>
                 </p:oleObj>
               </mc:Choice>
@@ -27291,7 +27294,19 @@
             <a:pPr algn="ctr"/>
             <a:r>
               <a:rPr lang="en-US" altLang="zh-CN" dirty="0"/>
-              <a:t>Frequent subsequence mining</a:t>
+              <a:t>S</a:t>
+            </a:r>
+            <a:r>
+              <a:rPr lang="en-US" altLang="zh-CN" dirty="0" smtClean="0"/>
+              <a:t>equence </a:t>
+            </a:r>
+            <a:r>
+              <a:rPr lang="en-US" altLang="zh-CN" dirty="0"/>
+              <a:t>T</a:t>
+            </a:r>
+            <a:r>
+              <a:rPr lang="en-US" altLang="zh-CN" dirty="0" smtClean="0"/>
+              <a:t>ree </a:t>
             </a:r>
             <a:endParaRPr lang="zh-CN" altLang="en-US" dirty="0"/>
           </a:p>
@@ -27516,7 +27531,12 @@
                 <p:ph idx="1"/>
               </p:nvPr>
             </p:nvSpPr>
-            <p:spPr/>
+            <p:spPr>
+              <a:xfrm>
+                <a:off x="2589212" y="2133600"/>
+                <a:ext cx="8915400" cy="4152900"/>
+              </a:xfrm>
+            </p:spPr>
             <p:txBody>
               <a:bodyPr/>
               <a:lstStyle/>
@@ -27576,7 +27596,7 @@
                     <m:sSub>
                       <m:sSubPr>
                         <m:ctrlPr>
-                          <a:rPr lang="en-US" altLang="zh-CN" b="0" i="0" smtClean="0">
+                          <a:rPr lang="en-US" altLang="zh-CN" b="0" i="1" smtClean="0">
                             <a:latin typeface="Cambria Math"/>
                           </a:rPr>
                         </m:ctrlPr>
@@ -27618,7 +27638,15 @@
                 <a:pPr lvl="1"/>
                 <a:r>
                   <a:rPr lang="en-US" altLang="zh-CN" dirty="0" smtClean="0"/>
-                  <a:t>Sequence s and its s-extended sequence </a:t>
+                  <a:t>Sequence s and its </a:t>
+                </a:r>
+                <a:r>
+                  <a:rPr lang="en-US" altLang="zh-CN" dirty="0" smtClean="0"/>
+                  <a:t>S-Extended </a:t>
+                </a:r>
+                <a:r>
+                  <a:rPr lang="en-US" altLang="zh-CN" dirty="0" smtClean="0"/>
+                  <a:t>sequence </a:t>
                 </a:r>
                 <a14:m>
                   <m:oMath xmlns:m="http://schemas.openxmlformats.org/officeDocument/2006/math">
@@ -28305,6 +28333,899 @@
               </a:p>
               <a:p>
                 <a:pPr lvl="1"/>
+                <a:r>
+                  <a:rPr lang="en-US" altLang="zh-CN" dirty="0" smtClean="0"/>
+                  <a:t>Sequence </a:t>
+                </a:r>
+                <a14:m>
+                  <m:oMath xmlns:m="http://schemas.openxmlformats.org/officeDocument/2006/math">
+                    <m:r>
+                      <a:rPr lang="en-US" altLang="zh-CN" b="0" i="1" smtClean="0">
+                        <a:latin typeface="Cambria Math"/>
+                      </a:rPr>
+                      <m:t>𝑠</m:t>
+                    </m:r>
+                    <m:r>
+                      <a:rPr lang="en-US" altLang="zh-CN" b="0" i="1" smtClean="0">
+                        <a:latin typeface="Cambria Math"/>
+                      </a:rPr>
+                      <m:t>=</m:t>
+                    </m:r>
+                    <m:d>
+                      <m:dPr>
+                        <m:ctrlPr>
+                          <a:rPr lang="en-US" altLang="zh-CN" b="0" i="1" smtClean="0">
+                            <a:latin typeface="Cambria Math"/>
+                          </a:rPr>
+                        </m:ctrlPr>
+                      </m:dPr>
+                      <m:e>
+                        <m:sSup>
+                          <m:sSupPr>
+                            <m:ctrlPr>
+                              <a:rPr lang="en-US" altLang="zh-CN" b="0" i="1" smtClean="0">
+                                <a:latin typeface="Cambria Math"/>
+                              </a:rPr>
+                            </m:ctrlPr>
+                          </m:sSupPr>
+                          <m:e>
+                            <m:r>
+                              <a:rPr lang="en-US" altLang="zh-CN" b="0" i="1" smtClean="0">
+                                <a:latin typeface="Cambria Math"/>
+                              </a:rPr>
+                              <m:t>𝑠</m:t>
+                            </m:r>
+                          </m:e>
+                          <m:sup>
+                            <m:r>
+                              <a:rPr lang="en-US" altLang="zh-CN" b="0" i="1" smtClean="0">
+                                <a:latin typeface="Cambria Math"/>
+                              </a:rPr>
+                              <m:t>′</m:t>
+                            </m:r>
+                          </m:sup>
+                        </m:sSup>
+                        <m:r>
+                          <a:rPr lang="en-US" altLang="zh-CN" b="0" i="1" smtClean="0">
+                            <a:latin typeface="Cambria Math"/>
+                          </a:rPr>
+                          <m:t>,</m:t>
+                        </m:r>
+                        <m:d>
+                          <m:dPr>
+                            <m:begChr m:val="{"/>
+                            <m:endChr m:val="}"/>
+                            <m:ctrlPr>
+                              <a:rPr lang="en-US" altLang="zh-CN" b="0" i="1" smtClean="0">
+                                <a:latin typeface="Cambria Math"/>
+                              </a:rPr>
+                            </m:ctrlPr>
+                          </m:dPr>
+                          <m:e>
+                            <m:sSub>
+                              <m:sSubPr>
+                                <m:ctrlPr>
+                                  <a:rPr lang="en-US" altLang="zh-CN" b="0" i="1" smtClean="0">
+                                    <a:latin typeface="Cambria Math"/>
+                                  </a:rPr>
+                                </m:ctrlPr>
+                              </m:sSubPr>
+                              <m:e>
+                                <m:r>
+                                  <a:rPr lang="en-US" altLang="zh-CN" b="0" i="1" smtClean="0">
+                                    <a:latin typeface="Cambria Math"/>
+                                  </a:rPr>
+                                  <m:t>𝑖</m:t>
+                                </m:r>
+                              </m:e>
+                              <m:sub>
+                                <m:r>
+                                  <a:rPr lang="en-US" altLang="zh-CN" b="0" i="1" smtClean="0">
+                                    <a:latin typeface="Cambria Math"/>
+                                  </a:rPr>
+                                  <m:t>1</m:t>
+                                </m:r>
+                              </m:sub>
+                            </m:sSub>
+                            <m:r>
+                              <a:rPr lang="en-US" altLang="zh-CN" b="0" i="1" smtClean="0">
+                                <a:latin typeface="Cambria Math"/>
+                              </a:rPr>
+                              <m:t>,…,</m:t>
+                            </m:r>
+                            <m:sSub>
+                              <m:sSubPr>
+                                <m:ctrlPr>
+                                  <a:rPr lang="en-US" altLang="zh-CN" b="0" i="1" smtClean="0">
+                                    <a:latin typeface="Cambria Math"/>
+                                  </a:rPr>
+                                </m:ctrlPr>
+                              </m:sSubPr>
+                              <m:e>
+                                <m:r>
+                                  <a:rPr lang="en-US" altLang="zh-CN" b="0" i="1" smtClean="0">
+                                    <a:latin typeface="Cambria Math"/>
+                                  </a:rPr>
+                                  <m:t>𝑖</m:t>
+                                </m:r>
+                              </m:e>
+                              <m:sub>
+                                <m:r>
+                                  <a:rPr lang="en-US" altLang="zh-CN" b="0" i="1" smtClean="0">
+                                    <a:latin typeface="Cambria Math"/>
+                                  </a:rPr>
+                                  <m:t>𝑛</m:t>
+                                </m:r>
+                              </m:sub>
+                            </m:sSub>
+                          </m:e>
+                        </m:d>
+                      </m:e>
+                    </m:d>
+                  </m:oMath>
+                </a14:m>
+                <a:endParaRPr lang="en-US" altLang="zh-CN" b="0" dirty="0" smtClean="0"/>
+              </a:p>
+              <a:p>
+                <a:pPr lvl="1"/>
+                <a:r>
+                  <a:rPr lang="en-US" altLang="zh-CN" dirty="0" smtClean="0"/>
+                  <a:t>I-Extended sequence </a:t>
+                </a:r>
+                <a14:m>
+                  <m:oMath xmlns:m="http://schemas.openxmlformats.org/officeDocument/2006/math">
+                    <m:sSub>
+                      <m:sSubPr>
+                        <m:ctrlPr>
+                          <a:rPr lang="en-US" altLang="zh-CN" b="0" i="1" smtClean="0">
+                            <a:latin typeface="Cambria Math"/>
+                          </a:rPr>
+                        </m:ctrlPr>
+                      </m:sSubPr>
+                      <m:e>
+                        <m:r>
+                          <a:rPr lang="en-US" altLang="zh-CN" b="0" i="1" smtClean="0">
+                            <a:latin typeface="Cambria Math"/>
+                          </a:rPr>
+                          <m:t>𝑠</m:t>
+                        </m:r>
+                      </m:e>
+                      <m:sub>
+                        <m:r>
+                          <a:rPr lang="en-US" altLang="zh-CN" b="0" i="1" smtClean="0">
+                            <a:latin typeface="Cambria Math"/>
+                          </a:rPr>
+                          <m:t>𝑎</m:t>
+                        </m:r>
+                      </m:sub>
+                    </m:sSub>
+                    <m:r>
+                      <a:rPr lang="en-US" altLang="zh-CN" b="0" i="1" smtClean="0">
+                        <a:latin typeface="Cambria Math"/>
+                      </a:rPr>
+                      <m:t>=</m:t>
+                    </m:r>
+                    <m:d>
+                      <m:dPr>
+                        <m:ctrlPr>
+                          <a:rPr lang="en-US" altLang="zh-CN" b="0" i="1" smtClean="0">
+                            <a:latin typeface="Cambria Math"/>
+                          </a:rPr>
+                        </m:ctrlPr>
+                      </m:dPr>
+                      <m:e>
+                        <m:r>
+                          <a:rPr lang="en-US" altLang="zh-CN" b="0" i="1" smtClean="0">
+                            <a:latin typeface="Cambria Math"/>
+                          </a:rPr>
+                          <m:t>𝑠</m:t>
+                        </m:r>
+                        <m:r>
+                          <a:rPr lang="en-US" altLang="zh-CN" b="0" i="1" smtClean="0">
+                            <a:latin typeface="Cambria Math"/>
+                          </a:rPr>
+                          <m:t>′,</m:t>
+                        </m:r>
+                        <m:d>
+                          <m:dPr>
+                            <m:begChr m:val="{"/>
+                            <m:endChr m:val="}"/>
+                            <m:ctrlPr>
+                              <a:rPr lang="en-US" altLang="zh-CN" b="0" i="1" smtClean="0">
+                                <a:latin typeface="Cambria Math"/>
+                              </a:rPr>
+                            </m:ctrlPr>
+                          </m:dPr>
+                          <m:e>
+                            <m:sSub>
+                              <m:sSubPr>
+                                <m:ctrlPr>
+                                  <a:rPr lang="en-US" altLang="zh-CN" b="0" i="1" smtClean="0">
+                                    <a:latin typeface="Cambria Math"/>
+                                  </a:rPr>
+                                </m:ctrlPr>
+                              </m:sSubPr>
+                              <m:e>
+                                <m:r>
+                                  <a:rPr lang="en-US" altLang="zh-CN" b="0" i="1" smtClean="0">
+                                    <a:latin typeface="Cambria Math"/>
+                                  </a:rPr>
+                                  <m:t>𝑖</m:t>
+                                </m:r>
+                              </m:e>
+                              <m:sub>
+                                <m:r>
+                                  <a:rPr lang="en-US" altLang="zh-CN" b="0" i="1" smtClean="0">
+                                    <a:latin typeface="Cambria Math"/>
+                                  </a:rPr>
+                                  <m:t>1</m:t>
+                                </m:r>
+                              </m:sub>
+                            </m:sSub>
+                            <m:r>
+                              <a:rPr lang="en-US" altLang="zh-CN" b="0" i="1" smtClean="0">
+                                <a:latin typeface="Cambria Math"/>
+                              </a:rPr>
+                              <m:t>,…,</m:t>
+                            </m:r>
+                            <m:sSub>
+                              <m:sSubPr>
+                                <m:ctrlPr>
+                                  <a:rPr lang="en-US" altLang="zh-CN" b="0" i="1" smtClean="0">
+                                    <a:latin typeface="Cambria Math"/>
+                                  </a:rPr>
+                                </m:ctrlPr>
+                              </m:sSubPr>
+                              <m:e>
+                                <m:r>
+                                  <a:rPr lang="en-US" altLang="zh-CN" b="0" i="1" smtClean="0">
+                                    <a:latin typeface="Cambria Math"/>
+                                  </a:rPr>
+                                  <m:t>𝑖</m:t>
+                                </m:r>
+                              </m:e>
+                              <m:sub>
+                                <m:r>
+                                  <a:rPr lang="en-US" altLang="zh-CN" b="0" i="1" smtClean="0">
+                                    <a:latin typeface="Cambria Math"/>
+                                  </a:rPr>
+                                  <m:t>𝑛</m:t>
+                                </m:r>
+                              </m:sub>
+                            </m:sSub>
+                            <m:r>
+                              <a:rPr lang="en-US" altLang="zh-CN" b="0" i="1" smtClean="0">
+                                <a:latin typeface="Cambria Math"/>
+                              </a:rPr>
+                              <m:t>,</m:t>
+                            </m:r>
+                            <m:sSub>
+                              <m:sSubPr>
+                                <m:ctrlPr>
+                                  <a:rPr lang="en-US" altLang="zh-CN" b="0" i="1" smtClean="0">
+                                    <a:latin typeface="Cambria Math"/>
+                                  </a:rPr>
+                                </m:ctrlPr>
+                              </m:sSubPr>
+                              <m:e>
+                                <m:r>
+                                  <a:rPr lang="en-US" altLang="zh-CN" b="0" i="1" smtClean="0">
+                                    <a:latin typeface="Cambria Math"/>
+                                  </a:rPr>
+                                  <m:t>𝑖</m:t>
+                                </m:r>
+                              </m:e>
+                              <m:sub>
+                                <m:r>
+                                  <a:rPr lang="en-US" altLang="zh-CN" b="0" i="1" smtClean="0">
+                                    <a:latin typeface="Cambria Math"/>
+                                  </a:rPr>
+                                  <m:t>𝑗</m:t>
+                                </m:r>
+                              </m:sub>
+                            </m:sSub>
+                          </m:e>
+                        </m:d>
+                      </m:e>
+                    </m:d>
+                    <m:r>
+                      <a:rPr lang="en-US" altLang="zh-CN" b="0" i="1" smtClean="0">
+                        <a:latin typeface="Cambria Math"/>
+                      </a:rPr>
+                      <m:t> </m:t>
+                    </m:r>
+                    <m:r>
+                      <a:rPr lang="en-US" altLang="zh-CN" b="0" i="1" smtClean="0">
+                        <a:latin typeface="Cambria Math"/>
+                      </a:rPr>
+                      <m:t>𝑎𝑛𝑑</m:t>
+                    </m:r>
+                    <m:r>
+                      <a:rPr lang="en-US" altLang="zh-CN" b="0" i="1" smtClean="0">
+                        <a:latin typeface="Cambria Math"/>
+                      </a:rPr>
+                      <m:t> </m:t>
+                    </m:r>
+                    <m:sSub>
+                      <m:sSubPr>
+                        <m:ctrlPr>
+                          <a:rPr lang="en-US" altLang="zh-CN" b="0" i="1" smtClean="0">
+                            <a:latin typeface="Cambria Math"/>
+                          </a:rPr>
+                        </m:ctrlPr>
+                      </m:sSubPr>
+                      <m:e>
+                        <m:r>
+                          <a:rPr lang="en-US" altLang="zh-CN" b="0" i="1" smtClean="0">
+                            <a:latin typeface="Cambria Math"/>
+                          </a:rPr>
+                          <m:t>𝑠</m:t>
+                        </m:r>
+                      </m:e>
+                      <m:sub>
+                        <m:r>
+                          <a:rPr lang="en-US" altLang="zh-CN" b="0" i="1" smtClean="0">
+                            <a:latin typeface="Cambria Math"/>
+                          </a:rPr>
+                          <m:t>𝑏</m:t>
+                        </m:r>
+                      </m:sub>
+                    </m:sSub>
+                    <m:r>
+                      <a:rPr lang="en-US" altLang="zh-CN" b="0" i="1" smtClean="0">
+                        <a:latin typeface="Cambria Math"/>
+                      </a:rPr>
+                      <m:t>=(</m:t>
+                    </m:r>
+                    <m:sSup>
+                      <m:sSupPr>
+                        <m:ctrlPr>
+                          <a:rPr lang="en-US" altLang="zh-CN" b="0" i="1" smtClean="0">
+                            <a:latin typeface="Cambria Math"/>
+                          </a:rPr>
+                        </m:ctrlPr>
+                      </m:sSupPr>
+                      <m:e>
+                        <m:r>
+                          <a:rPr lang="en-US" altLang="zh-CN" b="0" i="1" smtClean="0">
+                            <a:latin typeface="Cambria Math"/>
+                          </a:rPr>
+                          <m:t>𝑠</m:t>
+                        </m:r>
+                      </m:e>
+                      <m:sup>
+                        <m:r>
+                          <a:rPr lang="en-US" altLang="zh-CN" b="0" i="1" smtClean="0">
+                            <a:latin typeface="Cambria Math"/>
+                          </a:rPr>
+                          <m:t>′</m:t>
+                        </m:r>
+                      </m:sup>
+                    </m:sSup>
+                    <m:r>
+                      <a:rPr lang="en-US" altLang="zh-CN" b="0" i="1" smtClean="0">
+                        <a:latin typeface="Cambria Math"/>
+                      </a:rPr>
+                      <m:t>,</m:t>
+                    </m:r>
+                    <m:d>
+                      <m:dPr>
+                        <m:begChr m:val="{"/>
+                        <m:endChr m:val="}"/>
+                        <m:ctrlPr>
+                          <a:rPr lang="en-US" altLang="zh-CN" b="0" i="1" smtClean="0">
+                            <a:latin typeface="Cambria Math"/>
+                          </a:rPr>
+                        </m:ctrlPr>
+                      </m:dPr>
+                      <m:e>
+                        <m:sSub>
+                          <m:sSubPr>
+                            <m:ctrlPr>
+                              <a:rPr lang="en-US" altLang="zh-CN" b="0" i="1" smtClean="0">
+                                <a:latin typeface="Cambria Math"/>
+                              </a:rPr>
+                            </m:ctrlPr>
+                          </m:sSubPr>
+                          <m:e>
+                            <m:r>
+                              <a:rPr lang="en-US" altLang="zh-CN" b="0" i="1" smtClean="0">
+                                <a:latin typeface="Cambria Math"/>
+                              </a:rPr>
+                              <m:t>𝑖</m:t>
+                            </m:r>
+                          </m:e>
+                          <m:sub>
+                            <m:r>
+                              <a:rPr lang="en-US" altLang="zh-CN" b="0" i="1" smtClean="0">
+                                <a:latin typeface="Cambria Math"/>
+                              </a:rPr>
+                              <m:t>1</m:t>
+                            </m:r>
+                          </m:sub>
+                        </m:sSub>
+                        <m:r>
+                          <a:rPr lang="en-US" altLang="zh-CN" b="0" i="1" smtClean="0">
+                            <a:latin typeface="Cambria Math"/>
+                          </a:rPr>
+                          <m:t>,…,</m:t>
+                        </m:r>
+                        <m:sSub>
+                          <m:sSubPr>
+                            <m:ctrlPr>
+                              <a:rPr lang="en-US" altLang="zh-CN" b="0" i="1" smtClean="0">
+                                <a:latin typeface="Cambria Math"/>
+                              </a:rPr>
+                            </m:ctrlPr>
+                          </m:sSubPr>
+                          <m:e>
+                            <m:r>
+                              <a:rPr lang="en-US" altLang="zh-CN" b="0" i="1" smtClean="0">
+                                <a:latin typeface="Cambria Math"/>
+                              </a:rPr>
+                              <m:t>𝑖</m:t>
+                            </m:r>
+                          </m:e>
+                          <m:sub>
+                            <m:r>
+                              <a:rPr lang="en-US" altLang="zh-CN" b="0" i="1" smtClean="0">
+                                <a:latin typeface="Cambria Math"/>
+                              </a:rPr>
+                              <m:t>𝑛</m:t>
+                            </m:r>
+                          </m:sub>
+                        </m:sSub>
+                        <m:r>
+                          <a:rPr lang="en-US" altLang="zh-CN" b="0" i="1" smtClean="0">
+                            <a:latin typeface="Cambria Math"/>
+                          </a:rPr>
+                          <m:t>,</m:t>
+                        </m:r>
+                        <m:sSub>
+                          <m:sSubPr>
+                            <m:ctrlPr>
+                              <a:rPr lang="en-US" altLang="zh-CN" b="0" i="1" smtClean="0">
+                                <a:latin typeface="Cambria Math"/>
+                              </a:rPr>
+                            </m:ctrlPr>
+                          </m:sSubPr>
+                          <m:e>
+                            <m:r>
+                              <a:rPr lang="en-US" altLang="zh-CN" b="0" i="1" smtClean="0">
+                                <a:latin typeface="Cambria Math"/>
+                              </a:rPr>
+                              <m:t>𝑖</m:t>
+                            </m:r>
+                          </m:e>
+                          <m:sub>
+                            <m:r>
+                              <a:rPr lang="en-US" altLang="zh-CN" b="0" i="1" smtClean="0">
+                                <a:latin typeface="Cambria Math"/>
+                              </a:rPr>
+                              <m:t>𝑘</m:t>
+                            </m:r>
+                          </m:sub>
+                        </m:sSub>
+                      </m:e>
+                    </m:d>
+                    <m:r>
+                      <a:rPr lang="en-US" altLang="zh-CN" b="0" i="1" smtClean="0">
+                        <a:latin typeface="Cambria Math"/>
+                      </a:rPr>
+                      <m:t>)</m:t>
+                    </m:r>
+                  </m:oMath>
+                </a14:m>
+                <a:r>
+                  <a:rPr lang="en-US" altLang="zh-CN" dirty="0" smtClean="0"/>
+                  <a:t>, </a:t>
+                </a:r>
+                <a14:m>
+                  <m:oMath xmlns:m="http://schemas.openxmlformats.org/officeDocument/2006/math">
+                    <m:sSub>
+                      <m:sSubPr>
+                        <m:ctrlPr>
+                          <a:rPr lang="en-US" altLang="zh-CN" b="0" i="1" dirty="0" smtClean="0">
+                            <a:latin typeface="Cambria Math"/>
+                          </a:rPr>
+                        </m:ctrlPr>
+                      </m:sSubPr>
+                      <m:e>
+                        <m:r>
+                          <a:rPr lang="en-US" altLang="zh-CN" b="0" i="1" dirty="0" smtClean="0">
+                            <a:latin typeface="Cambria Math"/>
+                          </a:rPr>
+                          <m:t>𝑖</m:t>
+                        </m:r>
+                      </m:e>
+                      <m:sub>
+                        <m:r>
+                          <a:rPr lang="en-US" altLang="zh-CN" b="0" i="1" dirty="0" smtClean="0">
+                            <a:latin typeface="Cambria Math"/>
+                          </a:rPr>
+                          <m:t>𝑗</m:t>
+                        </m:r>
+                      </m:sub>
+                    </m:sSub>
+                    <m:r>
+                      <a:rPr lang="en-US" altLang="zh-CN" b="0" i="1" dirty="0" smtClean="0">
+                        <a:latin typeface="Cambria Math"/>
+                      </a:rPr>
+                      <m:t>&lt;</m:t>
+                    </m:r>
+                    <m:sSub>
+                      <m:sSubPr>
+                        <m:ctrlPr>
+                          <a:rPr lang="en-US" altLang="zh-CN" b="0" i="1" dirty="0" smtClean="0">
+                            <a:latin typeface="Cambria Math"/>
+                          </a:rPr>
+                        </m:ctrlPr>
+                      </m:sSubPr>
+                      <m:e>
+                        <m:r>
+                          <a:rPr lang="en-US" altLang="zh-CN" b="0" i="1" dirty="0" smtClean="0">
+                            <a:latin typeface="Cambria Math"/>
+                          </a:rPr>
+                          <m:t>𝑖</m:t>
+                        </m:r>
+                      </m:e>
+                      <m:sub>
+                        <m:r>
+                          <a:rPr lang="en-US" altLang="zh-CN" b="0" i="1" dirty="0" smtClean="0">
+                            <a:latin typeface="Cambria Math"/>
+                          </a:rPr>
+                          <m:t>𝑘</m:t>
+                        </m:r>
+                      </m:sub>
+                    </m:sSub>
+                  </m:oMath>
+                </a14:m>
+                <a:endParaRPr lang="en-US" altLang="zh-CN" dirty="0" smtClean="0"/>
+              </a:p>
+              <a:p>
+                <a:pPr lvl="1"/>
+                <a14:m>
+                  <m:oMath xmlns:m="http://schemas.openxmlformats.org/officeDocument/2006/math">
+                    <m:sSub>
+                      <m:sSubPr>
+                        <m:ctrlPr>
+                          <a:rPr lang="en-US" altLang="zh-CN" i="1">
+                            <a:latin typeface="Cambria Math"/>
+                          </a:rPr>
+                        </m:ctrlPr>
+                      </m:sSubPr>
+                      <m:e>
+                        <m:r>
+                          <a:rPr lang="en-US" altLang="zh-CN" i="1">
+                            <a:latin typeface="Cambria Math"/>
+                          </a:rPr>
+                          <m:t>𝑠</m:t>
+                        </m:r>
+                      </m:e>
+                      <m:sub>
+                        <m:r>
+                          <a:rPr lang="en-US" altLang="zh-CN" i="1">
+                            <a:latin typeface="Cambria Math"/>
+                          </a:rPr>
+                          <m:t>𝑎</m:t>
+                        </m:r>
+                      </m:sub>
+                    </m:sSub>
+                  </m:oMath>
+                </a14:m>
+                <a:r>
+                  <a:rPr lang="zh-CN" altLang="en-US" dirty="0"/>
+                  <a:t> </a:t>
+                </a:r>
+                <a:r>
+                  <a:rPr lang="en-US" altLang="zh-CN" dirty="0"/>
+                  <a:t>is frequent and </a:t>
+                </a:r>
+                <a14:m>
+                  <m:oMath xmlns:m="http://schemas.openxmlformats.org/officeDocument/2006/math">
+                    <m:sSub>
+                      <m:sSubPr>
+                        <m:ctrlPr>
+                          <a:rPr lang="en-US" altLang="zh-CN" i="1">
+                            <a:latin typeface="Cambria Math"/>
+                          </a:rPr>
+                        </m:ctrlPr>
+                      </m:sSubPr>
+                      <m:e>
+                        <m:r>
+                          <a:rPr lang="en-US" altLang="zh-CN" i="1">
+                            <a:latin typeface="Cambria Math"/>
+                          </a:rPr>
+                          <m:t>𝑠</m:t>
+                        </m:r>
+                      </m:e>
+                      <m:sub>
+                        <m:r>
+                          <a:rPr lang="en-US" altLang="zh-CN" i="1">
+                            <a:latin typeface="Cambria Math"/>
+                          </a:rPr>
+                          <m:t>𝑏</m:t>
+                        </m:r>
+                      </m:sub>
+                    </m:sSub>
+                  </m:oMath>
+                </a14:m>
+                <a:r>
+                  <a:rPr lang="zh-CN" altLang="en-US" dirty="0"/>
+                  <a:t> </a:t>
+                </a:r>
+                <a:r>
+                  <a:rPr lang="en-US" altLang="zh-CN" dirty="0"/>
+                  <a:t>is not frequent</a:t>
+                </a:r>
+                <a:r>
+                  <a:rPr lang="en-US" altLang="zh-CN" dirty="0" smtClean="0">
+                    <a:sym typeface="Wingdings" pitchFamily="2" charset="2"/>
+                  </a:rPr>
+                  <a:t></a:t>
+                </a:r>
+                <a14:m>
+                  <m:oMath xmlns:m="http://schemas.openxmlformats.org/officeDocument/2006/math">
+                    <m:d>
+                      <m:dPr>
+                        <m:ctrlPr>
+                          <a:rPr lang="en-US" altLang="zh-CN" i="1">
+                            <a:latin typeface="Cambria Math"/>
+                          </a:rPr>
+                        </m:ctrlPr>
+                      </m:dPr>
+                      <m:e>
+                        <m:r>
+                          <a:rPr lang="en-US" altLang="zh-CN" i="1">
+                            <a:latin typeface="Cambria Math"/>
+                          </a:rPr>
+                          <m:t>𝑠</m:t>
+                        </m:r>
+                        <m:r>
+                          <a:rPr lang="en-US" altLang="zh-CN" i="1">
+                            <a:latin typeface="Cambria Math"/>
+                          </a:rPr>
+                          <m:t>′,</m:t>
+                        </m:r>
+                        <m:d>
+                          <m:dPr>
+                            <m:begChr m:val="{"/>
+                            <m:endChr m:val="}"/>
+                            <m:ctrlPr>
+                              <a:rPr lang="en-US" altLang="zh-CN" i="1">
+                                <a:latin typeface="Cambria Math"/>
+                              </a:rPr>
+                            </m:ctrlPr>
+                          </m:dPr>
+                          <m:e>
+                            <m:sSub>
+                              <m:sSubPr>
+                                <m:ctrlPr>
+                                  <a:rPr lang="en-US" altLang="zh-CN" i="1">
+                                    <a:latin typeface="Cambria Math"/>
+                                  </a:rPr>
+                                </m:ctrlPr>
+                              </m:sSubPr>
+                              <m:e>
+                                <m:r>
+                                  <a:rPr lang="en-US" altLang="zh-CN" i="1">
+                                    <a:latin typeface="Cambria Math"/>
+                                  </a:rPr>
+                                  <m:t>𝑖</m:t>
+                                </m:r>
+                              </m:e>
+                              <m:sub>
+                                <m:r>
+                                  <a:rPr lang="en-US" altLang="zh-CN" i="1">
+                                    <a:latin typeface="Cambria Math"/>
+                                  </a:rPr>
+                                  <m:t>1</m:t>
+                                </m:r>
+                              </m:sub>
+                            </m:sSub>
+                            <m:r>
+                              <a:rPr lang="en-US" altLang="zh-CN" i="1">
+                                <a:latin typeface="Cambria Math"/>
+                              </a:rPr>
+                              <m:t>,…,</m:t>
+                            </m:r>
+                            <m:sSub>
+                              <m:sSubPr>
+                                <m:ctrlPr>
+                                  <a:rPr lang="en-US" altLang="zh-CN" i="1">
+                                    <a:latin typeface="Cambria Math"/>
+                                  </a:rPr>
+                                </m:ctrlPr>
+                              </m:sSubPr>
+                              <m:e>
+                                <m:r>
+                                  <a:rPr lang="en-US" altLang="zh-CN" i="1">
+                                    <a:latin typeface="Cambria Math"/>
+                                  </a:rPr>
+                                  <m:t>𝑖</m:t>
+                                </m:r>
+                              </m:e>
+                              <m:sub>
+                                <m:r>
+                                  <a:rPr lang="en-US" altLang="zh-CN" i="1">
+                                    <a:latin typeface="Cambria Math"/>
+                                  </a:rPr>
+                                  <m:t>𝑛</m:t>
+                                </m:r>
+                              </m:sub>
+                            </m:sSub>
+                            <m:r>
+                              <a:rPr lang="en-US" altLang="zh-CN" i="1">
+                                <a:latin typeface="Cambria Math"/>
+                              </a:rPr>
+                              <m:t>,</m:t>
+                            </m:r>
+                            <m:sSub>
+                              <m:sSubPr>
+                                <m:ctrlPr>
+                                  <a:rPr lang="en-US" altLang="zh-CN" i="1">
+                                    <a:latin typeface="Cambria Math"/>
+                                  </a:rPr>
+                                </m:ctrlPr>
+                              </m:sSubPr>
+                              <m:e>
+                                <m:r>
+                                  <a:rPr lang="en-US" altLang="zh-CN" i="1">
+                                    <a:latin typeface="Cambria Math"/>
+                                  </a:rPr>
+                                  <m:t>𝑖</m:t>
+                                </m:r>
+                              </m:e>
+                              <m:sub>
+                                <m:r>
+                                  <a:rPr lang="en-US" altLang="zh-CN" i="1">
+                                    <a:latin typeface="Cambria Math"/>
+                                  </a:rPr>
+                                  <m:t>𝑗</m:t>
+                                </m:r>
+                              </m:sub>
+                            </m:sSub>
+                            <m:r>
+                              <a:rPr lang="en-US" altLang="zh-CN" b="0" i="1" smtClean="0">
+                                <a:latin typeface="Cambria Math"/>
+                              </a:rPr>
+                              <m:t>,</m:t>
+                            </m:r>
+                            <m:sSub>
+                              <m:sSubPr>
+                                <m:ctrlPr>
+                                  <a:rPr lang="en-US" altLang="zh-CN" b="0" i="1" smtClean="0">
+                                    <a:latin typeface="Cambria Math"/>
+                                  </a:rPr>
+                                </m:ctrlPr>
+                              </m:sSubPr>
+                              <m:e>
+                                <m:r>
+                                  <a:rPr lang="en-US" altLang="zh-CN" b="0" i="1" smtClean="0">
+                                    <a:latin typeface="Cambria Math"/>
+                                  </a:rPr>
+                                  <m:t>𝑖</m:t>
+                                </m:r>
+                              </m:e>
+                              <m:sub>
+                                <m:r>
+                                  <a:rPr lang="en-US" altLang="zh-CN" b="0" i="1" smtClean="0">
+                                    <a:latin typeface="Cambria Math"/>
+                                  </a:rPr>
+                                  <m:t>𝑘</m:t>
+                                </m:r>
+                              </m:sub>
+                            </m:sSub>
+                          </m:e>
+                        </m:d>
+                      </m:e>
+                    </m:d>
+                  </m:oMath>
+                </a14:m>
+                <a:r>
+                  <a:rPr lang="zh-CN" altLang="en-US" dirty="0" smtClean="0"/>
+                  <a:t> </a:t>
+                </a:r>
+                <a:r>
+                  <a:rPr lang="en-US" altLang="zh-CN" dirty="0" smtClean="0"/>
+                  <a:t>is not frequent</a:t>
+                </a:r>
+              </a:p>
+              <a:p>
+                <a:pPr lvl="1"/>
+                <a:r>
+                  <a:rPr lang="en-US" altLang="zh-CN" dirty="0"/>
+                  <a:t>Remove </a:t>
+                </a:r>
+                <a14:m>
+                  <m:oMath xmlns:m="http://schemas.openxmlformats.org/officeDocument/2006/math">
+                    <m:sSub>
+                      <m:sSubPr>
+                        <m:ctrlPr>
+                          <a:rPr lang="en-US" altLang="zh-CN" i="1">
+                            <a:latin typeface="Cambria Math"/>
+                          </a:rPr>
+                        </m:ctrlPr>
+                      </m:sSubPr>
+                      <m:e>
+                        <m:r>
+                          <a:rPr lang="en-US" altLang="zh-CN" i="1">
+                            <a:latin typeface="Cambria Math"/>
+                          </a:rPr>
+                          <m:t>𝑖</m:t>
+                        </m:r>
+                      </m:e>
+                      <m:sub>
+                        <m:r>
+                          <a:rPr lang="en-US" altLang="zh-CN" i="1">
+                            <a:latin typeface="Cambria Math"/>
+                          </a:rPr>
+                          <m:t>𝑘</m:t>
+                        </m:r>
+                      </m:sub>
+                    </m:sSub>
+                  </m:oMath>
+                </a14:m>
+                <a:r>
+                  <a:rPr lang="zh-CN" altLang="en-US" dirty="0"/>
+                  <a:t> </a:t>
+                </a:r>
+                <a:r>
+                  <a:rPr lang="en-US" altLang="zh-CN" dirty="0"/>
+                  <a:t>from </a:t>
+                </a:r>
+                <a14:m>
+                  <m:oMath xmlns:m="http://schemas.openxmlformats.org/officeDocument/2006/math">
+                    <m:sSub>
+                      <m:sSubPr>
+                        <m:ctrlPr>
+                          <a:rPr lang="en-US" altLang="zh-CN" i="1">
+                            <a:latin typeface="Cambria Math"/>
+                          </a:rPr>
+                        </m:ctrlPr>
+                      </m:sSubPr>
+                      <m:e>
+                        <m:r>
+                          <a:rPr lang="en-US" altLang="zh-CN" b="0" i="1" smtClean="0">
+                            <a:latin typeface="Cambria Math"/>
+                          </a:rPr>
+                          <m:t>𝐼</m:t>
+                        </m:r>
+                      </m:e>
+                      <m:sub>
+                        <m:sSub>
+                          <m:sSubPr>
+                            <m:ctrlPr>
+                              <a:rPr lang="en-US" altLang="zh-CN" i="1">
+                                <a:latin typeface="Cambria Math"/>
+                              </a:rPr>
+                            </m:ctrlPr>
+                          </m:sSubPr>
+                          <m:e>
+                            <m:r>
+                              <a:rPr lang="en-US" altLang="zh-CN" i="1">
+                                <a:latin typeface="Cambria Math"/>
+                              </a:rPr>
+                              <m:t>𝑠</m:t>
+                            </m:r>
+                          </m:e>
+                          <m:sub>
+                            <m:r>
+                              <a:rPr lang="en-US" altLang="zh-CN" i="1">
+                                <a:latin typeface="Cambria Math"/>
+                              </a:rPr>
+                              <m:t>𝑎</m:t>
+                            </m:r>
+                          </m:sub>
+                        </m:sSub>
+                      </m:sub>
+                    </m:sSub>
+                  </m:oMath>
+                </a14:m>
+                <a:endParaRPr lang="en-US" altLang="zh-CN" dirty="0"/>
+              </a:p>
+              <a:p>
+                <a:pPr lvl="1"/>
                 <a:endParaRPr lang="zh-CN" altLang="en-US" dirty="0"/>
               </a:p>
             </p:txBody>
@@ -28322,10 +29243,14 @@
               </p:nvPr>
             </p:nvSpPr>
             <p:spPr>
+              <a:xfrm>
+                <a:off x="2589212" y="2133600"/>
+                <a:ext cx="8915400" cy="4152900"/>
+              </a:xfrm>
               <a:blipFill rotWithShape="1">
                 <a:blip r:embed="rId2"/>
                 <a:stretch>
-                  <a:fillRect l="-479" t="-806"/>
+                  <a:fillRect l="-479" t="-734"/>
                 </a:stretch>
               </a:blipFill>
             </p:spPr>
@@ -28348,6 +29273,579 @@
     <p:extLst>
       <p:ext uri="{BB962C8B-B14F-4D97-AF65-F5344CB8AC3E}">
         <p14:creationId xmlns:p14="http://schemas.microsoft.com/office/powerpoint/2010/main" val="3239876161"/>
+      </p:ext>
+    </p:extLst>
+  </p:cSld>
+  <p:clrMapOvr>
+    <a:masterClrMapping/>
+  </p:clrMapOvr>
+  <p:timing>
+    <p:tnLst>
+      <p:par>
+        <p:cTn id="1" dur="indefinite" restart="never" nodeType="tmRoot"/>
+      </p:par>
+    </p:tnLst>
+  </p:timing>
+</p:sld>
+</file>
+
+<file path=ppt/slides/slide42.xml><?xml version="1.0" encoding="utf-8"?>
+<p:sld xmlns:a="http://schemas.openxmlformats.org/drawingml/2006/main" xmlns:r="http://schemas.openxmlformats.org/officeDocument/2006/relationships" xmlns:p="http://schemas.openxmlformats.org/presentationml/2006/main">
+  <p:cSld>
+    <p:spTree>
+      <p:nvGrpSpPr>
+        <p:cNvPr id="1" name=""/>
+        <p:cNvGrpSpPr/>
+        <p:nvPr/>
+      </p:nvGrpSpPr>
+      <p:grpSpPr>
+        <a:xfrm>
+          <a:off x="0" y="0"/>
+          <a:ext cx="0" cy="0"/>
+          <a:chOff x="0" y="0"/>
+          <a:chExt cx="0" cy="0"/>
+        </a:xfrm>
+      </p:grpSpPr>
+      <p:sp>
+        <p:nvSpPr>
+          <p:cNvPr id="2" name="标题 1"/>
+          <p:cNvSpPr>
+            <a:spLocks noGrp="1"/>
+          </p:cNvSpPr>
+          <p:nvPr>
+            <p:ph type="title"/>
+          </p:nvPr>
+        </p:nvSpPr>
+        <p:spPr/>
+        <p:txBody>
+          <a:bodyPr/>
+          <a:lstStyle/>
+          <a:p>
+            <a:pPr algn="ctr"/>
+            <a:r>
+              <a:rPr lang="en-US" altLang="zh-CN" dirty="0" smtClean="0"/>
+              <a:t>DFS-Pruning Algorithm</a:t>
+            </a:r>
+            <a:endParaRPr lang="zh-CN" altLang="en-US" dirty="0"/>
+          </a:p>
+        </p:txBody>
+      </p:sp>
+      <p:sp>
+        <p:nvSpPr>
+          <p:cNvPr id="3" name="内容占位符 2"/>
+          <p:cNvSpPr>
+            <a:spLocks noGrp="1"/>
+          </p:cNvSpPr>
+          <p:nvPr>
+            <p:ph idx="1"/>
+          </p:nvPr>
+        </p:nvSpPr>
+        <p:spPr/>
+        <p:txBody>
+          <a:bodyPr/>
+          <a:lstStyle/>
+          <a:p>
+            <a:r>
+              <a:rPr lang="en-US" altLang="zh-CN" dirty="0" smtClean="0"/>
+              <a:t>DFS-Pruning Algorithm</a:t>
+            </a:r>
+            <a:endParaRPr lang="zh-CN" altLang="en-US" dirty="0"/>
+          </a:p>
+        </p:txBody>
+      </p:sp>
+      <p:pic>
+        <p:nvPicPr>
+          <p:cNvPr id="2050" name="Picture 2"/>
+          <p:cNvPicPr>
+            <a:picLocks noChangeAspect="1" noChangeArrowheads="1"/>
+          </p:cNvPicPr>
+          <p:nvPr/>
+        </p:nvPicPr>
+        <p:blipFill>
+          <a:blip r:embed="rId2">
+            <a:extLst>
+              <a:ext uri="{28A0092B-C50C-407E-A947-70E740481C1C}">
+                <a14:useLocalDpi xmlns:a14="http://schemas.microsoft.com/office/drawing/2010/main" val="0"/>
+              </a:ext>
+            </a:extLst>
+          </a:blip>
+          <a:srcRect/>
+          <a:stretch>
+            <a:fillRect/>
+          </a:stretch>
+        </p:blipFill>
+        <p:spPr bwMode="auto">
+          <a:xfrm>
+            <a:off x="4058017" y="2677623"/>
+            <a:ext cx="5324475" cy="3876675"/>
+          </a:xfrm>
+          <a:prstGeom prst="rect">
+            <a:avLst/>
+          </a:prstGeom>
+          <a:noFill/>
+          <a:ln>
+            <a:noFill/>
+          </a:ln>
+          <a:extLst>
+            <a:ext uri="{909E8E84-426E-40DD-AFC4-6F175D3DCCD1}">
+              <a14:hiddenFill xmlns:a14="http://schemas.microsoft.com/office/drawing/2010/main">
+                <a:solidFill>
+                  <a:schemeClr val="accent1"/>
+                </a:solidFill>
+              </a14:hiddenFill>
+            </a:ext>
+            <a:ext uri="{91240B29-F687-4F45-9708-019B960494DF}">
+              <a14:hiddenLine xmlns:a14="http://schemas.microsoft.com/office/drawing/2010/main" w="9525">
+                <a:solidFill>
+                  <a:schemeClr val="tx1"/>
+                </a:solidFill>
+                <a:miter lim="800000"/>
+                <a:headEnd/>
+                <a:tailEnd/>
+              </a14:hiddenLine>
+            </a:ext>
+          </a:extLst>
+        </p:spPr>
+      </p:pic>
+    </p:spTree>
+    <p:extLst>
+      <p:ext uri="{BB962C8B-B14F-4D97-AF65-F5344CB8AC3E}">
+        <p14:creationId xmlns:p14="http://schemas.microsoft.com/office/powerpoint/2010/main" val="594666995"/>
+      </p:ext>
+    </p:extLst>
+  </p:cSld>
+  <p:clrMapOvr>
+    <a:masterClrMapping/>
+  </p:clrMapOvr>
+  <p:timing>
+    <p:tnLst>
+      <p:par>
+        <p:cTn id="1" dur="indefinite" restart="never" nodeType="tmRoot"/>
+      </p:par>
+    </p:tnLst>
+  </p:timing>
+</p:sld>
+</file>
+
+<file path=ppt/slides/slide43.xml><?xml version="1.0" encoding="utf-8"?>
+<p:sld xmlns:a="http://schemas.openxmlformats.org/drawingml/2006/main" xmlns:r="http://schemas.openxmlformats.org/officeDocument/2006/relationships" xmlns:p="http://schemas.openxmlformats.org/presentationml/2006/main">
+  <p:cSld>
+    <p:spTree>
+      <p:nvGrpSpPr>
+        <p:cNvPr id="1" name=""/>
+        <p:cNvGrpSpPr/>
+        <p:nvPr/>
+      </p:nvGrpSpPr>
+      <p:grpSpPr>
+        <a:xfrm>
+          <a:off x="0" y="0"/>
+          <a:ext cx="0" cy="0"/>
+          <a:chOff x="0" y="0"/>
+          <a:chExt cx="0" cy="0"/>
+        </a:xfrm>
+      </p:grpSpPr>
+      <p:sp>
+        <p:nvSpPr>
+          <p:cNvPr id="2" name="标题 1"/>
+          <p:cNvSpPr>
+            <a:spLocks noGrp="1"/>
+          </p:cNvSpPr>
+          <p:nvPr>
+            <p:ph type="title"/>
+          </p:nvPr>
+        </p:nvSpPr>
+        <p:spPr/>
+        <p:txBody>
+          <a:bodyPr/>
+          <a:lstStyle/>
+          <a:p>
+            <a:pPr algn="ctr"/>
+            <a:r>
+              <a:rPr lang="en-US" altLang="zh-CN" dirty="0" smtClean="0"/>
+              <a:t>How to count frequency</a:t>
+            </a:r>
+            <a:r>
+              <a:rPr lang="zh-CN" altLang="en-US" dirty="0" smtClean="0"/>
+              <a:t>？</a:t>
+            </a:r>
+            <a:endParaRPr lang="zh-CN" altLang="en-US" dirty="0"/>
+          </a:p>
+        </p:txBody>
+      </p:sp>
+      <p:sp>
+        <p:nvSpPr>
+          <p:cNvPr id="3" name="内容占位符 2"/>
+          <p:cNvSpPr>
+            <a:spLocks noGrp="1"/>
+          </p:cNvSpPr>
+          <p:nvPr>
+            <p:ph idx="1"/>
+          </p:nvPr>
+        </p:nvSpPr>
+        <p:spPr/>
+        <p:txBody>
+          <a:bodyPr/>
+          <a:lstStyle/>
+          <a:p>
+            <a:r>
+              <a:rPr lang="en-US" altLang="zh-CN" dirty="0" smtClean="0"/>
+              <a:t>Sequence bitmap, last item set indicator</a:t>
+            </a:r>
+            <a:endParaRPr lang="zh-CN" altLang="en-US" dirty="0"/>
+          </a:p>
+        </p:txBody>
+      </p:sp>
+      <p:pic>
+        <p:nvPicPr>
+          <p:cNvPr id="3074" name="Picture 2"/>
+          <p:cNvPicPr>
+            <a:picLocks noChangeAspect="1" noChangeArrowheads="1"/>
+          </p:cNvPicPr>
+          <p:nvPr/>
+        </p:nvPicPr>
+        <p:blipFill>
+          <a:blip r:embed="rId2">
+            <a:extLst>
+              <a:ext uri="{28A0092B-C50C-407E-A947-70E740481C1C}">
+                <a14:useLocalDpi xmlns:a14="http://schemas.microsoft.com/office/drawing/2010/main" val="0"/>
+              </a:ext>
+            </a:extLst>
+          </a:blip>
+          <a:srcRect/>
+          <a:stretch>
+            <a:fillRect/>
+          </a:stretch>
+        </p:blipFill>
+        <p:spPr bwMode="auto">
+          <a:xfrm>
+            <a:off x="2896699" y="2544641"/>
+            <a:ext cx="4429125" cy="3562350"/>
+          </a:xfrm>
+          <a:prstGeom prst="rect">
+            <a:avLst/>
+          </a:prstGeom>
+          <a:noFill/>
+          <a:ln>
+            <a:noFill/>
+          </a:ln>
+          <a:extLst>
+            <a:ext uri="{909E8E84-426E-40DD-AFC4-6F175D3DCCD1}">
+              <a14:hiddenFill xmlns:a14="http://schemas.microsoft.com/office/drawing/2010/main">
+                <a:solidFill>
+                  <a:schemeClr val="accent1"/>
+                </a:solidFill>
+              </a14:hiddenFill>
+            </a:ext>
+            <a:ext uri="{91240B29-F687-4F45-9708-019B960494DF}">
+              <a14:hiddenLine xmlns:a14="http://schemas.microsoft.com/office/drawing/2010/main" w="9525">
+                <a:solidFill>
+                  <a:schemeClr val="tx1"/>
+                </a:solidFill>
+                <a:miter lim="800000"/>
+                <a:headEnd/>
+                <a:tailEnd/>
+              </a14:hiddenLine>
+            </a:ext>
+          </a:extLst>
+        </p:spPr>
+      </p:pic>
+      <p:pic>
+        <p:nvPicPr>
+          <p:cNvPr id="3076" name="Picture 4"/>
+          <p:cNvPicPr>
+            <a:picLocks noChangeAspect="1" noChangeArrowheads="1"/>
+          </p:cNvPicPr>
+          <p:nvPr/>
+        </p:nvPicPr>
+        <p:blipFill>
+          <a:blip r:embed="rId3">
+            <a:extLst>
+              <a:ext uri="{28A0092B-C50C-407E-A947-70E740481C1C}">
+                <a14:useLocalDpi xmlns:a14="http://schemas.microsoft.com/office/drawing/2010/main" val="0"/>
+              </a:ext>
+            </a:extLst>
+          </a:blip>
+          <a:srcRect/>
+          <a:stretch>
+            <a:fillRect/>
+          </a:stretch>
+        </p:blipFill>
+        <p:spPr bwMode="auto">
+          <a:xfrm>
+            <a:off x="7563583" y="3183185"/>
+            <a:ext cx="1162050" cy="2847975"/>
+          </a:xfrm>
+          <a:prstGeom prst="rect">
+            <a:avLst/>
+          </a:prstGeom>
+          <a:noFill/>
+          <a:ln>
+            <a:noFill/>
+          </a:ln>
+          <a:extLst>
+            <a:ext uri="{909E8E84-426E-40DD-AFC4-6F175D3DCCD1}">
+              <a14:hiddenFill xmlns:a14="http://schemas.microsoft.com/office/drawing/2010/main">
+                <a:solidFill>
+                  <a:schemeClr val="accent1"/>
+                </a:solidFill>
+              </a14:hiddenFill>
+            </a:ext>
+            <a:ext uri="{91240B29-F687-4F45-9708-019B960494DF}">
+              <a14:hiddenLine xmlns:a14="http://schemas.microsoft.com/office/drawing/2010/main" w="9525">
+                <a:solidFill>
+                  <a:schemeClr val="tx1"/>
+                </a:solidFill>
+                <a:miter lim="800000"/>
+                <a:headEnd/>
+                <a:tailEnd/>
+              </a14:hiddenLine>
+            </a:ext>
+          </a:extLst>
+        </p:spPr>
+      </p:pic>
+      <p:pic>
+        <p:nvPicPr>
+          <p:cNvPr id="3077" name="Picture 5"/>
+          <p:cNvPicPr>
+            <a:picLocks noChangeAspect="1" noChangeArrowheads="1"/>
+          </p:cNvPicPr>
+          <p:nvPr/>
+        </p:nvPicPr>
+        <p:blipFill>
+          <a:blip r:embed="rId4">
+            <a:extLst>
+              <a:ext uri="{28A0092B-C50C-407E-A947-70E740481C1C}">
+                <a14:useLocalDpi xmlns:a14="http://schemas.microsoft.com/office/drawing/2010/main" val="0"/>
+              </a:ext>
+            </a:extLst>
+          </a:blip>
+          <a:srcRect/>
+          <a:stretch>
+            <a:fillRect/>
+          </a:stretch>
+        </p:blipFill>
+        <p:spPr bwMode="auto">
+          <a:xfrm>
+            <a:off x="7470897" y="2661138"/>
+            <a:ext cx="1171575" cy="304800"/>
+          </a:xfrm>
+          <a:prstGeom prst="rect">
+            <a:avLst/>
+          </a:prstGeom>
+          <a:noFill/>
+          <a:ln>
+            <a:noFill/>
+          </a:ln>
+          <a:extLst>
+            <a:ext uri="{909E8E84-426E-40DD-AFC4-6F175D3DCCD1}">
+              <a14:hiddenFill xmlns:a14="http://schemas.microsoft.com/office/drawing/2010/main">
+                <a:solidFill>
+                  <a:schemeClr val="accent1"/>
+                </a:solidFill>
+              </a14:hiddenFill>
+            </a:ext>
+            <a:ext uri="{91240B29-F687-4F45-9708-019B960494DF}">
+              <a14:hiddenLine xmlns:a14="http://schemas.microsoft.com/office/drawing/2010/main" w="9525">
+                <a:solidFill>
+                  <a:schemeClr val="tx1"/>
+                </a:solidFill>
+                <a:miter lim="800000"/>
+                <a:headEnd/>
+                <a:tailEnd/>
+              </a14:hiddenLine>
+            </a:ext>
+          </a:extLst>
+        </p:spPr>
+      </p:pic>
+    </p:spTree>
+    <p:extLst>
+      <p:ext uri="{BB962C8B-B14F-4D97-AF65-F5344CB8AC3E}">
+        <p14:creationId xmlns:p14="http://schemas.microsoft.com/office/powerpoint/2010/main" val="4219742268"/>
+      </p:ext>
+    </p:extLst>
+  </p:cSld>
+  <p:clrMapOvr>
+    <a:masterClrMapping/>
+  </p:clrMapOvr>
+</p:sld>
+</file>
+
+<file path=ppt/slides/slide44.xml><?xml version="1.0" encoding="utf-8"?>
+<p:sld xmlns:a="http://schemas.openxmlformats.org/drawingml/2006/main" xmlns:r="http://schemas.openxmlformats.org/officeDocument/2006/relationships" xmlns:p="http://schemas.openxmlformats.org/presentationml/2006/main">
+  <p:cSld>
+    <p:spTree>
+      <p:nvGrpSpPr>
+        <p:cNvPr id="1" name=""/>
+        <p:cNvGrpSpPr/>
+        <p:nvPr/>
+      </p:nvGrpSpPr>
+      <p:grpSpPr>
+        <a:xfrm>
+          <a:off x="0" y="0"/>
+          <a:ext cx="0" cy="0"/>
+          <a:chOff x="0" y="0"/>
+          <a:chExt cx="0" cy="0"/>
+        </a:xfrm>
+      </p:grpSpPr>
+      <p:sp>
+        <p:nvSpPr>
+          <p:cNvPr id="2" name="标题 1"/>
+          <p:cNvSpPr>
+            <a:spLocks noGrp="1"/>
+          </p:cNvSpPr>
+          <p:nvPr>
+            <p:ph type="title"/>
+          </p:nvPr>
+        </p:nvSpPr>
+        <p:spPr/>
+        <p:txBody>
+          <a:bodyPr/>
+          <a:lstStyle/>
+          <a:p>
+            <a:pPr algn="ctr"/>
+            <a:r>
+              <a:rPr lang="en-US" altLang="zh-CN" dirty="0" smtClean="0"/>
+              <a:t>Bitmap Counting</a:t>
+            </a:r>
+            <a:endParaRPr lang="zh-CN" altLang="en-US" dirty="0"/>
+          </a:p>
+        </p:txBody>
+      </p:sp>
+      <p:sp>
+        <p:nvSpPr>
+          <p:cNvPr id="3" name="内容占位符 2"/>
+          <p:cNvSpPr>
+            <a:spLocks noGrp="1"/>
+          </p:cNvSpPr>
+          <p:nvPr>
+            <p:ph idx="1"/>
+          </p:nvPr>
+        </p:nvSpPr>
+        <p:spPr/>
+        <p:txBody>
+          <a:bodyPr/>
+          <a:lstStyle/>
+          <a:p>
+            <a:r>
+              <a:rPr lang="en-US" altLang="zh-CN" dirty="0" smtClean="0"/>
+              <a:t>S-Process											I-Process</a:t>
+            </a:r>
+            <a:endParaRPr lang="zh-CN" altLang="en-US" dirty="0"/>
+          </a:p>
+        </p:txBody>
+      </p:sp>
+      <p:pic>
+        <p:nvPicPr>
+          <p:cNvPr id="4098" name="Picture 2"/>
+          <p:cNvPicPr>
+            <a:picLocks noChangeAspect="1" noChangeArrowheads="1"/>
+          </p:cNvPicPr>
+          <p:nvPr/>
+        </p:nvPicPr>
+        <p:blipFill>
+          <a:blip r:embed="rId2">
+            <a:extLst>
+              <a:ext uri="{28A0092B-C50C-407E-A947-70E740481C1C}">
+                <a14:useLocalDpi xmlns:a14="http://schemas.microsoft.com/office/drawing/2010/main" val="0"/>
+              </a:ext>
+            </a:extLst>
+          </a:blip>
+          <a:srcRect/>
+          <a:stretch>
+            <a:fillRect/>
+          </a:stretch>
+        </p:blipFill>
+        <p:spPr bwMode="auto">
+          <a:xfrm>
+            <a:off x="2096600" y="2580910"/>
+            <a:ext cx="4828107" cy="2764813"/>
+          </a:xfrm>
+          <a:prstGeom prst="rect">
+            <a:avLst/>
+          </a:prstGeom>
+          <a:noFill/>
+          <a:ln>
+            <a:noFill/>
+          </a:ln>
+          <a:extLst>
+            <a:ext uri="{909E8E84-426E-40DD-AFC4-6F175D3DCCD1}">
+              <a14:hiddenFill xmlns:a14="http://schemas.microsoft.com/office/drawing/2010/main">
+                <a:solidFill>
+                  <a:schemeClr val="accent1"/>
+                </a:solidFill>
+              </a14:hiddenFill>
+            </a:ext>
+            <a:ext uri="{91240B29-F687-4F45-9708-019B960494DF}">
+              <a14:hiddenLine xmlns:a14="http://schemas.microsoft.com/office/drawing/2010/main" w="9525">
+                <a:solidFill>
+                  <a:schemeClr val="tx1"/>
+                </a:solidFill>
+                <a:miter lim="800000"/>
+                <a:headEnd/>
+                <a:tailEnd/>
+              </a14:hiddenLine>
+            </a:ext>
+          </a:extLst>
+        </p:spPr>
+      </p:pic>
+      <p:pic>
+        <p:nvPicPr>
+          <p:cNvPr id="4099" name="Picture 3"/>
+          <p:cNvPicPr>
+            <a:picLocks noChangeAspect="1" noChangeArrowheads="1"/>
+          </p:cNvPicPr>
+          <p:nvPr/>
+        </p:nvPicPr>
+        <p:blipFill>
+          <a:blip r:embed="rId3">
+            <a:extLst>
+              <a:ext uri="{28A0092B-C50C-407E-A947-70E740481C1C}">
+                <a14:useLocalDpi xmlns:a14="http://schemas.microsoft.com/office/drawing/2010/main" val="0"/>
+              </a:ext>
+            </a:extLst>
+          </a:blip>
+          <a:srcRect/>
+          <a:stretch>
+            <a:fillRect/>
+          </a:stretch>
+        </p:blipFill>
+        <p:spPr bwMode="auto">
+          <a:xfrm>
+            <a:off x="7386637" y="2580910"/>
+            <a:ext cx="3848661" cy="2888639"/>
+          </a:xfrm>
+          <a:prstGeom prst="rect">
+            <a:avLst/>
+          </a:prstGeom>
+          <a:noFill/>
+          <a:ln>
+            <a:noFill/>
+          </a:ln>
+          <a:extLst>
+            <a:ext uri="{909E8E84-426E-40DD-AFC4-6F175D3DCCD1}">
+              <a14:hiddenFill xmlns:a14="http://schemas.microsoft.com/office/drawing/2010/main">
+                <a:solidFill>
+                  <a:schemeClr val="accent1"/>
+                </a:solidFill>
+              </a14:hiddenFill>
+            </a:ext>
+            <a:ext uri="{91240B29-F687-4F45-9708-019B960494DF}">
+              <a14:hiddenLine xmlns:a14="http://schemas.microsoft.com/office/drawing/2010/main" w="9525">
+                <a:solidFill>
+                  <a:schemeClr val="tx1"/>
+                </a:solidFill>
+                <a:miter lim="800000"/>
+                <a:headEnd/>
+                <a:tailEnd/>
+              </a14:hiddenLine>
+            </a:ext>
+          </a:extLst>
+        </p:spPr>
+      </p:pic>
+    </p:spTree>
+    <p:extLst>
+      <p:ext uri="{BB962C8B-B14F-4D97-AF65-F5344CB8AC3E}">
+        <p14:creationId xmlns:p14="http://schemas.microsoft.com/office/powerpoint/2010/main" val="3049118883"/>
       </p:ext>
     </p:extLst>
   </p:cSld>
@@ -30238,7 +31736,7 @@
   <a:extraClrSchemeLst/>
   <a:extLst>
     <a:ext uri="{05A4C25C-085E-4340-85A3-A5531E510DB2}">
-      <thm15:themeFamily xmlns="" xmlns:thm15="http://schemas.microsoft.com/office/thememl/2012/main" name="Wisp" id="{7CB32D59-10C0-40DD-B7BD-2E94284A981C}" vid="{24B1A44C-C006-48B2-A4D7-E5549B3D8CD4}"/>
+      <thm15:themeFamily xmlns:thm15="http://schemas.microsoft.com/office/thememl/2012/main" xmlns="" name="Wisp" id="{7CB32D59-10C0-40DD-B7BD-2E94284A981C}" vid="{24B1A44C-C006-48B2-A4D7-E5549B3D8CD4}"/>
     </a:ext>
   </a:extLst>
 </a:theme>

</xml_diff>

<commit_message>
update suvey for data stream
</commit_message>
<xml_diff>
--- a/slide/tsdm.pptx
+++ b/slide/tsdm.pptx
@@ -49,6 +49,13 @@
     <p:sldId id="317" r:id="rId43"/>
     <p:sldId id="318" r:id="rId44"/>
     <p:sldId id="319" r:id="rId45"/>
+    <p:sldId id="320" r:id="rId46"/>
+    <p:sldId id="321" r:id="rId47"/>
+    <p:sldId id="322" r:id="rId48"/>
+    <p:sldId id="323" r:id="rId49"/>
+    <p:sldId id="324" r:id="rId50"/>
+    <p:sldId id="325" r:id="rId51"/>
+    <p:sldId id="326" r:id="rId52"/>
   </p:sldIdLst>
   <p:sldSz cx="12192000" cy="6858000"/>
   <p:notesSz cx="6858000" cy="9144000"/>
@@ -149,7 +156,7 @@
   </p:defaultTextStyle>
   <p:extLst>
     <p:ext uri="{EFAFB233-063F-42B5-8137-9DF3F51BA10A}">
-      <p15:sldGuideLst xmlns:p15="http://schemas.microsoft.com/office/powerpoint/2012/main" xmlns=""/>
+      <p15:sldGuideLst xmlns="" xmlns:p15="http://schemas.microsoft.com/office/powerpoint/2012/main"/>
     </p:ext>
   </p:extLst>
 </p:presentation>
@@ -343,7 +350,7 @@
           <a:p>
             <a:fld id="{F77B2EB1-EA88-4503-95EA-93923E5BA59E}" type="datetimeFigureOut">
               <a:rPr lang="en-US" smtClean="0"/>
-              <a:t>2/28/2013</a:t>
+              <a:t>3/3/2013</a:t>
             </a:fld>
             <a:endParaRPr lang="en-US"/>
           </a:p>
@@ -681,7 +688,7 @@
           <a:p>
             <a:fld id="{F77B2EB1-EA88-4503-95EA-93923E5BA59E}" type="datetimeFigureOut">
               <a:rPr lang="en-US" smtClean="0"/>
-              <a:t>2/28/2013</a:t>
+              <a:t>3/3/2013</a:t>
             </a:fld>
             <a:endParaRPr lang="en-US"/>
           </a:p>
@@ -1082,7 +1089,7 @@
           <a:p>
             <a:fld id="{F77B2EB1-EA88-4503-95EA-93923E5BA59E}" type="datetimeFigureOut">
               <a:rPr lang="en-US" smtClean="0"/>
-              <a:t>2/28/2013</a:t>
+              <a:t>3/3/2013</a:t>
             </a:fld>
             <a:endParaRPr lang="en-US"/>
           </a:p>
@@ -1418,7 +1425,7 @@
           <a:p>
             <a:fld id="{F77B2EB1-EA88-4503-95EA-93923E5BA59E}" type="datetimeFigureOut">
               <a:rPr lang="en-US" smtClean="0"/>
-              <a:t>2/28/2013</a:t>
+              <a:t>3/3/2013</a:t>
             </a:fld>
             <a:endParaRPr lang="en-US"/>
           </a:p>
@@ -1738,7 +1745,7 @@
           <a:p>
             <a:fld id="{F77B2EB1-EA88-4503-95EA-93923E5BA59E}" type="datetimeFigureOut">
               <a:rPr lang="en-US" smtClean="0"/>
-              <a:t>2/28/2013</a:t>
+              <a:t>3/3/2013</a:t>
             </a:fld>
             <a:endParaRPr lang="en-US"/>
           </a:p>
@@ -2134,7 +2141,7 @@
           <a:p>
             <a:fld id="{F77B2EB1-EA88-4503-95EA-93923E5BA59E}" type="datetimeFigureOut">
               <a:rPr lang="en-US" smtClean="0"/>
-              <a:t>2/28/2013</a:t>
+              <a:t>3/3/2013</a:t>
             </a:fld>
             <a:endParaRPr lang="en-US"/>
           </a:p>
@@ -2391,7 +2398,7 @@
           <a:p>
             <a:fld id="{F77B2EB1-EA88-4503-95EA-93923E5BA59E}" type="datetimeFigureOut">
               <a:rPr lang="en-US" smtClean="0"/>
-              <a:t>2/28/2013</a:t>
+              <a:t>3/3/2013</a:t>
             </a:fld>
             <a:endParaRPr lang="en-US"/>
           </a:p>
@@ -2653,7 +2660,7 @@
           <a:p>
             <a:fld id="{F77B2EB1-EA88-4503-95EA-93923E5BA59E}" type="datetimeFigureOut">
               <a:rPr lang="en-US" smtClean="0"/>
-              <a:t>2/28/2013</a:t>
+              <a:t>3/3/2013</a:t>
             </a:fld>
             <a:endParaRPr lang="en-US"/>
           </a:p>
@@ -2915,7 +2922,7 @@
           <a:p>
             <a:fld id="{F77B2EB1-EA88-4503-95EA-93923E5BA59E}" type="datetimeFigureOut">
               <a:rPr lang="en-US" smtClean="0"/>
-              <a:t>2/28/2013</a:t>
+              <a:t>3/3/2013</a:t>
             </a:fld>
             <a:endParaRPr lang="en-US"/>
           </a:p>
@@ -3244,7 +3251,7 @@
           <a:p>
             <a:fld id="{F77B2EB1-EA88-4503-95EA-93923E5BA59E}" type="datetimeFigureOut">
               <a:rPr lang="en-US" smtClean="0"/>
-              <a:t>2/28/2013</a:t>
+              <a:t>3/3/2013</a:t>
             </a:fld>
             <a:endParaRPr lang="en-US"/>
           </a:p>
@@ -3567,7 +3574,7 @@
           <a:p>
             <a:fld id="{F77B2EB1-EA88-4503-95EA-93923E5BA59E}" type="datetimeFigureOut">
               <a:rPr lang="en-US" smtClean="0"/>
-              <a:t>2/28/2013</a:t>
+              <a:t>3/3/2013</a:t>
             </a:fld>
             <a:endParaRPr lang="en-US"/>
           </a:p>
@@ -4024,7 +4031,7 @@
           <a:p>
             <a:fld id="{F77B2EB1-EA88-4503-95EA-93923E5BA59E}" type="datetimeFigureOut">
               <a:rPr lang="en-US" smtClean="0"/>
-              <a:t>2/28/2013</a:t>
+              <a:t>3/3/2013</a:t>
             </a:fld>
             <a:endParaRPr lang="en-US"/>
           </a:p>
@@ -4229,7 +4236,7 @@
           <a:p>
             <a:fld id="{F77B2EB1-EA88-4503-95EA-93923E5BA59E}" type="datetimeFigureOut">
               <a:rPr lang="en-US" smtClean="0"/>
-              <a:t>2/28/2013</a:t>
+              <a:t>3/3/2013</a:t>
             </a:fld>
             <a:endParaRPr lang="en-US"/>
           </a:p>
@@ -4406,7 +4413,7 @@
           <a:p>
             <a:fld id="{F77B2EB1-EA88-4503-95EA-93923E5BA59E}" type="datetimeFigureOut">
               <a:rPr lang="en-US" smtClean="0"/>
-              <a:t>2/28/2013</a:t>
+              <a:t>3/3/2013</a:t>
             </a:fld>
             <a:endParaRPr lang="en-US"/>
           </a:p>
@@ -4739,7 +4746,7 @@
           <a:p>
             <a:fld id="{F77B2EB1-EA88-4503-95EA-93923E5BA59E}" type="datetimeFigureOut">
               <a:rPr lang="en-US" smtClean="0"/>
-              <a:t>2/28/2013</a:t>
+              <a:t>3/3/2013</a:t>
             </a:fld>
             <a:endParaRPr lang="en-US"/>
           </a:p>
@@ -5084,7 +5091,7 @@
           <a:p>
             <a:fld id="{F77B2EB1-EA88-4503-95EA-93923E5BA59E}" type="datetimeFigureOut">
               <a:rPr lang="en-US" smtClean="0"/>
-              <a:t>2/28/2013</a:t>
+              <a:t>3/3/2013</a:t>
             </a:fld>
             <a:endParaRPr lang="en-US"/>
           </a:p>
@@ -7201,7 +7208,7 @@
           <a:p>
             <a:fld id="{F77B2EB1-EA88-4503-95EA-93923E5BA59E}" type="datetimeFigureOut">
               <a:rPr lang="en-US" smtClean="0"/>
-              <a:t>2/28/2013</a:t>
+              <a:t>3/3/2013</a:t>
             </a:fld>
             <a:endParaRPr lang="en-US"/>
           </a:p>
@@ -26428,7 +26435,7 @@
           <a:graphicData uri="http://schemas.openxmlformats.org/presentationml/2006/ole">
             <mc:AlternateContent xmlns:mc="http://schemas.openxmlformats.org/markup-compatibility/2006">
               <mc:Choice xmlns:v="urn:schemas-microsoft-com:vml" Requires="v">
-                <p:oleObj spid="_x0000_s1048" name="點陣圖影像" r:id="rId3" imgW="4638095" imgH="2534004" progId="PBrush">
+                <p:oleObj spid="_x0000_s1056" name="點陣圖影像" r:id="rId3" imgW="4638095" imgH="2534004" progId="PBrush">
                   <p:embed/>
                 </p:oleObj>
               </mc:Choice>
@@ -26499,7 +26506,7 @@
           <a:graphicData uri="http://schemas.openxmlformats.org/presentationml/2006/ole">
             <mc:AlternateContent xmlns:mc="http://schemas.openxmlformats.org/markup-compatibility/2006">
               <mc:Choice xmlns:v="urn:schemas-microsoft-com:vml" Requires="v">
-                <p:oleObj spid="_x0000_s1049" name="BMP 图像" r:id="rId5" imgW="4381560" imgH="1305000" progId="Paint.Picture">
+                <p:oleObj spid="_x0000_s1057" name="BMP 图像" r:id="rId5" imgW="4381560" imgH="1305000" progId="Paint.Picture">
                   <p:embed/>
                 </p:oleObj>
               </mc:Choice>
@@ -27519,8 +27526,8 @@
           </a:p>
         </p:txBody>
       </p:sp>
-      <mc:AlternateContent xmlns:mc="http://schemas.openxmlformats.org/markup-compatibility/2006">
-        <mc:Choice xmlns:a14="http://schemas.microsoft.com/office/drawing/2010/main" Requires="a14">
+      <mc:AlternateContent xmlns:mc="http://schemas.openxmlformats.org/markup-compatibility/2006" xmlns:a14="http://schemas.microsoft.com/office/drawing/2010/main">
+        <mc:Choice Requires="a14">
           <p:sp>
             <p:nvSpPr>
               <p:cNvPr id="3" name="内容占位符 2"/>
@@ -27638,15 +27645,7 @@
                 <a:pPr lvl="1"/>
                 <a:r>
                   <a:rPr lang="en-US" altLang="zh-CN" dirty="0" smtClean="0"/>
-                  <a:t>Sequence s and its </a:t>
-                </a:r>
-                <a:r>
-                  <a:rPr lang="en-US" altLang="zh-CN" dirty="0" smtClean="0"/>
-                  <a:t>S-Extended </a:t>
-                </a:r>
-                <a:r>
-                  <a:rPr lang="en-US" altLang="zh-CN" dirty="0" smtClean="0"/>
-                  <a:t>sequence </a:t>
+                  <a:t>Sequence s and its S-Extended sequence </a:t>
                 </a:r>
                 <a14:m>
                   <m:oMath xmlns:m="http://schemas.openxmlformats.org/officeDocument/2006/math">
@@ -29231,7 +29230,7 @@
             </p:txBody>
           </p:sp>
         </mc:Choice>
-        <mc:Fallback>
+        <mc:Fallback xmlns="">
           <p:sp>
             <p:nvSpPr>
               <p:cNvPr id="3" name="内容占位符 2"/>
@@ -29855,6 +29854,822 @@
 </p:sld>
 </file>
 
+<file path=ppt/slides/slide45.xml><?xml version="1.0" encoding="utf-8"?>
+<p:sld xmlns:a="http://schemas.openxmlformats.org/drawingml/2006/main" xmlns:r="http://schemas.openxmlformats.org/officeDocument/2006/relationships" xmlns:p="http://schemas.openxmlformats.org/presentationml/2006/main">
+  <p:cSld>
+    <p:spTree>
+      <p:nvGrpSpPr>
+        <p:cNvPr id="1" name=""/>
+        <p:cNvGrpSpPr/>
+        <p:nvPr/>
+      </p:nvGrpSpPr>
+      <p:grpSpPr>
+        <a:xfrm>
+          <a:off x="0" y="0"/>
+          <a:ext cx="0" cy="0"/>
+          <a:chOff x="0" y="0"/>
+          <a:chExt cx="0" cy="0"/>
+        </a:xfrm>
+      </p:grpSpPr>
+      <p:sp>
+        <p:nvSpPr>
+          <p:cNvPr id="2" name="标题 1"/>
+          <p:cNvSpPr>
+            <a:spLocks noGrp="1"/>
+          </p:cNvSpPr>
+          <p:nvPr>
+            <p:ph type="title"/>
+          </p:nvPr>
+        </p:nvSpPr>
+        <p:spPr/>
+        <p:txBody>
+          <a:bodyPr/>
+          <a:lstStyle/>
+          <a:p>
+            <a:pPr algn="ctr"/>
+            <a:r>
+              <a:rPr lang="en-US" altLang="zh-CN" dirty="0" smtClean="0"/>
+              <a:t>Mining Data Streams</a:t>
+            </a:r>
+            <a:endParaRPr lang="zh-CN" altLang="en-US" dirty="0"/>
+          </a:p>
+        </p:txBody>
+      </p:sp>
+      <p:sp>
+        <p:nvSpPr>
+          <p:cNvPr id="3" name="内容占位符 2"/>
+          <p:cNvSpPr>
+            <a:spLocks noGrp="1"/>
+          </p:cNvSpPr>
+          <p:nvPr>
+            <p:ph idx="1"/>
+          </p:nvPr>
+        </p:nvSpPr>
+        <p:spPr/>
+        <p:txBody>
+          <a:bodyPr/>
+          <a:lstStyle/>
+          <a:p>
+            <a:r>
+              <a:rPr lang="en-US" altLang="zh-CN" dirty="0"/>
+              <a:t>P</a:t>
+            </a:r>
+            <a:r>
+              <a:rPr lang="en-US" altLang="zh-CN" dirty="0" smtClean="0"/>
+              <a:t>rocess </a:t>
+            </a:r>
+            <a:r>
+              <a:rPr lang="en-US" altLang="zh-CN" dirty="0"/>
+              <a:t>of extracting knowledge structures from continuous, rapid data </a:t>
+            </a:r>
+            <a:r>
+              <a:rPr lang="en-US" altLang="zh-CN" dirty="0" smtClean="0"/>
+              <a:t>records.</a:t>
+            </a:r>
+          </a:p>
+          <a:p>
+            <a:r>
+              <a:rPr lang="en-US" altLang="zh-CN" dirty="0"/>
+              <a:t>C</a:t>
+            </a:r>
+            <a:r>
+              <a:rPr lang="en-US" altLang="zh-CN" dirty="0" smtClean="0"/>
+              <a:t>omputer </a:t>
+            </a:r>
+            <a:r>
+              <a:rPr lang="en-US" altLang="zh-CN" dirty="0"/>
+              <a:t>network traffic, phone conversations, ATM transactions, web searches, and sensor </a:t>
+            </a:r>
+            <a:r>
+              <a:rPr lang="en-US" altLang="zh-CN" dirty="0" smtClean="0"/>
+              <a:t>data.</a:t>
+            </a:r>
+          </a:p>
+          <a:p>
+            <a:endParaRPr lang="zh-CN" altLang="en-US" dirty="0"/>
+          </a:p>
+        </p:txBody>
+      </p:sp>
+    </p:spTree>
+    <p:extLst>
+      <p:ext uri="{BB962C8B-B14F-4D97-AF65-F5344CB8AC3E}">
+        <p14:creationId xmlns:p14="http://schemas.microsoft.com/office/powerpoint/2010/main" val="1085052531"/>
+      </p:ext>
+    </p:extLst>
+  </p:cSld>
+  <p:clrMapOvr>
+    <a:masterClrMapping/>
+  </p:clrMapOvr>
+</p:sld>
+</file>
+
+<file path=ppt/slides/slide46.xml><?xml version="1.0" encoding="utf-8"?>
+<p:sld xmlns:a="http://schemas.openxmlformats.org/drawingml/2006/main" xmlns:r="http://schemas.openxmlformats.org/officeDocument/2006/relationships" xmlns:p="http://schemas.openxmlformats.org/presentationml/2006/main">
+  <p:cSld>
+    <p:spTree>
+      <p:nvGrpSpPr>
+        <p:cNvPr id="1" name=""/>
+        <p:cNvGrpSpPr/>
+        <p:nvPr/>
+      </p:nvGrpSpPr>
+      <p:grpSpPr>
+        <a:xfrm>
+          <a:off x="0" y="0"/>
+          <a:ext cx="0" cy="0"/>
+          <a:chOff x="0" y="0"/>
+          <a:chExt cx="0" cy="0"/>
+        </a:xfrm>
+      </p:grpSpPr>
+      <p:sp>
+        <p:nvSpPr>
+          <p:cNvPr id="2" name="标题 1"/>
+          <p:cNvSpPr>
+            <a:spLocks noGrp="1"/>
+          </p:cNvSpPr>
+          <p:nvPr>
+            <p:ph type="title"/>
+          </p:nvPr>
+        </p:nvSpPr>
+        <p:spPr/>
+        <p:txBody>
+          <a:bodyPr/>
+          <a:lstStyle/>
+          <a:p>
+            <a:pPr algn="ctr"/>
+            <a:r>
+              <a:rPr lang="en-US" altLang="zh-CN" dirty="0"/>
+              <a:t>Theoretical Foundations</a:t>
+            </a:r>
+            <a:endParaRPr lang="zh-CN" altLang="en-US" dirty="0"/>
+          </a:p>
+        </p:txBody>
+      </p:sp>
+      <p:sp>
+        <p:nvSpPr>
+          <p:cNvPr id="3" name="内容占位符 2"/>
+          <p:cNvSpPr>
+            <a:spLocks noGrp="1"/>
+          </p:cNvSpPr>
+          <p:nvPr>
+            <p:ph idx="1"/>
+          </p:nvPr>
+        </p:nvSpPr>
+        <p:spPr/>
+        <p:txBody>
+          <a:bodyPr/>
+          <a:lstStyle/>
+          <a:p>
+            <a:r>
+              <a:rPr lang="en-US" altLang="zh-CN" dirty="0"/>
+              <a:t>Data-based </a:t>
+            </a:r>
+            <a:r>
+              <a:rPr lang="en-US" altLang="zh-CN" dirty="0" smtClean="0"/>
+              <a:t>techniques(summarize data set)</a:t>
+            </a:r>
+          </a:p>
+          <a:p>
+            <a:pPr lvl="1"/>
+            <a:r>
+              <a:rPr lang="en-US" altLang="zh-CN" dirty="0" smtClean="0"/>
+              <a:t>Sampling</a:t>
+            </a:r>
+          </a:p>
+          <a:p>
+            <a:pPr lvl="1"/>
+            <a:r>
+              <a:rPr lang="en-US" altLang="zh-CN" dirty="0" smtClean="0"/>
+              <a:t>Load shedding</a:t>
+            </a:r>
+          </a:p>
+          <a:p>
+            <a:pPr lvl="1"/>
+            <a:r>
+              <a:rPr lang="en-US" altLang="zh-CN" dirty="0" smtClean="0"/>
+              <a:t>Sketching</a:t>
+            </a:r>
+          </a:p>
+          <a:p>
+            <a:pPr lvl="1"/>
+            <a:r>
+              <a:rPr lang="en-US" altLang="zh-CN" dirty="0" smtClean="0"/>
+              <a:t>Aggregation</a:t>
+            </a:r>
+          </a:p>
+          <a:p>
+            <a:r>
+              <a:rPr lang="en-US" altLang="zh-CN" dirty="0"/>
+              <a:t>Task-based </a:t>
+            </a:r>
+            <a:r>
+              <a:rPr lang="en-US" altLang="zh-CN" dirty="0" smtClean="0"/>
+              <a:t>techniques(address </a:t>
+            </a:r>
+            <a:r>
+              <a:rPr lang="en-US" altLang="zh-CN" dirty="0"/>
+              <a:t>computational </a:t>
+            </a:r>
+            <a:r>
+              <a:rPr lang="en-US" altLang="zh-CN" dirty="0" smtClean="0"/>
+              <a:t>challenges)</a:t>
+            </a:r>
+          </a:p>
+          <a:p>
+            <a:pPr lvl="1"/>
+            <a:r>
+              <a:rPr lang="en-US" altLang="zh-CN" dirty="0"/>
+              <a:t>Approximation </a:t>
+            </a:r>
+            <a:r>
+              <a:rPr lang="en-US" altLang="zh-CN" dirty="0" smtClean="0"/>
+              <a:t>algorithms</a:t>
+            </a:r>
+          </a:p>
+          <a:p>
+            <a:pPr lvl="1"/>
+            <a:r>
+              <a:rPr lang="en-US" altLang="zh-CN" dirty="0"/>
+              <a:t>Sliding </a:t>
+            </a:r>
+            <a:r>
+              <a:rPr lang="en-US" altLang="zh-CN" dirty="0" smtClean="0"/>
+              <a:t>Window</a:t>
+            </a:r>
+          </a:p>
+          <a:p>
+            <a:pPr lvl="1"/>
+            <a:r>
+              <a:rPr lang="en-US" altLang="zh-CN" dirty="0"/>
+              <a:t>Algorithm Output Granularity</a:t>
+            </a:r>
+            <a:endParaRPr lang="zh-CN" altLang="en-US" dirty="0"/>
+          </a:p>
+        </p:txBody>
+      </p:sp>
+    </p:spTree>
+    <p:extLst>
+      <p:ext uri="{BB962C8B-B14F-4D97-AF65-F5344CB8AC3E}">
+        <p14:creationId xmlns:p14="http://schemas.microsoft.com/office/powerpoint/2010/main" val="1239630132"/>
+      </p:ext>
+    </p:extLst>
+  </p:cSld>
+  <p:clrMapOvr>
+    <a:masterClrMapping/>
+  </p:clrMapOvr>
+  <p:timing>
+    <p:tnLst>
+      <p:par>
+        <p:cTn id="1" dur="indefinite" restart="never" nodeType="tmRoot"/>
+      </p:par>
+    </p:tnLst>
+  </p:timing>
+</p:sld>
+</file>
+
+<file path=ppt/slides/slide47.xml><?xml version="1.0" encoding="utf-8"?>
+<p:sld xmlns:a="http://schemas.openxmlformats.org/drawingml/2006/main" xmlns:r="http://schemas.openxmlformats.org/officeDocument/2006/relationships" xmlns:p="http://schemas.openxmlformats.org/presentationml/2006/main">
+  <p:cSld>
+    <p:spTree>
+      <p:nvGrpSpPr>
+        <p:cNvPr id="1" name=""/>
+        <p:cNvGrpSpPr/>
+        <p:nvPr/>
+      </p:nvGrpSpPr>
+      <p:grpSpPr>
+        <a:xfrm>
+          <a:off x="0" y="0"/>
+          <a:ext cx="0" cy="0"/>
+          <a:chOff x="0" y="0"/>
+          <a:chExt cx="0" cy="0"/>
+        </a:xfrm>
+      </p:grpSpPr>
+      <p:sp>
+        <p:nvSpPr>
+          <p:cNvPr id="2" name="标题 1"/>
+          <p:cNvSpPr>
+            <a:spLocks noGrp="1"/>
+          </p:cNvSpPr>
+          <p:nvPr>
+            <p:ph type="title"/>
+          </p:nvPr>
+        </p:nvSpPr>
+        <p:spPr/>
+        <p:txBody>
+          <a:bodyPr/>
+          <a:lstStyle/>
+          <a:p>
+            <a:pPr algn="ctr"/>
+            <a:r>
+              <a:rPr lang="en-US" altLang="zh-CN" dirty="0" smtClean="0"/>
+              <a:t>Sampling</a:t>
+            </a:r>
+            <a:endParaRPr lang="zh-CN" altLang="en-US" dirty="0"/>
+          </a:p>
+        </p:txBody>
+      </p:sp>
+      <p:sp>
+        <p:nvSpPr>
+          <p:cNvPr id="3" name="内容占位符 2"/>
+          <p:cNvSpPr>
+            <a:spLocks noGrp="1"/>
+          </p:cNvSpPr>
+          <p:nvPr>
+            <p:ph idx="1"/>
+          </p:nvPr>
+        </p:nvSpPr>
+        <p:spPr>
+          <a:xfrm>
+            <a:off x="2589212" y="1501423"/>
+            <a:ext cx="8915400" cy="4989688"/>
+          </a:xfrm>
+        </p:spPr>
+        <p:txBody>
+          <a:bodyPr>
+            <a:normAutofit fontScale="92500" lnSpcReduction="20000"/>
+          </a:bodyPr>
+          <a:lstStyle/>
+          <a:p>
+            <a:r>
+              <a:rPr lang="en-US" altLang="zh-CN" dirty="0" smtClean="0"/>
+              <a:t>Reservoir sampling</a:t>
+            </a:r>
+          </a:p>
+          <a:p>
+            <a:pPr marL="0" indent="0">
+              <a:buNone/>
+            </a:pPr>
+            <a:r>
+              <a:rPr lang="en-US" altLang="zh-CN" dirty="0"/>
+              <a:t>array R[k];    // result</a:t>
+            </a:r>
+          </a:p>
+          <a:p>
+            <a:pPr marL="0" indent="0">
+              <a:buNone/>
+            </a:pPr>
+            <a:r>
+              <a:rPr lang="en-US" altLang="zh-CN" dirty="0"/>
+              <a:t>integer </a:t>
+            </a:r>
+            <a:r>
+              <a:rPr lang="en-US" altLang="zh-CN" dirty="0" err="1"/>
+              <a:t>i</a:t>
+            </a:r>
+            <a:r>
+              <a:rPr lang="en-US" altLang="zh-CN" dirty="0"/>
+              <a:t>, j;</a:t>
+            </a:r>
+          </a:p>
+          <a:p>
+            <a:pPr marL="0" indent="0">
+              <a:buNone/>
+            </a:pPr>
+            <a:r>
+              <a:rPr lang="en-US" altLang="zh-CN" dirty="0" smtClean="0"/>
+              <a:t>// </a:t>
+            </a:r>
+            <a:r>
+              <a:rPr lang="en-US" altLang="zh-CN" dirty="0"/>
+              <a:t>fill the reservoir array</a:t>
+            </a:r>
+          </a:p>
+          <a:p>
+            <a:pPr marL="0" indent="0">
+              <a:buNone/>
+            </a:pPr>
+            <a:r>
+              <a:rPr lang="en-US" altLang="zh-CN" dirty="0"/>
+              <a:t>for each </a:t>
+            </a:r>
+            <a:r>
+              <a:rPr lang="en-US" altLang="zh-CN" dirty="0" err="1"/>
+              <a:t>i</a:t>
+            </a:r>
+            <a:r>
+              <a:rPr lang="en-US" altLang="zh-CN" dirty="0"/>
+              <a:t> in 1 to k do</a:t>
+            </a:r>
+          </a:p>
+          <a:p>
+            <a:pPr marL="0" indent="0">
+              <a:buNone/>
+            </a:pPr>
+            <a:r>
+              <a:rPr lang="en-US" altLang="zh-CN" dirty="0"/>
+              <a:t>    R[</a:t>
+            </a:r>
+            <a:r>
+              <a:rPr lang="en-US" altLang="zh-CN" dirty="0" err="1"/>
+              <a:t>i</a:t>
+            </a:r>
+            <a:r>
+              <a:rPr lang="en-US" altLang="zh-CN" dirty="0"/>
+              <a:t>] := S[</a:t>
+            </a:r>
+            <a:r>
+              <a:rPr lang="en-US" altLang="zh-CN" dirty="0" err="1"/>
+              <a:t>i</a:t>
+            </a:r>
+            <a:r>
+              <a:rPr lang="en-US" altLang="zh-CN" dirty="0"/>
+              <a:t>]</a:t>
+            </a:r>
+          </a:p>
+          <a:p>
+            <a:pPr marL="0" indent="0">
+              <a:buNone/>
+            </a:pPr>
+            <a:r>
+              <a:rPr lang="en-US" altLang="zh-CN" dirty="0"/>
+              <a:t>done;</a:t>
+            </a:r>
+          </a:p>
+          <a:p>
+            <a:pPr marL="0" indent="0">
+              <a:buNone/>
+            </a:pPr>
+            <a:r>
+              <a:rPr lang="en-US" altLang="zh-CN" dirty="0" smtClean="0"/>
+              <a:t>// </a:t>
+            </a:r>
+            <a:r>
+              <a:rPr lang="en-US" altLang="zh-CN" dirty="0"/>
+              <a:t>replace elements with gradually decreasing probability</a:t>
+            </a:r>
+          </a:p>
+          <a:p>
+            <a:pPr marL="0" indent="0">
+              <a:buNone/>
+            </a:pPr>
+            <a:r>
+              <a:rPr lang="en-US" altLang="zh-CN" dirty="0"/>
+              <a:t>for each </a:t>
+            </a:r>
+            <a:r>
+              <a:rPr lang="en-US" altLang="zh-CN" dirty="0" err="1"/>
+              <a:t>i</a:t>
+            </a:r>
+            <a:r>
+              <a:rPr lang="en-US" altLang="zh-CN" dirty="0"/>
+              <a:t> in k+1 to length(S) do</a:t>
+            </a:r>
+          </a:p>
+          <a:p>
+            <a:pPr marL="0" indent="0">
+              <a:buNone/>
+            </a:pPr>
+            <a:r>
+              <a:rPr lang="en-US" altLang="zh-CN" dirty="0"/>
+              <a:t>    j := random(1, </a:t>
+            </a:r>
+            <a:r>
+              <a:rPr lang="en-US" altLang="zh-CN" dirty="0" err="1"/>
+              <a:t>i</a:t>
+            </a:r>
+            <a:r>
+              <a:rPr lang="en-US" altLang="zh-CN" dirty="0"/>
+              <a:t>);   // important: inclusive range</a:t>
+            </a:r>
+          </a:p>
+          <a:p>
+            <a:pPr marL="0" indent="0">
+              <a:buNone/>
+            </a:pPr>
+            <a:r>
+              <a:rPr lang="en-US" altLang="zh-CN" dirty="0"/>
+              <a:t>    if j &lt;= k then</a:t>
+            </a:r>
+          </a:p>
+          <a:p>
+            <a:pPr marL="0" indent="0">
+              <a:buNone/>
+            </a:pPr>
+            <a:r>
+              <a:rPr lang="en-US" altLang="zh-CN" dirty="0"/>
+              <a:t>        R[j] := S[</a:t>
+            </a:r>
+            <a:r>
+              <a:rPr lang="en-US" altLang="zh-CN" dirty="0" err="1"/>
+              <a:t>i</a:t>
+            </a:r>
+            <a:r>
+              <a:rPr lang="en-US" altLang="zh-CN" dirty="0"/>
+              <a:t>]</a:t>
+            </a:r>
+          </a:p>
+          <a:p>
+            <a:pPr marL="0" indent="0">
+              <a:buNone/>
+            </a:pPr>
+            <a:r>
+              <a:rPr lang="en-US" altLang="zh-CN" dirty="0"/>
+              <a:t>    fi</a:t>
+            </a:r>
+          </a:p>
+          <a:p>
+            <a:pPr marL="0" indent="0">
+              <a:buNone/>
+            </a:pPr>
+            <a:r>
+              <a:rPr lang="en-US" altLang="zh-CN" dirty="0" smtClean="0"/>
+              <a:t>Done</a:t>
+            </a:r>
+          </a:p>
+          <a:p>
+            <a:r>
+              <a:rPr lang="en-US" altLang="zh-CN" dirty="0" smtClean="0"/>
+              <a:t>Drawbacks: can not adapted to  </a:t>
+            </a:r>
+            <a:r>
+              <a:rPr lang="en-US" altLang="zh-CN" dirty="0"/>
+              <a:t>fluctuating </a:t>
+            </a:r>
+            <a:r>
+              <a:rPr lang="en-US" altLang="zh-CN" dirty="0" smtClean="0"/>
+              <a:t>data rates</a:t>
+            </a:r>
+            <a:endParaRPr lang="zh-CN" altLang="en-US" dirty="0"/>
+          </a:p>
+        </p:txBody>
+      </p:sp>
+    </p:spTree>
+    <p:extLst>
+      <p:ext uri="{BB962C8B-B14F-4D97-AF65-F5344CB8AC3E}">
+        <p14:creationId xmlns:p14="http://schemas.microsoft.com/office/powerpoint/2010/main" val="2560177741"/>
+      </p:ext>
+    </p:extLst>
+  </p:cSld>
+  <p:clrMapOvr>
+    <a:masterClrMapping/>
+  </p:clrMapOvr>
+  <p:timing>
+    <p:tnLst>
+      <p:par>
+        <p:cTn id="1" dur="indefinite" restart="never" nodeType="tmRoot"/>
+      </p:par>
+    </p:tnLst>
+  </p:timing>
+</p:sld>
+</file>
+
+<file path=ppt/slides/slide48.xml><?xml version="1.0" encoding="utf-8"?>
+<p:sld xmlns:a="http://schemas.openxmlformats.org/drawingml/2006/main" xmlns:r="http://schemas.openxmlformats.org/officeDocument/2006/relationships" xmlns:p="http://schemas.openxmlformats.org/presentationml/2006/main">
+  <p:cSld>
+    <p:spTree>
+      <p:nvGrpSpPr>
+        <p:cNvPr id="1" name=""/>
+        <p:cNvGrpSpPr/>
+        <p:nvPr/>
+      </p:nvGrpSpPr>
+      <p:grpSpPr>
+        <a:xfrm>
+          <a:off x="0" y="0"/>
+          <a:ext cx="0" cy="0"/>
+          <a:chOff x="0" y="0"/>
+          <a:chExt cx="0" cy="0"/>
+        </a:xfrm>
+      </p:grpSpPr>
+      <p:sp>
+        <p:nvSpPr>
+          <p:cNvPr id="2" name="标题 1"/>
+          <p:cNvSpPr>
+            <a:spLocks noGrp="1"/>
+          </p:cNvSpPr>
+          <p:nvPr>
+            <p:ph type="title"/>
+          </p:nvPr>
+        </p:nvSpPr>
+        <p:spPr/>
+        <p:txBody>
+          <a:bodyPr/>
+          <a:lstStyle/>
+          <a:p>
+            <a:pPr algn="ctr"/>
+            <a:r>
+              <a:rPr lang="en-US" altLang="zh-CN" dirty="0" smtClean="0"/>
+              <a:t>Load Shedding</a:t>
+            </a:r>
+            <a:endParaRPr lang="zh-CN" altLang="en-US" dirty="0"/>
+          </a:p>
+        </p:txBody>
+      </p:sp>
+      <p:sp>
+        <p:nvSpPr>
+          <p:cNvPr id="3" name="内容占位符 2"/>
+          <p:cNvSpPr>
+            <a:spLocks noGrp="1"/>
+          </p:cNvSpPr>
+          <p:nvPr>
+            <p:ph idx="1"/>
+          </p:nvPr>
+        </p:nvSpPr>
+        <p:spPr/>
+        <p:txBody>
+          <a:bodyPr/>
+          <a:lstStyle/>
+          <a:p>
+            <a:r>
+              <a:rPr lang="en-US" altLang="zh-CN" dirty="0" smtClean="0"/>
+              <a:t>Determine when to shed</a:t>
+            </a:r>
+            <a:r>
+              <a:rPr lang="zh-CN" altLang="en-US" dirty="0" smtClean="0"/>
+              <a:t> </a:t>
+            </a:r>
+            <a:r>
+              <a:rPr lang="en-US" altLang="zh-CN" dirty="0" smtClean="0"/>
+              <a:t>load</a:t>
+            </a:r>
+          </a:p>
+          <a:p>
+            <a:r>
+              <a:rPr lang="en-US" altLang="zh-CN" dirty="0" smtClean="0"/>
+              <a:t>Determine where to she load</a:t>
+            </a:r>
+          </a:p>
+          <a:p>
+            <a:r>
+              <a:rPr lang="en-US" altLang="zh-CN" dirty="0" smtClean="0"/>
+              <a:t>Determine how much load to shed</a:t>
+            </a:r>
+          </a:p>
+          <a:p>
+            <a:r>
+              <a:rPr lang="en-US" altLang="zh-CN" dirty="0" smtClean="0"/>
+              <a:t>Drawbacks: drop potential patterns</a:t>
+            </a:r>
+          </a:p>
+        </p:txBody>
+      </p:sp>
+    </p:spTree>
+    <p:extLst>
+      <p:ext uri="{BB962C8B-B14F-4D97-AF65-F5344CB8AC3E}">
+        <p14:creationId xmlns:p14="http://schemas.microsoft.com/office/powerpoint/2010/main" val="1347203944"/>
+      </p:ext>
+    </p:extLst>
+  </p:cSld>
+  <p:clrMapOvr>
+    <a:masterClrMapping/>
+  </p:clrMapOvr>
+</p:sld>
+</file>
+
+<file path=ppt/slides/slide49.xml><?xml version="1.0" encoding="utf-8"?>
+<p:sld xmlns:a="http://schemas.openxmlformats.org/drawingml/2006/main" xmlns:r="http://schemas.openxmlformats.org/officeDocument/2006/relationships" xmlns:p="http://schemas.openxmlformats.org/presentationml/2006/main">
+  <p:cSld>
+    <p:spTree>
+      <p:nvGrpSpPr>
+        <p:cNvPr id="1" name=""/>
+        <p:cNvGrpSpPr/>
+        <p:nvPr/>
+      </p:nvGrpSpPr>
+      <p:grpSpPr>
+        <a:xfrm>
+          <a:off x="0" y="0"/>
+          <a:ext cx="0" cy="0"/>
+          <a:chOff x="0" y="0"/>
+          <a:chExt cx="0" cy="0"/>
+        </a:xfrm>
+      </p:grpSpPr>
+      <p:sp>
+        <p:nvSpPr>
+          <p:cNvPr id="2" name="标题 1"/>
+          <p:cNvSpPr>
+            <a:spLocks noGrp="1"/>
+          </p:cNvSpPr>
+          <p:nvPr>
+            <p:ph type="title"/>
+          </p:nvPr>
+        </p:nvSpPr>
+        <p:spPr/>
+        <p:txBody>
+          <a:bodyPr/>
+          <a:lstStyle/>
+          <a:p>
+            <a:pPr algn="ctr"/>
+            <a:r>
+              <a:rPr lang="en-US" altLang="zh-CN" dirty="0" smtClean="0"/>
+              <a:t>Load Shedding</a:t>
+            </a:r>
+            <a:endParaRPr lang="zh-CN" altLang="en-US" dirty="0"/>
+          </a:p>
+        </p:txBody>
+      </p:sp>
+      <p:sp>
+        <p:nvSpPr>
+          <p:cNvPr id="3" name="内容占位符 2"/>
+          <p:cNvSpPr>
+            <a:spLocks noGrp="1"/>
+          </p:cNvSpPr>
+          <p:nvPr>
+            <p:ph idx="1"/>
+          </p:nvPr>
+        </p:nvSpPr>
+        <p:spPr/>
+        <p:txBody>
+          <a:bodyPr/>
+          <a:lstStyle/>
+          <a:p>
+            <a:r>
+              <a:rPr lang="en-US" altLang="zh-CN" dirty="0" smtClean="0"/>
+              <a:t>Determine when to shed</a:t>
+            </a:r>
+            <a:r>
+              <a:rPr lang="zh-CN" altLang="en-US" dirty="0" smtClean="0"/>
+              <a:t> </a:t>
+            </a:r>
+            <a:r>
+              <a:rPr lang="en-US" altLang="zh-CN" dirty="0" smtClean="0"/>
+              <a:t>load</a:t>
+            </a:r>
+          </a:p>
+          <a:p>
+            <a:r>
+              <a:rPr lang="en-US" altLang="zh-CN" dirty="0" smtClean="0"/>
+              <a:t>Determine where to she load</a:t>
+            </a:r>
+          </a:p>
+          <a:p>
+            <a:r>
+              <a:rPr lang="en-US" altLang="zh-CN" dirty="0" smtClean="0"/>
+              <a:t>Determine how much load to shed</a:t>
+            </a:r>
+          </a:p>
+          <a:p>
+            <a:r>
+              <a:rPr lang="en-US" altLang="zh-CN" dirty="0" smtClean="0"/>
+              <a:t>Drawbacks: drop potential patterns</a:t>
+            </a:r>
+          </a:p>
+        </p:txBody>
+      </p:sp>
+      <p:pic>
+        <p:nvPicPr>
+          <p:cNvPr id="3074" name="Picture 2"/>
+          <p:cNvPicPr>
+            <a:picLocks noChangeAspect="1" noChangeArrowheads="1"/>
+          </p:cNvPicPr>
+          <p:nvPr/>
+        </p:nvPicPr>
+        <p:blipFill>
+          <a:blip r:embed="rId2">
+            <a:extLst>
+              <a:ext uri="{28A0092B-C50C-407E-A947-70E740481C1C}">
+                <a14:useLocalDpi xmlns:a14="http://schemas.microsoft.com/office/drawing/2010/main" val="0"/>
+              </a:ext>
+            </a:extLst>
+          </a:blip>
+          <a:srcRect/>
+          <a:stretch>
+            <a:fillRect/>
+          </a:stretch>
+        </p:blipFill>
+        <p:spPr bwMode="auto">
+          <a:xfrm>
+            <a:off x="3508200" y="3302001"/>
+            <a:ext cx="5714823" cy="2865086"/>
+          </a:xfrm>
+          <a:prstGeom prst="rect">
+            <a:avLst/>
+          </a:prstGeom>
+          <a:noFill/>
+          <a:ln>
+            <a:noFill/>
+          </a:ln>
+          <a:extLst>
+            <a:ext uri="{909E8E84-426E-40DD-AFC4-6F175D3DCCD1}">
+              <a14:hiddenFill xmlns:a14="http://schemas.microsoft.com/office/drawing/2010/main">
+                <a:solidFill>
+                  <a:schemeClr val="accent1"/>
+                </a:solidFill>
+              </a14:hiddenFill>
+            </a:ext>
+            <a:ext uri="{91240B29-F687-4F45-9708-019B960494DF}">
+              <a14:hiddenLine xmlns:a14="http://schemas.microsoft.com/office/drawing/2010/main" w="9525">
+                <a:solidFill>
+                  <a:schemeClr val="tx1"/>
+                </a:solidFill>
+                <a:miter lim="800000"/>
+                <a:headEnd/>
+                <a:tailEnd/>
+              </a14:hiddenLine>
+            </a:ext>
+          </a:extLst>
+        </p:spPr>
+      </p:pic>
+    </p:spTree>
+    <p:extLst>
+      <p:ext uri="{BB962C8B-B14F-4D97-AF65-F5344CB8AC3E}">
+        <p14:creationId xmlns:p14="http://schemas.microsoft.com/office/powerpoint/2010/main" val="3222173571"/>
+      </p:ext>
+    </p:extLst>
+  </p:cSld>
+  <p:clrMapOvr>
+    <a:masterClrMapping/>
+  </p:clrMapOvr>
+</p:sld>
+</file>
+
 <file path=ppt/slides/slide5.xml><?xml version="1.0" encoding="utf-8"?>
 <p:sld xmlns:a="http://schemas.openxmlformats.org/drawingml/2006/main" xmlns:r="http://schemas.openxmlformats.org/officeDocument/2006/relationships" xmlns:p="http://schemas.openxmlformats.org/presentationml/2006/main">
   <p:cSld>
@@ -29992,6 +30807,830 @@
       </p:par>
     </p:tnLst>
   </p:timing>
+</p:sld>
+</file>
+
+<file path=ppt/slides/slide50.xml><?xml version="1.0" encoding="utf-8"?>
+<p:sld xmlns:a="http://schemas.openxmlformats.org/drawingml/2006/main" xmlns:r="http://schemas.openxmlformats.org/officeDocument/2006/relationships" xmlns:p="http://schemas.openxmlformats.org/presentationml/2006/main">
+  <p:cSld>
+    <p:spTree>
+      <p:nvGrpSpPr>
+        <p:cNvPr id="1" name=""/>
+        <p:cNvGrpSpPr/>
+        <p:nvPr/>
+      </p:nvGrpSpPr>
+      <p:grpSpPr>
+        <a:xfrm>
+          <a:off x="0" y="0"/>
+          <a:ext cx="0" cy="0"/>
+          <a:chOff x="0" y="0"/>
+          <a:chExt cx="0" cy="0"/>
+        </a:xfrm>
+      </p:grpSpPr>
+      <p:sp>
+        <p:nvSpPr>
+          <p:cNvPr id="2" name="标题 1"/>
+          <p:cNvSpPr>
+            <a:spLocks noGrp="1"/>
+          </p:cNvSpPr>
+          <p:nvPr>
+            <p:ph type="title"/>
+          </p:nvPr>
+        </p:nvSpPr>
+        <p:spPr/>
+        <p:txBody>
+          <a:bodyPr/>
+          <a:lstStyle/>
+          <a:p>
+            <a:pPr algn="ctr"/>
+            <a:r>
+              <a:rPr lang="en-US" altLang="zh-CN" dirty="0" smtClean="0"/>
+              <a:t>Sketching</a:t>
+            </a:r>
+            <a:endParaRPr lang="zh-CN" altLang="en-US" dirty="0"/>
+          </a:p>
+        </p:txBody>
+      </p:sp>
+      <mc:AlternateContent xmlns:mc="http://schemas.openxmlformats.org/markup-compatibility/2006">
+        <mc:Choice xmlns:a14="http://schemas.microsoft.com/office/drawing/2010/main" Requires="a14">
+          <p:sp>
+            <p:nvSpPr>
+              <p:cNvPr id="3" name="内容占位符 2"/>
+              <p:cNvSpPr>
+                <a:spLocks noGrp="1"/>
+              </p:cNvSpPr>
+              <p:nvPr>
+                <p:ph idx="1"/>
+              </p:nvPr>
+            </p:nvSpPr>
+            <p:spPr/>
+            <p:txBody>
+              <a:bodyPr/>
+              <a:lstStyle/>
+              <a:p>
+                <a:r>
+                  <a:rPr lang="en-US" altLang="zh-CN" dirty="0" smtClean="0"/>
+                  <a:t>kth</a:t>
+                </a:r>
+                <a:r>
+                  <a:rPr lang="en-US" altLang="zh-CN" dirty="0"/>
+                  <a:t> frequency </a:t>
+                </a:r>
+                <a:r>
+                  <a:rPr lang="en-US" altLang="zh-CN" dirty="0" smtClean="0"/>
+                  <a:t>moment </a:t>
+                </a:r>
+                <a14:m>
+                  <m:oMath xmlns:m="http://schemas.openxmlformats.org/officeDocument/2006/math">
+                    <m:sSub>
+                      <m:sSubPr>
+                        <m:ctrlPr>
+                          <a:rPr lang="en-US" altLang="zh-CN" b="0" i="1" smtClean="0">
+                            <a:latin typeface="Cambria Math"/>
+                          </a:rPr>
+                        </m:ctrlPr>
+                      </m:sSubPr>
+                      <m:e>
+                        <m:r>
+                          <a:rPr lang="en-US" altLang="zh-CN" b="0" i="1" smtClean="0">
+                            <a:latin typeface="Cambria Math"/>
+                          </a:rPr>
+                          <m:t>𝐹</m:t>
+                        </m:r>
+                      </m:e>
+                      <m:sub>
+                        <m:r>
+                          <a:rPr lang="en-US" altLang="zh-CN" b="0" i="1" smtClean="0">
+                            <a:latin typeface="Cambria Math"/>
+                          </a:rPr>
+                          <m:t>𝑘</m:t>
+                        </m:r>
+                      </m:sub>
+                    </m:sSub>
+                  </m:oMath>
+                </a14:m>
+                <a:endParaRPr lang="en-US" altLang="zh-CN" dirty="0" smtClean="0"/>
+              </a:p>
+              <a:p>
+                <a:pPr marL="0" indent="0">
+                  <a:buNone/>
+                </a:pPr>
+                <a:r>
+                  <a:rPr lang="en-US" altLang="zh-CN" dirty="0" smtClean="0"/>
+                  <a:t>S=</a:t>
+                </a:r>
+                <a14:m>
+                  <m:oMath xmlns:m="http://schemas.openxmlformats.org/officeDocument/2006/math">
+                    <m:d>
+                      <m:dPr>
+                        <m:ctrlPr>
+                          <a:rPr lang="en-US" altLang="zh-CN" b="0" i="1" smtClean="0">
+                            <a:latin typeface="Cambria Math"/>
+                          </a:rPr>
+                        </m:ctrlPr>
+                      </m:dPr>
+                      <m:e>
+                        <m:sSub>
+                          <m:sSubPr>
+                            <m:ctrlPr>
+                              <a:rPr lang="en-US" altLang="zh-CN" b="0" i="1" smtClean="0">
+                                <a:latin typeface="Cambria Math"/>
+                              </a:rPr>
+                            </m:ctrlPr>
+                          </m:sSubPr>
+                          <m:e>
+                            <m:r>
+                              <a:rPr lang="en-US" altLang="zh-CN" b="0" i="1" smtClean="0">
+                                <a:latin typeface="Cambria Math"/>
+                              </a:rPr>
+                              <m:t>𝑥</m:t>
+                            </m:r>
+                          </m:e>
+                          <m:sub>
+                            <m:r>
+                              <a:rPr lang="en-US" altLang="zh-CN" b="0" i="1" smtClean="0">
+                                <a:latin typeface="Cambria Math"/>
+                              </a:rPr>
+                              <m:t>1</m:t>
+                            </m:r>
+                          </m:sub>
+                        </m:sSub>
+                        <m:r>
+                          <a:rPr lang="en-US" altLang="zh-CN" b="0" i="1" smtClean="0">
+                            <a:latin typeface="Cambria Math"/>
+                          </a:rPr>
+                          <m:t>,…,</m:t>
+                        </m:r>
+                        <m:sSub>
+                          <m:sSubPr>
+                            <m:ctrlPr>
+                              <a:rPr lang="en-US" altLang="zh-CN" b="0" i="1" smtClean="0">
+                                <a:latin typeface="Cambria Math"/>
+                              </a:rPr>
+                            </m:ctrlPr>
+                          </m:sSubPr>
+                          <m:e>
+                            <m:r>
+                              <a:rPr lang="en-US" altLang="zh-CN" b="0" i="1" smtClean="0">
+                                <a:latin typeface="Cambria Math"/>
+                              </a:rPr>
+                              <m:t>𝑥</m:t>
+                            </m:r>
+                          </m:e>
+                          <m:sub>
+                            <m:r>
+                              <a:rPr lang="en-US" altLang="zh-CN" b="0" i="1" smtClean="0">
+                                <a:latin typeface="Cambria Math"/>
+                              </a:rPr>
+                              <m:t>𝑁</m:t>
+                            </m:r>
+                          </m:sub>
+                        </m:sSub>
+                      </m:e>
+                    </m:d>
+                  </m:oMath>
+                </a14:m>
+                <a:r>
+                  <a:rPr lang="zh-CN" altLang="en-US" dirty="0" smtClean="0"/>
+                  <a:t> </a:t>
+                </a:r>
+                <a:r>
+                  <a:rPr lang="en-US" altLang="zh-CN" dirty="0" smtClean="0"/>
+                  <a:t>be a sequence where each </a:t>
+                </a:r>
+                <a14:m>
+                  <m:oMath xmlns:m="http://schemas.openxmlformats.org/officeDocument/2006/math">
+                    <m:sSub>
+                      <m:sSubPr>
+                        <m:ctrlPr>
+                          <a:rPr lang="en-US" altLang="zh-CN" b="0" i="1" smtClean="0">
+                            <a:latin typeface="Cambria Math"/>
+                          </a:rPr>
+                        </m:ctrlPr>
+                      </m:sSubPr>
+                      <m:e>
+                        <m:r>
+                          <a:rPr lang="en-US" altLang="zh-CN" b="0" i="1" smtClean="0">
+                            <a:latin typeface="Cambria Math"/>
+                          </a:rPr>
+                          <m:t>𝑥</m:t>
+                        </m:r>
+                      </m:e>
+                      <m:sub>
+                        <m:r>
+                          <a:rPr lang="en-US" altLang="zh-CN" b="0" i="1" smtClean="0">
+                            <a:latin typeface="Cambria Math"/>
+                          </a:rPr>
+                          <m:t>𝑖</m:t>
+                        </m:r>
+                      </m:sub>
+                    </m:sSub>
+                  </m:oMath>
+                </a14:m>
+                <a:r>
+                  <a:rPr lang="zh-CN" altLang="en-US" dirty="0" smtClean="0"/>
+                  <a:t> </a:t>
+                </a:r>
+                <a:r>
+                  <a:rPr lang="en-US" altLang="zh-CN" dirty="0" smtClean="0"/>
+                  <a:t>belongs to </a:t>
+                </a:r>
+                <a14:m>
+                  <m:oMath xmlns:m="http://schemas.openxmlformats.org/officeDocument/2006/math">
+                    <m:d>
+                      <m:dPr>
+                        <m:ctrlPr>
+                          <a:rPr lang="en-US" altLang="zh-CN" b="0" i="1" smtClean="0">
+                            <a:latin typeface="Cambria Math"/>
+                          </a:rPr>
+                        </m:ctrlPr>
+                      </m:dPr>
+                      <m:e>
+                        <m:r>
+                          <a:rPr lang="en-US" altLang="zh-CN" b="0" i="1" smtClean="0">
+                            <a:latin typeface="Cambria Math"/>
+                          </a:rPr>
+                          <m:t>1,…,</m:t>
+                        </m:r>
+                        <m:r>
+                          <a:rPr lang="en-US" altLang="zh-CN" b="0" i="1" smtClean="0">
+                            <a:latin typeface="Cambria Math"/>
+                          </a:rPr>
+                          <m:t>𝑑</m:t>
+                        </m:r>
+                      </m:e>
+                    </m:d>
+                  </m:oMath>
+                </a14:m>
+                <a:endParaRPr lang="en-US" altLang="zh-CN" b="0" dirty="0" smtClean="0"/>
+              </a:p>
+              <a:p>
+                <a:pPr marL="0" indent="0">
+                  <a:buNone/>
+                </a:pPr>
+                <a14:m>
+                  <m:oMathPara xmlns:m="http://schemas.openxmlformats.org/officeDocument/2006/math">
+                    <m:oMathParaPr>
+                      <m:jc m:val="left"/>
+                    </m:oMathParaPr>
+                    <m:oMath xmlns:m="http://schemas.openxmlformats.org/officeDocument/2006/math">
+                      <m:sSub>
+                        <m:sSubPr>
+                          <m:ctrlPr>
+                            <a:rPr lang="en-US" altLang="zh-CN" b="0" i="1" smtClean="0">
+                              <a:latin typeface="Cambria Math"/>
+                            </a:rPr>
+                          </m:ctrlPr>
+                        </m:sSubPr>
+                        <m:e>
+                          <m:r>
+                            <a:rPr lang="en-US" altLang="zh-CN" b="0" i="1" smtClean="0">
+                              <a:latin typeface="Cambria Math"/>
+                            </a:rPr>
+                            <m:t>𝑚</m:t>
+                          </m:r>
+                        </m:e>
+                        <m:sub>
+                          <m:r>
+                            <a:rPr lang="en-US" altLang="zh-CN" b="0" i="1" smtClean="0">
+                              <a:latin typeface="Cambria Math"/>
+                            </a:rPr>
+                            <m:t>𝑖</m:t>
+                          </m:r>
+                        </m:sub>
+                      </m:sSub>
+                      <m:r>
+                        <a:rPr lang="en-US" altLang="zh-CN" b="0" i="1" smtClean="0">
+                          <a:latin typeface="Cambria Math"/>
+                        </a:rPr>
+                        <m:t>=</m:t>
+                      </m:r>
+                      <m:d>
+                        <m:dPr>
+                          <m:begChr m:val="|"/>
+                          <m:endChr m:val="|"/>
+                          <m:ctrlPr>
+                            <a:rPr lang="en-US" altLang="zh-CN" b="0" i="1" smtClean="0">
+                              <a:latin typeface="Cambria Math"/>
+                            </a:rPr>
+                          </m:ctrlPr>
+                        </m:dPr>
+                        <m:e>
+                          <m:d>
+                            <m:dPr>
+                              <m:begChr m:val="{"/>
+                              <m:endChr m:val="}"/>
+                              <m:ctrlPr>
+                                <a:rPr lang="en-US" altLang="zh-CN" b="0" i="1" smtClean="0">
+                                  <a:latin typeface="Cambria Math"/>
+                                </a:rPr>
+                              </m:ctrlPr>
+                            </m:dPr>
+                            <m:e>
+                              <m:r>
+                                <a:rPr lang="en-US" altLang="zh-CN" b="0" i="1" smtClean="0">
+                                  <a:latin typeface="Cambria Math"/>
+                                </a:rPr>
+                                <m:t>𝑗</m:t>
+                              </m:r>
+                            </m:e>
+                            <m:e>
+                              <m:sSub>
+                                <m:sSubPr>
+                                  <m:ctrlPr>
+                                    <a:rPr lang="en-US" altLang="zh-CN" b="0" i="1" smtClean="0">
+                                      <a:latin typeface="Cambria Math"/>
+                                    </a:rPr>
+                                  </m:ctrlPr>
+                                </m:sSubPr>
+                                <m:e>
+                                  <m:r>
+                                    <a:rPr lang="en-US" altLang="zh-CN" b="0" i="1" smtClean="0">
+                                      <a:latin typeface="Cambria Math"/>
+                                    </a:rPr>
+                                    <m:t>𝑥</m:t>
+                                  </m:r>
+                                </m:e>
+                                <m:sub>
+                                  <m:r>
+                                    <a:rPr lang="en-US" altLang="zh-CN" b="0" i="1" smtClean="0">
+                                      <a:latin typeface="Cambria Math"/>
+                                    </a:rPr>
+                                    <m:t>𝑗</m:t>
+                                  </m:r>
+                                </m:sub>
+                              </m:sSub>
+                              <m:r>
+                                <a:rPr lang="en-US" altLang="zh-CN" b="0" i="1" smtClean="0">
+                                  <a:latin typeface="Cambria Math"/>
+                                </a:rPr>
+                                <m:t>=</m:t>
+                              </m:r>
+                              <m:r>
+                                <a:rPr lang="en-US" altLang="zh-CN" b="0" i="1" smtClean="0">
+                                  <a:latin typeface="Cambria Math"/>
+                                </a:rPr>
+                                <m:t>𝑖</m:t>
+                              </m:r>
+                            </m:e>
+                          </m:d>
+                        </m:e>
+                      </m:d>
+                    </m:oMath>
+                  </m:oMathPara>
+                </a14:m>
+                <a:endParaRPr lang="en-US" altLang="zh-CN" b="0" dirty="0" smtClean="0"/>
+              </a:p>
+              <a:p>
+                <a:pPr marL="0" indent="0">
+                  <a:buNone/>
+                </a:pPr>
+                <a14:m>
+                  <m:oMathPara xmlns:m="http://schemas.openxmlformats.org/officeDocument/2006/math">
+                    <m:oMathParaPr>
+                      <m:jc m:val="left"/>
+                    </m:oMathParaPr>
+                    <m:oMath xmlns:m="http://schemas.openxmlformats.org/officeDocument/2006/math">
+                      <m:sSub>
+                        <m:sSubPr>
+                          <m:ctrlPr>
+                            <a:rPr lang="en-US" altLang="zh-CN" b="0" i="1" smtClean="0">
+                              <a:latin typeface="Cambria Math"/>
+                            </a:rPr>
+                          </m:ctrlPr>
+                        </m:sSubPr>
+                        <m:e>
+                          <m:r>
+                            <a:rPr lang="en-US" altLang="zh-CN" b="0" i="1" smtClean="0">
+                              <a:latin typeface="Cambria Math"/>
+                            </a:rPr>
+                            <m:t>𝐹</m:t>
+                          </m:r>
+                        </m:e>
+                        <m:sub>
+                          <m:r>
+                            <a:rPr lang="en-US" altLang="zh-CN" b="0" i="1" smtClean="0">
+                              <a:latin typeface="Cambria Math"/>
+                            </a:rPr>
+                            <m:t>𝑘</m:t>
+                          </m:r>
+                        </m:sub>
+                      </m:sSub>
+                      <m:r>
+                        <a:rPr lang="en-US" altLang="zh-CN" b="0" i="1" smtClean="0">
+                          <a:latin typeface="Cambria Math"/>
+                        </a:rPr>
+                        <m:t>= </m:t>
+                      </m:r>
+                      <m:nary>
+                        <m:naryPr>
+                          <m:chr m:val="∑"/>
+                          <m:limLoc m:val="subSup"/>
+                          <m:ctrlPr>
+                            <a:rPr lang="en-US" altLang="zh-CN" b="0" i="1" smtClean="0">
+                              <a:latin typeface="Cambria Math"/>
+                            </a:rPr>
+                          </m:ctrlPr>
+                        </m:naryPr>
+                        <m:sub>
+                          <m:r>
+                            <m:rPr>
+                              <m:brk m:alnAt="25"/>
+                            </m:rPr>
+                            <a:rPr lang="en-US" altLang="zh-CN" b="0" i="1" smtClean="0">
+                              <a:latin typeface="Cambria Math"/>
+                            </a:rPr>
+                            <m:t>𝑖</m:t>
+                          </m:r>
+                          <m:r>
+                            <a:rPr lang="en-US" altLang="zh-CN" b="0" i="1" smtClean="0">
+                              <a:latin typeface="Cambria Math"/>
+                            </a:rPr>
+                            <m:t>=1</m:t>
+                          </m:r>
+                        </m:sub>
+                        <m:sup>
+                          <m:r>
+                            <a:rPr lang="en-US" altLang="zh-CN" b="0" i="1" smtClean="0">
+                              <a:latin typeface="Cambria Math"/>
+                            </a:rPr>
+                            <m:t>𝑑</m:t>
+                          </m:r>
+                        </m:sup>
+                        <m:e>
+                          <m:sSubSup>
+                            <m:sSubSupPr>
+                              <m:ctrlPr>
+                                <a:rPr lang="en-US" altLang="zh-CN" b="0" i="1" smtClean="0">
+                                  <a:latin typeface="Cambria Math"/>
+                                </a:rPr>
+                              </m:ctrlPr>
+                            </m:sSubSupPr>
+                            <m:e>
+                              <m:r>
+                                <a:rPr lang="en-US" altLang="zh-CN" b="0" i="1" smtClean="0">
+                                  <a:latin typeface="Cambria Math"/>
+                                </a:rPr>
+                                <m:t>𝑚</m:t>
+                              </m:r>
+                            </m:e>
+                            <m:sub>
+                              <m:r>
+                                <a:rPr lang="en-US" altLang="zh-CN" b="0" i="1" smtClean="0">
+                                  <a:latin typeface="Cambria Math"/>
+                                </a:rPr>
+                                <m:t>𝑖</m:t>
+                              </m:r>
+                            </m:sub>
+                            <m:sup>
+                              <m:r>
+                                <a:rPr lang="en-US" altLang="zh-CN" b="0" i="1" smtClean="0">
+                                  <a:latin typeface="Cambria Math"/>
+                                </a:rPr>
+                                <m:t>𝑘</m:t>
+                              </m:r>
+                            </m:sup>
+                          </m:sSubSup>
+                        </m:e>
+                      </m:nary>
+                    </m:oMath>
+                  </m:oMathPara>
+                </a14:m>
+                <a:endParaRPr lang="en-US" altLang="zh-CN" b="0" dirty="0" smtClean="0"/>
+              </a:p>
+              <a:p>
+                <a:pPr marL="0" indent="0">
+                  <a:buNone/>
+                </a:pPr>
+                <a14:m>
+                  <m:oMath xmlns:m="http://schemas.openxmlformats.org/officeDocument/2006/math">
+                    <m:sSub>
+                      <m:sSubPr>
+                        <m:ctrlPr>
+                          <a:rPr lang="en-US" altLang="zh-CN" b="0" i="1" smtClean="0">
+                            <a:latin typeface="Cambria Math"/>
+                          </a:rPr>
+                        </m:ctrlPr>
+                      </m:sSubPr>
+                      <m:e>
+                        <m:r>
+                          <a:rPr lang="en-US" altLang="zh-CN" b="0" i="1" smtClean="0">
+                            <a:latin typeface="Cambria Math"/>
+                          </a:rPr>
+                          <m:t>𝐹</m:t>
+                        </m:r>
+                      </m:e>
+                      <m:sub>
+                        <m:r>
+                          <a:rPr lang="en-US" altLang="zh-CN" b="0" i="1" smtClean="0">
+                            <a:latin typeface="Cambria Math"/>
+                          </a:rPr>
+                          <m:t>0</m:t>
+                        </m:r>
+                      </m:sub>
+                    </m:sSub>
+                    <m:r>
+                      <a:rPr lang="en-US" altLang="zh-CN" b="0" i="0" smtClean="0">
+                        <a:latin typeface="Cambria Math"/>
+                      </a:rPr>
+                      <m:t>:</m:t>
+                    </m:r>
+                  </m:oMath>
+                </a14:m>
+                <a:r>
+                  <a:rPr lang="en-US" altLang="zh-CN" b="0" dirty="0" smtClean="0"/>
+                  <a:t> # of unique elements</a:t>
+                </a:r>
+              </a:p>
+              <a:p>
+                <a:pPr marL="0" indent="0">
+                  <a:buNone/>
+                </a:pPr>
+                <a14:m>
+                  <m:oMath xmlns:m="http://schemas.openxmlformats.org/officeDocument/2006/math">
+                    <m:sSub>
+                      <m:sSubPr>
+                        <m:ctrlPr>
+                          <a:rPr lang="en-US" altLang="zh-CN" b="0" i="1" smtClean="0">
+                            <a:latin typeface="Cambria Math"/>
+                          </a:rPr>
+                        </m:ctrlPr>
+                      </m:sSubPr>
+                      <m:e>
+                        <m:r>
+                          <a:rPr lang="en-US" altLang="zh-CN" b="0" i="1" smtClean="0">
+                            <a:latin typeface="Cambria Math"/>
+                          </a:rPr>
+                          <m:t>𝐹</m:t>
+                        </m:r>
+                      </m:e>
+                      <m:sub>
+                        <m:r>
+                          <a:rPr lang="en-US" altLang="zh-CN" b="0" i="1" smtClean="0">
+                            <a:latin typeface="Cambria Math"/>
+                          </a:rPr>
+                          <m:t>1</m:t>
+                        </m:r>
+                      </m:sub>
+                    </m:sSub>
+                  </m:oMath>
+                </a14:m>
+                <a:r>
+                  <a:rPr lang="en-US" altLang="zh-CN" b="0" dirty="0" smtClean="0"/>
+                  <a:t>: </a:t>
+                </a:r>
+                <a:r>
+                  <a:rPr lang="en-US" altLang="zh-CN" dirty="0" smtClean="0"/>
+                  <a:t># of elements</a:t>
+                </a:r>
+              </a:p>
+              <a:p>
+                <a:pPr marL="0" indent="0">
+                  <a:buNone/>
+                </a:pPr>
+                <a14:m>
+                  <m:oMath xmlns:m="http://schemas.openxmlformats.org/officeDocument/2006/math">
+                    <m:sSub>
+                      <m:sSubPr>
+                        <m:ctrlPr>
+                          <a:rPr lang="en-US" altLang="zh-CN" b="0" i="1" smtClean="0">
+                            <a:latin typeface="Cambria Math"/>
+                          </a:rPr>
+                        </m:ctrlPr>
+                      </m:sSubPr>
+                      <m:e>
+                        <m:r>
+                          <a:rPr lang="en-US" altLang="zh-CN" b="0" i="1" smtClean="0">
+                            <a:latin typeface="Cambria Math"/>
+                          </a:rPr>
+                          <m:t>𝐹</m:t>
+                        </m:r>
+                      </m:e>
+                      <m:sub>
+                        <m:r>
+                          <a:rPr lang="en-US" altLang="zh-CN" b="0" i="1" smtClean="0">
+                            <a:latin typeface="Cambria Math"/>
+                          </a:rPr>
+                          <m:t>2</m:t>
+                        </m:r>
+                      </m:sub>
+                    </m:sSub>
+                  </m:oMath>
+                </a14:m>
+                <a:r>
+                  <a:rPr lang="en-US" altLang="zh-CN" b="0" dirty="0" smtClean="0"/>
+                  <a:t>: </a:t>
+                </a:r>
+                <a:r>
+                  <a:rPr lang="en-US" altLang="zh-CN" dirty="0" smtClean="0"/>
+                  <a:t>size of self-join, use to estimate large join size</a:t>
+                </a:r>
+              </a:p>
+              <a:p>
+                <a:pPr/>
+                <a:r>
+                  <a:rPr lang="en-US" altLang="zh-CN" dirty="0"/>
+                  <a:t>Principal Component Analysis (PCA)</a:t>
+                </a:r>
+                <a:endParaRPr lang="en-US" altLang="zh-CN" b="0" dirty="0" smtClean="0"/>
+              </a:p>
+            </p:txBody>
+          </p:sp>
+        </mc:Choice>
+        <mc:Fallback>
+          <p:sp>
+            <p:nvSpPr>
+              <p:cNvPr id="3" name="内容占位符 2"/>
+              <p:cNvSpPr>
+                <a:spLocks noGrp="1" noRot="1" noChangeAspect="1" noMove="1" noResize="1" noEditPoints="1" noAdjustHandles="1" noChangeArrowheads="1" noChangeShapeType="1" noTextEdit="1"/>
+              </p:cNvSpPr>
+              <p:nvPr>
+                <p:ph idx="1"/>
+              </p:nvPr>
+            </p:nvSpPr>
+            <p:spPr>
+              <a:blipFill rotWithShape="1">
+                <a:blip r:embed="rId2"/>
+                <a:stretch>
+                  <a:fillRect l="-616" t="-806"/>
+                </a:stretch>
+              </a:blipFill>
+            </p:spPr>
+            <p:txBody>
+              <a:bodyPr/>
+              <a:lstStyle/>
+              <a:p>
+                <a:r>
+                  <a:rPr lang="zh-CN" altLang="en-US">
+                    <a:noFill/>
+                  </a:rPr>
+                  <a:t> </a:t>
+                </a:r>
+              </a:p>
+            </p:txBody>
+          </p:sp>
+        </mc:Fallback>
+      </mc:AlternateContent>
+    </p:spTree>
+    <p:extLst>
+      <p:ext uri="{BB962C8B-B14F-4D97-AF65-F5344CB8AC3E}">
+        <p14:creationId xmlns:p14="http://schemas.microsoft.com/office/powerpoint/2010/main" val="858204883"/>
+      </p:ext>
+    </p:extLst>
+  </p:cSld>
+  <p:clrMapOvr>
+    <a:masterClrMapping/>
+  </p:clrMapOvr>
+</p:sld>
+</file>
+
+<file path=ppt/slides/slide51.xml><?xml version="1.0" encoding="utf-8"?>
+<p:sld xmlns:a="http://schemas.openxmlformats.org/drawingml/2006/main" xmlns:r="http://schemas.openxmlformats.org/officeDocument/2006/relationships" xmlns:p="http://schemas.openxmlformats.org/presentationml/2006/main">
+  <p:cSld>
+    <p:spTree>
+      <p:nvGrpSpPr>
+        <p:cNvPr id="1" name=""/>
+        <p:cNvGrpSpPr/>
+        <p:nvPr/>
+      </p:nvGrpSpPr>
+      <p:grpSpPr>
+        <a:xfrm>
+          <a:off x="0" y="0"/>
+          <a:ext cx="0" cy="0"/>
+          <a:chOff x="0" y="0"/>
+          <a:chExt cx="0" cy="0"/>
+        </a:xfrm>
+      </p:grpSpPr>
+      <p:sp>
+        <p:nvSpPr>
+          <p:cNvPr id="2" name="标题 1"/>
+          <p:cNvSpPr>
+            <a:spLocks noGrp="1"/>
+          </p:cNvSpPr>
+          <p:nvPr>
+            <p:ph type="title"/>
+          </p:nvPr>
+        </p:nvSpPr>
+        <p:spPr/>
+        <p:txBody>
+          <a:bodyPr/>
+          <a:lstStyle/>
+          <a:p>
+            <a:pPr algn="ctr"/>
+            <a:r>
+              <a:rPr lang="en-US" altLang="zh-CN" dirty="0"/>
+              <a:t>Synopsis Data </a:t>
+            </a:r>
+            <a:r>
+              <a:rPr lang="en-US" altLang="zh-CN" dirty="0" smtClean="0"/>
+              <a:t>Structures &amp; Aggregation</a:t>
+            </a:r>
+            <a:endParaRPr lang="zh-CN" altLang="en-US" dirty="0"/>
+          </a:p>
+        </p:txBody>
+      </p:sp>
+      <p:sp>
+        <p:nvSpPr>
+          <p:cNvPr id="3" name="内容占位符 2"/>
+          <p:cNvSpPr>
+            <a:spLocks noGrp="1"/>
+          </p:cNvSpPr>
+          <p:nvPr>
+            <p:ph idx="1"/>
+          </p:nvPr>
+        </p:nvSpPr>
+        <p:spPr/>
+        <p:txBody>
+          <a:bodyPr/>
+          <a:lstStyle/>
+          <a:p>
+            <a:r>
+              <a:rPr lang="en-US" altLang="zh-CN" dirty="0"/>
+              <a:t>Synopsis Data Structures</a:t>
+            </a:r>
+            <a:endParaRPr lang="en-US" altLang="zh-CN" dirty="0" smtClean="0"/>
+          </a:p>
+          <a:p>
+            <a:pPr lvl="1"/>
+            <a:r>
+              <a:rPr lang="en-US" altLang="zh-CN" dirty="0" smtClean="0"/>
+              <a:t>Wavelet analysis</a:t>
+            </a:r>
+          </a:p>
+          <a:p>
+            <a:pPr lvl="1"/>
+            <a:r>
+              <a:rPr lang="en-US" altLang="zh-CN" dirty="0" smtClean="0"/>
+              <a:t>Histograms</a:t>
+            </a:r>
+          </a:p>
+          <a:p>
+            <a:pPr lvl="1"/>
+            <a:r>
+              <a:rPr lang="en-US" altLang="zh-CN" dirty="0" err="1" smtClean="0"/>
+              <a:t>Quantiles</a:t>
+            </a:r>
+            <a:endParaRPr lang="en-US" altLang="zh-CN" dirty="0"/>
+          </a:p>
+          <a:p>
+            <a:pPr lvl="1"/>
+            <a:r>
+              <a:rPr lang="en-US" altLang="zh-CN" dirty="0"/>
+              <a:t>f</a:t>
+            </a:r>
+            <a:r>
+              <a:rPr lang="en-US" altLang="zh-CN" dirty="0" smtClean="0"/>
+              <a:t>requency moments</a:t>
+            </a:r>
+          </a:p>
+          <a:p>
+            <a:r>
+              <a:rPr lang="en-US" altLang="zh-CN" dirty="0" smtClean="0"/>
+              <a:t>Aggregation</a:t>
+            </a:r>
+          </a:p>
+          <a:p>
+            <a:pPr lvl="1"/>
+            <a:r>
+              <a:rPr lang="en-US" altLang="zh-CN" dirty="0" smtClean="0"/>
+              <a:t>Means</a:t>
+            </a:r>
+          </a:p>
+          <a:p>
+            <a:pPr lvl="1"/>
+            <a:r>
+              <a:rPr lang="en-US" altLang="zh-CN" dirty="0" smtClean="0"/>
+              <a:t>Variances</a:t>
+            </a:r>
+          </a:p>
+          <a:p>
+            <a:pPr lvl="1"/>
+            <a:r>
+              <a:rPr lang="en-US" altLang="zh-CN" dirty="0" smtClean="0"/>
+              <a:t>Other </a:t>
+            </a:r>
+            <a:r>
+              <a:rPr lang="en-US" altLang="zh-CN" dirty="0"/>
+              <a:t>statistical </a:t>
+            </a:r>
+            <a:r>
+              <a:rPr lang="en-US" altLang="zh-CN" dirty="0" smtClean="0"/>
+              <a:t> aggregated data</a:t>
+            </a:r>
+            <a:endParaRPr lang="zh-CN" altLang="en-US" dirty="0"/>
+          </a:p>
+        </p:txBody>
+      </p:sp>
+    </p:spTree>
+    <p:extLst>
+      <p:ext uri="{BB962C8B-B14F-4D97-AF65-F5344CB8AC3E}">
+        <p14:creationId xmlns:p14="http://schemas.microsoft.com/office/powerpoint/2010/main" val="772525432"/>
+      </p:ext>
+    </p:extLst>
+  </p:cSld>
+  <p:clrMapOvr>
+    <a:masterClrMapping/>
+  </p:clrMapOvr>
 </p:sld>
 </file>
 
@@ -31736,7 +33375,7 @@
   <a:extraClrSchemeLst/>
   <a:extLst>
     <a:ext uri="{05A4C25C-085E-4340-85A3-A5531E510DB2}">
-      <thm15:themeFamily xmlns:thm15="http://schemas.microsoft.com/office/thememl/2012/main" xmlns="" name="Wisp" id="{7CB32D59-10C0-40DD-B7BD-2E94284A981C}" vid="{24B1A44C-C006-48B2-A4D7-E5549B3D8CD4}"/>
+      <thm15:themeFamily xmlns="" xmlns:thm15="http://schemas.microsoft.com/office/thememl/2012/main" name="Wisp" id="{7CB32D59-10C0-40DD-B7BD-2E94284A981C}" vid="{24B1A44C-C006-48B2-A4D7-E5549B3D8CD4}"/>
     </a:ext>
   </a:extLst>
 </a:theme>

</xml_diff>

<commit_message>
update suvey and left startup movtivation
</commit_message>
<xml_diff>
--- a/slide/tsdm.pptx
+++ b/slide/tsdm.pptx
@@ -60,6 +60,7 @@
     <p:sldId id="330" r:id="rId54"/>
     <p:sldId id="327" r:id="rId55"/>
     <p:sldId id="328" r:id="rId56"/>
+    <p:sldId id="331" r:id="rId57"/>
   </p:sldIdLst>
   <p:sldSz cx="12192000" cy="6858000"/>
   <p:notesSz cx="6858000" cy="9144000"/>
@@ -160,7 +161,7 @@
   </p:defaultTextStyle>
   <p:extLst>
     <p:ext uri="{EFAFB233-063F-42B5-8137-9DF3F51BA10A}">
-      <p15:sldGuideLst xmlns="" xmlns:p15="http://schemas.microsoft.com/office/powerpoint/2012/main"/>
+      <p15:sldGuideLst xmlns:p15="http://schemas.microsoft.com/office/powerpoint/2012/main" xmlns=""/>
     </p:ext>
   </p:extLst>
 </p:presentation>
@@ -354,7 +355,7 @@
           <a:p>
             <a:fld id="{F77B2EB1-EA88-4503-95EA-93923E5BA59E}" type="datetimeFigureOut">
               <a:rPr lang="en-US" smtClean="0"/>
-              <a:t>3/4/2013</a:t>
+              <a:t>3/5/2013</a:t>
             </a:fld>
             <a:endParaRPr lang="en-US"/>
           </a:p>
@@ -692,7 +693,7 @@
           <a:p>
             <a:fld id="{F77B2EB1-EA88-4503-95EA-93923E5BA59E}" type="datetimeFigureOut">
               <a:rPr lang="en-US" smtClean="0"/>
-              <a:t>3/4/2013</a:t>
+              <a:t>3/5/2013</a:t>
             </a:fld>
             <a:endParaRPr lang="en-US"/>
           </a:p>
@@ -1093,7 +1094,7 @@
           <a:p>
             <a:fld id="{F77B2EB1-EA88-4503-95EA-93923E5BA59E}" type="datetimeFigureOut">
               <a:rPr lang="en-US" smtClean="0"/>
-              <a:t>3/4/2013</a:t>
+              <a:t>3/5/2013</a:t>
             </a:fld>
             <a:endParaRPr lang="en-US"/>
           </a:p>
@@ -1429,7 +1430,7 @@
           <a:p>
             <a:fld id="{F77B2EB1-EA88-4503-95EA-93923E5BA59E}" type="datetimeFigureOut">
               <a:rPr lang="en-US" smtClean="0"/>
-              <a:t>3/4/2013</a:t>
+              <a:t>3/5/2013</a:t>
             </a:fld>
             <a:endParaRPr lang="en-US"/>
           </a:p>
@@ -1749,7 +1750,7 @@
           <a:p>
             <a:fld id="{F77B2EB1-EA88-4503-95EA-93923E5BA59E}" type="datetimeFigureOut">
               <a:rPr lang="en-US" smtClean="0"/>
-              <a:t>3/4/2013</a:t>
+              <a:t>3/5/2013</a:t>
             </a:fld>
             <a:endParaRPr lang="en-US"/>
           </a:p>
@@ -2145,7 +2146,7 @@
           <a:p>
             <a:fld id="{F77B2EB1-EA88-4503-95EA-93923E5BA59E}" type="datetimeFigureOut">
               <a:rPr lang="en-US" smtClean="0"/>
-              <a:t>3/4/2013</a:t>
+              <a:t>3/5/2013</a:t>
             </a:fld>
             <a:endParaRPr lang="en-US"/>
           </a:p>
@@ -2402,7 +2403,7 @@
           <a:p>
             <a:fld id="{F77B2EB1-EA88-4503-95EA-93923E5BA59E}" type="datetimeFigureOut">
               <a:rPr lang="en-US" smtClean="0"/>
-              <a:t>3/4/2013</a:t>
+              <a:t>3/5/2013</a:t>
             </a:fld>
             <a:endParaRPr lang="en-US"/>
           </a:p>
@@ -2664,7 +2665,7 @@
           <a:p>
             <a:fld id="{F77B2EB1-EA88-4503-95EA-93923E5BA59E}" type="datetimeFigureOut">
               <a:rPr lang="en-US" smtClean="0"/>
-              <a:t>3/4/2013</a:t>
+              <a:t>3/5/2013</a:t>
             </a:fld>
             <a:endParaRPr lang="en-US"/>
           </a:p>
@@ -2926,7 +2927,7 @@
           <a:p>
             <a:fld id="{F77B2EB1-EA88-4503-95EA-93923E5BA59E}" type="datetimeFigureOut">
               <a:rPr lang="en-US" smtClean="0"/>
-              <a:t>3/4/2013</a:t>
+              <a:t>3/5/2013</a:t>
             </a:fld>
             <a:endParaRPr lang="en-US"/>
           </a:p>
@@ -3255,7 +3256,7 @@
           <a:p>
             <a:fld id="{F77B2EB1-EA88-4503-95EA-93923E5BA59E}" type="datetimeFigureOut">
               <a:rPr lang="en-US" smtClean="0"/>
-              <a:t>3/4/2013</a:t>
+              <a:t>3/5/2013</a:t>
             </a:fld>
             <a:endParaRPr lang="en-US"/>
           </a:p>
@@ -3578,7 +3579,7 @@
           <a:p>
             <a:fld id="{F77B2EB1-EA88-4503-95EA-93923E5BA59E}" type="datetimeFigureOut">
               <a:rPr lang="en-US" smtClean="0"/>
-              <a:t>3/4/2013</a:t>
+              <a:t>3/5/2013</a:t>
             </a:fld>
             <a:endParaRPr lang="en-US"/>
           </a:p>
@@ -4035,7 +4036,7 @@
           <a:p>
             <a:fld id="{F77B2EB1-EA88-4503-95EA-93923E5BA59E}" type="datetimeFigureOut">
               <a:rPr lang="en-US" smtClean="0"/>
-              <a:t>3/4/2013</a:t>
+              <a:t>3/5/2013</a:t>
             </a:fld>
             <a:endParaRPr lang="en-US"/>
           </a:p>
@@ -4240,7 +4241,7 @@
           <a:p>
             <a:fld id="{F77B2EB1-EA88-4503-95EA-93923E5BA59E}" type="datetimeFigureOut">
               <a:rPr lang="en-US" smtClean="0"/>
-              <a:t>3/4/2013</a:t>
+              <a:t>3/5/2013</a:t>
             </a:fld>
             <a:endParaRPr lang="en-US"/>
           </a:p>
@@ -4417,7 +4418,7 @@
           <a:p>
             <a:fld id="{F77B2EB1-EA88-4503-95EA-93923E5BA59E}" type="datetimeFigureOut">
               <a:rPr lang="en-US" smtClean="0"/>
-              <a:t>3/4/2013</a:t>
+              <a:t>3/5/2013</a:t>
             </a:fld>
             <a:endParaRPr lang="en-US"/>
           </a:p>
@@ -4750,7 +4751,7 @@
           <a:p>
             <a:fld id="{F77B2EB1-EA88-4503-95EA-93923E5BA59E}" type="datetimeFigureOut">
               <a:rPr lang="en-US" smtClean="0"/>
-              <a:t>3/4/2013</a:t>
+              <a:t>3/5/2013</a:t>
             </a:fld>
             <a:endParaRPr lang="en-US"/>
           </a:p>
@@ -5095,7 +5096,7 @@
           <a:p>
             <a:fld id="{F77B2EB1-EA88-4503-95EA-93923E5BA59E}" type="datetimeFigureOut">
               <a:rPr lang="en-US" smtClean="0"/>
-              <a:t>3/4/2013</a:t>
+              <a:t>3/5/2013</a:t>
             </a:fld>
             <a:endParaRPr lang="en-US"/>
           </a:p>
@@ -7212,7 +7213,7 @@
           <a:p>
             <a:fld id="{F77B2EB1-EA88-4503-95EA-93923E5BA59E}" type="datetimeFigureOut">
               <a:rPr lang="en-US" smtClean="0"/>
-              <a:t>3/4/2013</a:t>
+              <a:t>3/5/2013</a:t>
             </a:fld>
             <a:endParaRPr lang="en-US"/>
           </a:p>
@@ -26439,7 +26440,7 @@
           <a:graphicData uri="http://schemas.openxmlformats.org/presentationml/2006/ole">
             <mc:AlternateContent xmlns:mc="http://schemas.openxmlformats.org/markup-compatibility/2006">
               <mc:Choice xmlns:v="urn:schemas-microsoft-com:vml" Requires="v">
-                <p:oleObj spid="_x0000_s1076" name="點陣圖影像" r:id="rId3" imgW="4638095" imgH="2534004" progId="PBrush">
+                <p:oleObj spid="_x0000_s1080" name="點陣圖影像" r:id="rId3" imgW="4638095" imgH="2534004" progId="PBrush">
                   <p:embed/>
                 </p:oleObj>
               </mc:Choice>
@@ -26510,7 +26511,7 @@
           <a:graphicData uri="http://schemas.openxmlformats.org/presentationml/2006/ole">
             <mc:AlternateContent xmlns:mc="http://schemas.openxmlformats.org/markup-compatibility/2006">
               <mc:Choice xmlns:v="urn:schemas-microsoft-com:vml" Requires="v">
-                <p:oleObj spid="_x0000_s1077" name="BMP 图像" r:id="rId5" imgW="4381560" imgH="1305000" progId="Paint.Picture">
+                <p:oleObj spid="_x0000_s1081" name="BMP 图像" r:id="rId5" imgW="4381560" imgH="1305000" progId="Paint.Picture">
                   <p:embed/>
                 </p:oleObj>
               </mc:Choice>
@@ -33022,8 +33023,8 @@
           </a:p>
         </p:txBody>
       </p:sp>
-      <mc:AlternateContent xmlns:mc="http://schemas.openxmlformats.org/markup-compatibility/2006">
-        <mc:Choice xmlns:a14="http://schemas.microsoft.com/office/drawing/2010/main" Requires="a14">
+      <mc:AlternateContent xmlns:mc="http://schemas.openxmlformats.org/markup-compatibility/2006" xmlns:a14="http://schemas.microsoft.com/office/drawing/2010/main">
+        <mc:Choice Requires="a14">
           <p:sp>
             <p:nvSpPr>
               <p:cNvPr id="3" name="内容占位符 2"/>
@@ -33236,7 +33237,7 @@
             </p:txBody>
           </p:sp>
         </mc:Choice>
-        <mc:Fallback>
+        <mc:Fallback xmlns="">
           <p:sp>
             <p:nvSpPr>
               <p:cNvPr id="3" name="内容占位符 2"/>
@@ -33475,6 +33476,996 @@
       </p:par>
     </p:tnLst>
   </p:timing>
+</p:sld>
+</file>
+
+<file path=ppt/slides/slide56.xml><?xml version="1.0" encoding="utf-8"?>
+<p:sld xmlns:a="http://schemas.openxmlformats.org/drawingml/2006/main" xmlns:r="http://schemas.openxmlformats.org/officeDocument/2006/relationships" xmlns:p="http://schemas.openxmlformats.org/presentationml/2006/main">
+  <p:cSld>
+    <p:spTree>
+      <p:nvGrpSpPr>
+        <p:cNvPr id="1" name=""/>
+        <p:cNvGrpSpPr/>
+        <p:nvPr/>
+      </p:nvGrpSpPr>
+      <p:grpSpPr>
+        <a:xfrm>
+          <a:off x="0" y="0"/>
+          <a:ext cx="0" cy="0"/>
+          <a:chOff x="0" y="0"/>
+          <a:chExt cx="0" cy="0"/>
+        </a:xfrm>
+      </p:grpSpPr>
+      <p:sp>
+        <p:nvSpPr>
+          <p:cNvPr id="2" name="标题 1"/>
+          <p:cNvSpPr>
+            <a:spLocks noGrp="1"/>
+          </p:cNvSpPr>
+          <p:nvPr>
+            <p:ph type="title"/>
+          </p:nvPr>
+        </p:nvSpPr>
+        <p:spPr/>
+        <p:txBody>
+          <a:bodyPr/>
+          <a:lstStyle/>
+          <a:p>
+            <a:pPr algn="ctr"/>
+            <a:r>
+              <a:rPr lang="en-US" altLang="zh-CN" dirty="0" smtClean="0"/>
+              <a:t>Data Stream Frequent pattern Mining</a:t>
+            </a:r>
+            <a:endParaRPr lang="zh-CN" altLang="en-US" dirty="0"/>
+          </a:p>
+        </p:txBody>
+      </p:sp>
+      <mc:AlternateContent xmlns:mc="http://schemas.openxmlformats.org/markup-compatibility/2006">
+        <mc:Choice xmlns:a14="http://schemas.microsoft.com/office/drawing/2010/main" Requires="a14">
+          <p:sp>
+            <p:nvSpPr>
+              <p:cNvPr id="3" name="内容占位符 2"/>
+              <p:cNvSpPr>
+                <a:spLocks noGrp="1"/>
+              </p:cNvSpPr>
+              <p:nvPr>
+                <p:ph idx="1"/>
+              </p:nvPr>
+            </p:nvSpPr>
+            <p:spPr>
+              <a:xfrm>
+                <a:off x="2589212" y="1749778"/>
+                <a:ext cx="8915400" cy="4161444"/>
+              </a:xfrm>
+            </p:spPr>
+            <p:txBody>
+              <a:bodyPr/>
+              <a:lstStyle/>
+              <a:p>
+                <a14:m>
+                  <m:oMath xmlns:m="http://schemas.openxmlformats.org/officeDocument/2006/math">
+                    <m:r>
+                      <a:rPr lang="en-US" altLang="zh-CN" b="0" i="1" smtClean="0">
+                        <a:latin typeface="Cambria Math"/>
+                      </a:rPr>
+                      <m:t>𝐷</m:t>
+                    </m:r>
+                    <m:r>
+                      <a:rPr lang="en-US" altLang="zh-CN" b="0" i="1" smtClean="0">
+                        <a:latin typeface="Cambria Math"/>
+                      </a:rPr>
+                      <m:t>={</m:t>
+                    </m:r>
+                    <m:d>
+                      <m:dPr>
+                        <m:begChr m:val="{"/>
+                        <m:endChr m:val="}"/>
+                        <m:ctrlPr>
+                          <a:rPr lang="en-US" altLang="zh-CN" b="0" i="1" smtClean="0">
+                            <a:latin typeface="Cambria Math"/>
+                          </a:rPr>
+                        </m:ctrlPr>
+                      </m:dPr>
+                      <m:e>
+                        <m:r>
+                          <a:rPr lang="en-US" altLang="zh-CN" b="0" i="1" smtClean="0">
+                            <a:latin typeface="Cambria Math"/>
+                          </a:rPr>
+                          <m:t>𝐴</m:t>
+                        </m:r>
+                        <m:r>
+                          <a:rPr lang="en-US" altLang="zh-CN" b="0" i="1" smtClean="0">
+                            <a:latin typeface="Cambria Math"/>
+                          </a:rPr>
+                          <m:t>,</m:t>
+                        </m:r>
+                        <m:r>
+                          <a:rPr lang="en-US" altLang="zh-CN" b="0" i="1" smtClean="0">
+                            <a:latin typeface="Cambria Math"/>
+                          </a:rPr>
+                          <m:t>𝐵</m:t>
+                        </m:r>
+                        <m:r>
+                          <a:rPr lang="en-US" altLang="zh-CN" b="0" i="1" smtClean="0">
+                            <a:latin typeface="Cambria Math"/>
+                          </a:rPr>
+                          <m:t>,</m:t>
+                        </m:r>
+                        <m:r>
+                          <a:rPr lang="en-US" altLang="zh-CN" b="0" i="1" smtClean="0">
+                            <a:latin typeface="Cambria Math"/>
+                          </a:rPr>
+                          <m:t>𝐷</m:t>
+                        </m:r>
+                        <m:r>
+                          <a:rPr lang="en-US" altLang="zh-CN" b="0" i="1" smtClean="0">
+                            <a:latin typeface="Cambria Math"/>
+                          </a:rPr>
+                          <m:t>,</m:t>
+                        </m:r>
+                        <m:r>
+                          <a:rPr lang="en-US" altLang="zh-CN" b="0" i="1" smtClean="0">
+                            <a:latin typeface="Cambria Math"/>
+                          </a:rPr>
+                          <m:t>𝐸</m:t>
+                        </m:r>
+                      </m:e>
+                    </m:d>
+                    <m:r>
+                      <a:rPr lang="en-US" altLang="zh-CN" b="0" i="1" smtClean="0">
+                        <a:latin typeface="Cambria Math"/>
+                      </a:rPr>
+                      <m:t>, </m:t>
+                    </m:r>
+                    <m:d>
+                      <m:dPr>
+                        <m:begChr m:val="{"/>
+                        <m:endChr m:val="}"/>
+                        <m:ctrlPr>
+                          <a:rPr lang="en-US" altLang="zh-CN" b="0" i="1" smtClean="0">
+                            <a:latin typeface="Cambria Math"/>
+                          </a:rPr>
+                        </m:ctrlPr>
+                      </m:dPr>
+                      <m:e>
+                        <m:r>
+                          <a:rPr lang="en-US" altLang="zh-CN" b="0" i="1" smtClean="0">
+                            <a:latin typeface="Cambria Math"/>
+                          </a:rPr>
+                          <m:t>𝐵</m:t>
+                        </m:r>
+                        <m:r>
+                          <a:rPr lang="en-US" altLang="zh-CN" b="0" i="1" smtClean="0">
+                            <a:latin typeface="Cambria Math"/>
+                          </a:rPr>
+                          <m:t>,</m:t>
+                        </m:r>
+                        <m:r>
+                          <a:rPr lang="en-US" altLang="zh-CN" b="0" i="1" smtClean="0">
+                            <a:latin typeface="Cambria Math"/>
+                          </a:rPr>
+                          <m:t>𝐶</m:t>
+                        </m:r>
+                        <m:r>
+                          <a:rPr lang="en-US" altLang="zh-CN" b="0" i="1" smtClean="0">
+                            <a:latin typeface="Cambria Math"/>
+                          </a:rPr>
+                          <m:t>,</m:t>
+                        </m:r>
+                        <m:r>
+                          <a:rPr lang="en-US" altLang="zh-CN" b="0" i="1" smtClean="0">
+                            <a:latin typeface="Cambria Math"/>
+                          </a:rPr>
+                          <m:t>𝐸</m:t>
+                        </m:r>
+                      </m:e>
+                    </m:d>
+                    <m:r>
+                      <a:rPr lang="en-US" altLang="zh-CN" b="0" i="1" smtClean="0">
+                        <a:latin typeface="Cambria Math"/>
+                      </a:rPr>
+                      <m:t>, </m:t>
+                    </m:r>
+                    <m:d>
+                      <m:dPr>
+                        <m:begChr m:val="{"/>
+                        <m:endChr m:val="}"/>
+                        <m:ctrlPr>
+                          <a:rPr lang="en-US" altLang="zh-CN" b="0" i="1" smtClean="0">
+                            <a:latin typeface="Cambria Math"/>
+                          </a:rPr>
+                        </m:ctrlPr>
+                      </m:dPr>
+                      <m:e>
+                        <m:r>
+                          <a:rPr lang="en-US" altLang="zh-CN" b="0" i="1" smtClean="0">
+                            <a:latin typeface="Cambria Math"/>
+                          </a:rPr>
+                          <m:t>𝐴</m:t>
+                        </m:r>
+                        <m:r>
+                          <a:rPr lang="en-US" altLang="zh-CN" b="0" i="1" smtClean="0">
+                            <a:latin typeface="Cambria Math"/>
+                          </a:rPr>
+                          <m:t>, </m:t>
+                        </m:r>
+                        <m:r>
+                          <a:rPr lang="en-US" altLang="zh-CN" b="0" i="1" smtClean="0">
+                            <a:latin typeface="Cambria Math"/>
+                          </a:rPr>
+                          <m:t>𝐵</m:t>
+                        </m:r>
+                        <m:r>
+                          <a:rPr lang="en-US" altLang="zh-CN" b="0" i="1" smtClean="0">
+                            <a:latin typeface="Cambria Math"/>
+                          </a:rPr>
+                          <m:t>, </m:t>
+                        </m:r>
+                        <m:r>
+                          <a:rPr lang="en-US" altLang="zh-CN" b="0" i="1" smtClean="0">
+                            <a:latin typeface="Cambria Math"/>
+                          </a:rPr>
+                          <m:t>𝐸</m:t>
+                        </m:r>
+                      </m:e>
+                    </m:d>
+                    <m:r>
+                      <a:rPr lang="en-US" altLang="zh-CN" b="0" i="1" smtClean="0">
+                        <a:latin typeface="Cambria Math"/>
+                      </a:rPr>
+                      <m:t>, </m:t>
+                    </m:r>
+                    <m:d>
+                      <m:dPr>
+                        <m:begChr m:val="{"/>
+                        <m:endChr m:val="}"/>
+                        <m:ctrlPr>
+                          <a:rPr lang="en-US" altLang="zh-CN" b="0" i="1" smtClean="0">
+                            <a:latin typeface="Cambria Math"/>
+                          </a:rPr>
+                        </m:ctrlPr>
+                      </m:dPr>
+                      <m:e>
+                        <m:r>
+                          <a:rPr lang="en-US" altLang="zh-CN" b="0" i="1" smtClean="0">
+                            <a:latin typeface="Cambria Math"/>
+                          </a:rPr>
+                          <m:t>𝐴</m:t>
+                        </m:r>
+                        <m:r>
+                          <a:rPr lang="en-US" altLang="zh-CN" b="0" i="1" smtClean="0">
+                            <a:latin typeface="Cambria Math"/>
+                          </a:rPr>
+                          <m:t>, </m:t>
+                        </m:r>
+                        <m:r>
+                          <a:rPr lang="en-US" altLang="zh-CN" b="0" i="1" smtClean="0">
+                            <a:latin typeface="Cambria Math"/>
+                          </a:rPr>
+                          <m:t>𝐵</m:t>
+                        </m:r>
+                        <m:r>
+                          <a:rPr lang="en-US" altLang="zh-CN" b="0" i="1" smtClean="0">
+                            <a:latin typeface="Cambria Math"/>
+                          </a:rPr>
+                          <m:t>, </m:t>
+                        </m:r>
+                        <m:r>
+                          <a:rPr lang="en-US" altLang="zh-CN" b="0" i="1" smtClean="0">
+                            <a:latin typeface="Cambria Math"/>
+                          </a:rPr>
+                          <m:t>𝐶</m:t>
+                        </m:r>
+                      </m:e>
+                    </m:d>
+                    <m:r>
+                      <a:rPr lang="en-US" altLang="zh-CN" b="0" i="1" smtClean="0">
+                        <a:latin typeface="Cambria Math"/>
+                      </a:rPr>
+                      <m:t>, </m:t>
+                    </m:r>
+                    <m:d>
+                      <m:dPr>
+                        <m:begChr m:val="{"/>
+                        <m:endChr m:val="}"/>
+                        <m:ctrlPr>
+                          <a:rPr lang="en-US" altLang="zh-CN" b="0" i="1" smtClean="0">
+                            <a:latin typeface="Cambria Math"/>
+                          </a:rPr>
+                        </m:ctrlPr>
+                      </m:dPr>
+                      <m:e>
+                        <m:r>
+                          <a:rPr lang="en-US" altLang="zh-CN" b="0" i="1" smtClean="0">
+                            <a:latin typeface="Cambria Math"/>
+                          </a:rPr>
+                          <m:t>𝐴</m:t>
+                        </m:r>
+                        <m:r>
+                          <a:rPr lang="en-US" altLang="zh-CN" b="0" i="1" smtClean="0">
+                            <a:latin typeface="Cambria Math"/>
+                          </a:rPr>
+                          <m:t>, </m:t>
+                        </m:r>
+                        <m:r>
+                          <a:rPr lang="en-US" altLang="zh-CN" b="0" i="1" smtClean="0">
+                            <a:latin typeface="Cambria Math"/>
+                          </a:rPr>
+                          <m:t>𝐶</m:t>
+                        </m:r>
+                      </m:e>
+                    </m:d>
+                    <m:r>
+                      <a:rPr lang="en-US" altLang="zh-CN" b="0" i="1" smtClean="0">
+                        <a:latin typeface="Cambria Math"/>
+                      </a:rPr>
+                      <m:t>, </m:t>
+                    </m:r>
+                    <m:d>
+                      <m:dPr>
+                        <m:begChr m:val="{"/>
+                        <m:endChr m:val="}"/>
+                        <m:ctrlPr>
+                          <a:rPr lang="en-US" altLang="zh-CN" b="0" i="1" smtClean="0">
+                            <a:latin typeface="Cambria Math"/>
+                          </a:rPr>
+                        </m:ctrlPr>
+                      </m:dPr>
+                      <m:e>
+                        <m:r>
+                          <a:rPr lang="en-US" altLang="zh-CN" b="0" i="1" smtClean="0">
+                            <a:latin typeface="Cambria Math"/>
+                          </a:rPr>
+                          <m:t>𝐵</m:t>
+                        </m:r>
+                        <m:r>
+                          <a:rPr lang="en-US" altLang="zh-CN" b="0" i="1" smtClean="0">
+                            <a:latin typeface="Cambria Math"/>
+                          </a:rPr>
+                          <m:t>, </m:t>
+                        </m:r>
+                        <m:r>
+                          <a:rPr lang="en-US" altLang="zh-CN" b="0" i="1" smtClean="0">
+                            <a:latin typeface="Cambria Math"/>
+                          </a:rPr>
+                          <m:t>𝐶</m:t>
+                        </m:r>
+                      </m:e>
+                    </m:d>
+                    <m:r>
+                      <a:rPr lang="en-US" altLang="zh-CN" b="0" i="1" smtClean="0">
+                        <a:latin typeface="Cambria Math"/>
+                      </a:rPr>
+                      <m:t>}</m:t>
+                    </m:r>
+                  </m:oMath>
+                </a14:m>
+                <a:r>
+                  <a:rPr lang="zh-CN" altLang="en-US" dirty="0" smtClean="0"/>
+                  <a:t> </a:t>
+                </a:r>
+                <a:endParaRPr lang="en-US" altLang="zh-CN" dirty="0"/>
+              </a:p>
+              <a:p>
+                <a:pPr marL="0" indent="0">
+                  <a:buNone/>
+                </a:pPr>
+                <a:r>
+                  <a:rPr lang="en-US" altLang="zh-CN" dirty="0" smtClean="0"/>
+                  <a:t> support level </a:t>
+                </a:r>
+                <a14:m>
+                  <m:oMath xmlns:m="http://schemas.openxmlformats.org/officeDocument/2006/math">
+                    <m:r>
+                      <a:rPr lang="en-US" altLang="zh-CN" b="0" i="1" smtClean="0">
+                        <a:latin typeface="Cambria Math"/>
+                      </a:rPr>
+                      <m:t>𝜃</m:t>
+                    </m:r>
+                    <m:r>
+                      <a:rPr lang="en-US" altLang="zh-CN" b="0" i="1" smtClean="0">
+                        <a:latin typeface="Cambria Math"/>
+                      </a:rPr>
+                      <m:t>=50%</m:t>
+                    </m:r>
+                  </m:oMath>
+                </a14:m>
+                <a:endParaRPr lang="en-US" altLang="zh-CN" dirty="0" smtClean="0"/>
+              </a:p>
+              <a:p>
+                <a:pPr marL="0" indent="0">
+                  <a:buNone/>
+                </a:pPr>
+                <a:r>
+                  <a:rPr lang="en-US" altLang="zh-CN" dirty="0" smtClean="0"/>
+                  <a:t>Frequent patterns are: </a:t>
+                </a:r>
+                <a14:m>
+                  <m:oMath xmlns:m="http://schemas.openxmlformats.org/officeDocument/2006/math">
+                    <m:d>
+                      <m:dPr>
+                        <m:begChr m:val="{"/>
+                        <m:endChr m:val="}"/>
+                        <m:ctrlPr>
+                          <a:rPr lang="en-US" altLang="zh-CN" b="0" i="1" smtClean="0">
+                            <a:latin typeface="Cambria Math"/>
+                          </a:rPr>
+                        </m:ctrlPr>
+                      </m:dPr>
+                      <m:e>
+                        <m:r>
+                          <a:rPr lang="en-US" altLang="zh-CN" b="0" i="1" smtClean="0">
+                            <a:latin typeface="Cambria Math"/>
+                          </a:rPr>
+                          <m:t>𝐴</m:t>
+                        </m:r>
+                      </m:e>
+                    </m:d>
+                    <m:r>
+                      <a:rPr lang="en-US" altLang="zh-CN" b="0" i="1" smtClean="0">
+                        <a:latin typeface="Cambria Math"/>
+                      </a:rPr>
+                      <m:t>, </m:t>
+                    </m:r>
+                    <m:d>
+                      <m:dPr>
+                        <m:begChr m:val="{"/>
+                        <m:endChr m:val="}"/>
+                        <m:ctrlPr>
+                          <a:rPr lang="en-US" altLang="zh-CN" b="0" i="1" smtClean="0">
+                            <a:latin typeface="Cambria Math"/>
+                          </a:rPr>
+                        </m:ctrlPr>
+                      </m:dPr>
+                      <m:e>
+                        <m:r>
+                          <a:rPr lang="en-US" altLang="zh-CN" b="0" i="1" smtClean="0">
+                            <a:latin typeface="Cambria Math"/>
+                          </a:rPr>
+                          <m:t>𝐵</m:t>
+                        </m:r>
+                      </m:e>
+                    </m:d>
+                    <m:r>
+                      <a:rPr lang="en-US" altLang="zh-CN" b="0" i="1" smtClean="0">
+                        <a:latin typeface="Cambria Math"/>
+                      </a:rPr>
+                      <m:t>, </m:t>
+                    </m:r>
+                    <m:d>
+                      <m:dPr>
+                        <m:begChr m:val="{"/>
+                        <m:endChr m:val="}"/>
+                        <m:ctrlPr>
+                          <a:rPr lang="en-US" altLang="zh-CN" b="0" i="1" smtClean="0">
+                            <a:latin typeface="Cambria Math"/>
+                          </a:rPr>
+                        </m:ctrlPr>
+                      </m:dPr>
+                      <m:e>
+                        <m:r>
+                          <a:rPr lang="en-US" altLang="zh-CN" b="0" i="1" smtClean="0">
+                            <a:latin typeface="Cambria Math"/>
+                          </a:rPr>
+                          <m:t>𝐶</m:t>
+                        </m:r>
+                      </m:e>
+                    </m:d>
+                    <m:r>
+                      <a:rPr lang="en-US" altLang="zh-CN" b="0" i="1" smtClean="0">
+                        <a:latin typeface="Cambria Math"/>
+                      </a:rPr>
+                      <m:t>, {</m:t>
+                    </m:r>
+                    <m:r>
+                      <a:rPr lang="en-US" altLang="zh-CN" b="0" i="1" smtClean="0">
+                        <a:latin typeface="Cambria Math"/>
+                      </a:rPr>
+                      <m:t>𝐵</m:t>
+                    </m:r>
+                    <m:r>
+                      <a:rPr lang="en-US" altLang="zh-CN" b="0" i="1" smtClean="0">
+                        <a:latin typeface="Cambria Math"/>
+                      </a:rPr>
+                      <m:t>,</m:t>
+                    </m:r>
+                    <m:r>
+                      <a:rPr lang="en-US" altLang="zh-CN" b="0" i="1" smtClean="0">
+                        <a:latin typeface="Cambria Math"/>
+                      </a:rPr>
+                      <m:t>𝐶</m:t>
+                    </m:r>
+                    <m:r>
+                      <a:rPr lang="en-US" altLang="zh-CN" b="0" i="1" smtClean="0">
+                        <a:latin typeface="Cambria Math"/>
+                      </a:rPr>
+                      <m:t>}</m:t>
+                    </m:r>
+                  </m:oMath>
+                </a14:m>
+                <a:endParaRPr lang="en-US" altLang="zh-CN" dirty="0" smtClean="0"/>
+              </a:p>
+              <a:p>
+                <a:r>
+                  <a:rPr lang="en-US" altLang="zh-CN" dirty="0" smtClean="0"/>
+                  <a:t>Data stream </a:t>
+                </a:r>
+                <a14:m>
+                  <m:oMath xmlns:m="http://schemas.openxmlformats.org/officeDocument/2006/math">
+                    <m:r>
+                      <a:rPr lang="en-US" altLang="zh-CN" b="0" i="1" smtClean="0">
+                        <a:latin typeface="Cambria Math"/>
+                      </a:rPr>
+                      <m:t>𝐷</m:t>
+                    </m:r>
+                    <m:r>
+                      <a:rPr lang="en-US" altLang="zh-CN" b="0" i="1" smtClean="0">
+                        <a:latin typeface="Cambria Math"/>
+                      </a:rPr>
+                      <m:t>=</m:t>
+                    </m:r>
+                    <m:d>
+                      <m:dPr>
+                        <m:begChr m:val="{"/>
+                        <m:endChr m:val="}"/>
+                        <m:ctrlPr>
+                          <a:rPr lang="en-US" altLang="zh-CN" b="0" i="1" smtClean="0">
+                            <a:latin typeface="Cambria Math"/>
+                          </a:rPr>
+                        </m:ctrlPr>
+                      </m:dPr>
+                      <m:e>
+                        <m:sSub>
+                          <m:sSubPr>
+                            <m:ctrlPr>
+                              <a:rPr lang="en-US" altLang="zh-CN" b="0" i="1" smtClean="0">
+                                <a:latin typeface="Cambria Math"/>
+                              </a:rPr>
+                            </m:ctrlPr>
+                          </m:sSubPr>
+                          <m:e>
+                            <m:r>
+                              <a:rPr lang="en-US" altLang="zh-CN" b="0" i="1" smtClean="0">
+                                <a:latin typeface="Cambria Math"/>
+                              </a:rPr>
+                              <m:t>𝑡</m:t>
+                            </m:r>
+                          </m:e>
+                          <m:sub>
+                            <m:r>
+                              <a:rPr lang="en-US" altLang="zh-CN" b="0" i="1" smtClean="0">
+                                <a:latin typeface="Cambria Math"/>
+                              </a:rPr>
+                              <m:t>1</m:t>
+                            </m:r>
+                          </m:sub>
+                        </m:sSub>
+                        <m:r>
+                          <a:rPr lang="en-US" altLang="zh-CN" b="0" i="1" smtClean="0">
+                            <a:latin typeface="Cambria Math"/>
+                          </a:rPr>
+                          <m:t>, </m:t>
+                        </m:r>
+                        <m:sSub>
+                          <m:sSubPr>
+                            <m:ctrlPr>
+                              <a:rPr lang="en-US" altLang="zh-CN" b="0" i="1" smtClean="0">
+                                <a:latin typeface="Cambria Math"/>
+                              </a:rPr>
+                            </m:ctrlPr>
+                          </m:sSubPr>
+                          <m:e>
+                            <m:r>
+                              <a:rPr lang="en-US" altLang="zh-CN" b="0" i="1" smtClean="0">
+                                <a:latin typeface="Cambria Math"/>
+                              </a:rPr>
+                              <m:t>𝑡</m:t>
+                            </m:r>
+                          </m:e>
+                          <m:sub>
+                            <m:r>
+                              <a:rPr lang="en-US" altLang="zh-CN" b="0" i="1" smtClean="0">
+                                <a:latin typeface="Cambria Math"/>
+                              </a:rPr>
+                              <m:t>2</m:t>
+                            </m:r>
+                          </m:sub>
+                        </m:sSub>
+                        <m:r>
+                          <a:rPr lang="en-US" altLang="zh-CN" b="0" i="1" smtClean="0">
+                            <a:latin typeface="Cambria Math"/>
+                          </a:rPr>
+                          <m:t>,…,</m:t>
+                        </m:r>
+                        <m:sSub>
+                          <m:sSubPr>
+                            <m:ctrlPr>
+                              <a:rPr lang="en-US" altLang="zh-CN" b="0" i="1" smtClean="0">
+                                <a:latin typeface="Cambria Math"/>
+                              </a:rPr>
+                            </m:ctrlPr>
+                          </m:sSubPr>
+                          <m:e>
+                            <m:r>
+                              <a:rPr lang="en-US" altLang="zh-CN" b="0" i="1" smtClean="0">
+                                <a:latin typeface="Cambria Math"/>
+                              </a:rPr>
+                              <m:t>𝑡</m:t>
+                            </m:r>
+                          </m:e>
+                          <m:sub>
+                            <m:r>
+                              <a:rPr lang="en-US" altLang="zh-CN" b="0" i="1" smtClean="0">
+                                <a:latin typeface="Cambria Math"/>
+                              </a:rPr>
+                              <m:t>𝑖</m:t>
+                            </m:r>
+                          </m:sub>
+                        </m:sSub>
+                        <m:r>
+                          <a:rPr lang="en-US" altLang="zh-CN" b="0" i="1" smtClean="0">
+                            <a:latin typeface="Cambria Math"/>
+                          </a:rPr>
+                          <m:t>,…</m:t>
+                        </m:r>
+                      </m:e>
+                    </m:d>
+                  </m:oMath>
+                </a14:m>
+                <a:r>
+                  <a:rPr lang="en-US" altLang="zh-CN" dirty="0" smtClean="0"/>
+                  <a:t>, window </a:t>
+                </a:r>
+                <a14:m>
+                  <m:oMath xmlns:m="http://schemas.openxmlformats.org/officeDocument/2006/math">
+                    <m:r>
+                      <a:rPr lang="en-US" altLang="zh-CN" b="0" i="1" smtClean="0">
+                        <a:latin typeface="Cambria Math"/>
+                      </a:rPr>
+                      <m:t>𝑊</m:t>
+                    </m:r>
+                    <m:d>
+                      <m:dPr>
+                        <m:begChr m:val="["/>
+                        <m:endChr m:val="]"/>
+                        <m:ctrlPr>
+                          <a:rPr lang="en-US" altLang="zh-CN" b="0" i="1" smtClean="0">
+                            <a:latin typeface="Cambria Math"/>
+                          </a:rPr>
+                        </m:ctrlPr>
+                      </m:dPr>
+                      <m:e>
+                        <m:r>
+                          <a:rPr lang="en-US" altLang="zh-CN" b="0" i="1" smtClean="0">
+                            <a:latin typeface="Cambria Math"/>
+                          </a:rPr>
+                          <m:t>𝑖</m:t>
+                        </m:r>
+                        <m:r>
+                          <a:rPr lang="en-US" altLang="zh-CN" b="0" i="1" smtClean="0">
+                            <a:latin typeface="Cambria Math"/>
+                          </a:rPr>
+                          <m:t>,</m:t>
+                        </m:r>
+                        <m:r>
+                          <a:rPr lang="en-US" altLang="zh-CN" b="0" i="1" smtClean="0">
+                            <a:latin typeface="Cambria Math"/>
+                          </a:rPr>
+                          <m:t>𝑗</m:t>
+                        </m:r>
+                      </m:e>
+                    </m:d>
+                    <m:r>
+                      <a:rPr lang="en-US" altLang="zh-CN" b="0" i="1" smtClean="0">
+                        <a:latin typeface="Cambria Math"/>
+                      </a:rPr>
+                      <m:t>=</m:t>
+                    </m:r>
+                    <m:d>
+                      <m:dPr>
+                        <m:ctrlPr>
+                          <a:rPr lang="en-US" altLang="zh-CN" b="0" i="1" smtClean="0">
+                            <a:latin typeface="Cambria Math"/>
+                          </a:rPr>
+                        </m:ctrlPr>
+                      </m:dPr>
+                      <m:e>
+                        <m:sSub>
+                          <m:sSubPr>
+                            <m:ctrlPr>
+                              <a:rPr lang="en-US" altLang="zh-CN" b="0" i="1" smtClean="0">
+                                <a:latin typeface="Cambria Math"/>
+                              </a:rPr>
+                            </m:ctrlPr>
+                          </m:sSubPr>
+                          <m:e>
+                            <m:r>
+                              <a:rPr lang="en-US" altLang="zh-CN" b="0" i="1" smtClean="0">
+                                <a:latin typeface="Cambria Math"/>
+                              </a:rPr>
+                              <m:t>𝑡</m:t>
+                            </m:r>
+                          </m:e>
+                          <m:sub>
+                            <m:r>
+                              <a:rPr lang="en-US" altLang="zh-CN" b="0" i="1" smtClean="0">
+                                <a:latin typeface="Cambria Math"/>
+                              </a:rPr>
+                              <m:t>𝑖</m:t>
+                            </m:r>
+                          </m:sub>
+                        </m:sSub>
+                        <m:r>
+                          <a:rPr lang="en-US" altLang="zh-CN" b="0" i="1" smtClean="0">
+                            <a:latin typeface="Cambria Math"/>
+                          </a:rPr>
+                          <m:t>,</m:t>
+                        </m:r>
+                        <m:sSub>
+                          <m:sSubPr>
+                            <m:ctrlPr>
+                              <a:rPr lang="en-US" altLang="zh-CN" b="0" i="1" smtClean="0">
+                                <a:latin typeface="Cambria Math"/>
+                              </a:rPr>
+                            </m:ctrlPr>
+                          </m:sSubPr>
+                          <m:e>
+                            <m:r>
+                              <a:rPr lang="en-US" altLang="zh-CN" b="0" i="1" smtClean="0">
+                                <a:latin typeface="Cambria Math"/>
+                              </a:rPr>
+                              <m:t>𝑡</m:t>
+                            </m:r>
+                          </m:e>
+                          <m:sub>
+                            <m:r>
+                              <a:rPr lang="en-US" altLang="zh-CN" b="0" i="1" smtClean="0">
+                                <a:latin typeface="Cambria Math"/>
+                              </a:rPr>
+                              <m:t>𝑖</m:t>
+                            </m:r>
+                            <m:r>
+                              <a:rPr lang="en-US" altLang="zh-CN" b="0" i="1" smtClean="0">
+                                <a:latin typeface="Cambria Math"/>
+                              </a:rPr>
+                              <m:t>+1</m:t>
+                            </m:r>
+                          </m:sub>
+                        </m:sSub>
+                        <m:r>
+                          <a:rPr lang="en-US" altLang="zh-CN" b="0" i="1" smtClean="0">
+                            <a:latin typeface="Cambria Math"/>
+                          </a:rPr>
+                          <m:t>,…, </m:t>
+                        </m:r>
+                        <m:sSub>
+                          <m:sSubPr>
+                            <m:ctrlPr>
+                              <a:rPr lang="en-US" altLang="zh-CN" b="0" i="1" smtClean="0">
+                                <a:latin typeface="Cambria Math"/>
+                              </a:rPr>
+                            </m:ctrlPr>
+                          </m:sSubPr>
+                          <m:e>
+                            <m:r>
+                              <a:rPr lang="en-US" altLang="zh-CN" b="0" i="1" smtClean="0">
+                                <a:latin typeface="Cambria Math"/>
+                              </a:rPr>
+                              <m:t>𝑡</m:t>
+                            </m:r>
+                          </m:e>
+                          <m:sub>
+                            <m:r>
+                              <a:rPr lang="en-US" altLang="zh-CN" b="0" i="1" smtClean="0">
+                                <a:latin typeface="Cambria Math"/>
+                              </a:rPr>
+                              <m:t>𝑗</m:t>
+                            </m:r>
+                          </m:sub>
+                        </m:sSub>
+                      </m:e>
+                    </m:d>
+                  </m:oMath>
+                </a14:m>
+                <a:endParaRPr lang="en-US" altLang="zh-CN" b="0" dirty="0" smtClean="0"/>
+              </a:p>
+              <a:p>
+                <a:r>
+                  <a:rPr lang="en-US" altLang="zh-CN" dirty="0" smtClean="0"/>
+                  <a:t>Mining frequent patterns based on window model</a:t>
+                </a:r>
+              </a:p>
+              <a:p>
+                <a:pPr lvl="1"/>
+                <a:r>
+                  <a:rPr lang="en-US" altLang="zh-CN" dirty="0"/>
+                  <a:t>Landmark </a:t>
+                </a:r>
+                <a:r>
+                  <a:rPr lang="en-US" altLang="zh-CN" dirty="0" smtClean="0"/>
+                  <a:t>window: start point </a:t>
+                </a:r>
+                <a:r>
+                  <a:rPr lang="en-US" altLang="zh-CN" dirty="0" err="1" smtClean="0"/>
+                  <a:t>i</a:t>
+                </a:r>
+                <a:r>
+                  <a:rPr lang="en-US" altLang="zh-CN" dirty="0" smtClean="0"/>
+                  <a:t> to current point t, </a:t>
+                </a:r>
+                <a14:m>
+                  <m:oMath xmlns:m="http://schemas.openxmlformats.org/officeDocument/2006/math">
+                    <m:r>
+                      <a:rPr lang="en-US" altLang="zh-CN" b="0" i="1" smtClean="0">
+                        <a:latin typeface="Cambria Math"/>
+                      </a:rPr>
+                      <m:t>𝑊</m:t>
+                    </m:r>
+                    <m:r>
+                      <a:rPr lang="en-US" altLang="zh-CN" b="0" i="1" smtClean="0">
+                        <a:latin typeface="Cambria Math"/>
+                      </a:rPr>
+                      <m:t>[</m:t>
+                    </m:r>
+                    <m:r>
+                      <a:rPr lang="en-US" altLang="zh-CN" b="0" i="1" smtClean="0">
+                        <a:latin typeface="Cambria Math"/>
+                      </a:rPr>
+                      <m:t>𝑖</m:t>
+                    </m:r>
+                    <m:r>
+                      <a:rPr lang="en-US" altLang="zh-CN" b="0" i="1" smtClean="0">
+                        <a:latin typeface="Cambria Math"/>
+                      </a:rPr>
+                      <m:t>,</m:t>
+                    </m:r>
+                    <m:r>
+                      <a:rPr lang="en-US" altLang="zh-CN" b="0" i="1" smtClean="0">
+                        <a:latin typeface="Cambria Math"/>
+                      </a:rPr>
+                      <m:t>𝑡</m:t>
+                    </m:r>
+                    <m:r>
+                      <a:rPr lang="en-US" altLang="zh-CN" b="0" i="1" smtClean="0">
+                        <a:latin typeface="Cambria Math"/>
+                      </a:rPr>
+                      <m:t>]</m:t>
+                    </m:r>
+                  </m:oMath>
+                </a14:m>
+                <a:endParaRPr lang="en-US" altLang="zh-CN" dirty="0" smtClean="0"/>
+              </a:p>
+              <a:p>
+                <a:pPr lvl="1"/>
+                <a:r>
+                  <a:rPr lang="en-US" altLang="zh-CN" dirty="0"/>
+                  <a:t>Sliding </a:t>
+                </a:r>
+                <a:r>
+                  <a:rPr lang="en-US" altLang="zh-CN" dirty="0" smtClean="0"/>
+                  <a:t>window: fixed window size w, </a:t>
+                </a:r>
+                <a14:m>
+                  <m:oMath xmlns:m="http://schemas.openxmlformats.org/officeDocument/2006/math">
+                    <m:r>
+                      <a:rPr lang="en-US" altLang="zh-CN" b="0" i="1" smtClean="0">
+                        <a:latin typeface="Cambria Math"/>
+                      </a:rPr>
+                      <m:t>𝑊</m:t>
+                    </m:r>
+                    <m:r>
+                      <a:rPr lang="en-US" altLang="zh-CN" b="0" i="1" smtClean="0">
+                        <a:latin typeface="Cambria Math"/>
+                      </a:rPr>
+                      <m:t>[</m:t>
+                    </m:r>
+                    <m:r>
+                      <a:rPr lang="en-US" altLang="zh-CN" b="0" i="1" smtClean="0">
+                        <a:latin typeface="Cambria Math"/>
+                      </a:rPr>
+                      <m:t>𝑡</m:t>
+                    </m:r>
+                    <m:r>
+                      <a:rPr lang="en-US" altLang="zh-CN" b="0" i="1" smtClean="0">
+                        <a:latin typeface="Cambria Math"/>
+                      </a:rPr>
+                      <m:t>−</m:t>
+                    </m:r>
+                    <m:r>
+                      <a:rPr lang="en-US" altLang="zh-CN" b="0" i="1" smtClean="0">
+                        <a:latin typeface="Cambria Math"/>
+                      </a:rPr>
+                      <m:t>𝑤</m:t>
+                    </m:r>
+                    <m:r>
+                      <a:rPr lang="en-US" altLang="zh-CN" b="0" i="1" smtClean="0">
+                        <a:latin typeface="Cambria Math"/>
+                      </a:rPr>
+                      <m:t>+1, </m:t>
+                    </m:r>
+                    <m:r>
+                      <a:rPr lang="en-US" altLang="zh-CN" b="0" i="1" smtClean="0">
+                        <a:latin typeface="Cambria Math"/>
+                      </a:rPr>
+                      <m:t>𝑡</m:t>
+                    </m:r>
+                    <m:r>
+                      <a:rPr lang="en-US" altLang="zh-CN" b="0" i="1" smtClean="0">
+                        <a:latin typeface="Cambria Math"/>
+                      </a:rPr>
+                      <m:t>]</m:t>
+                    </m:r>
+                  </m:oMath>
+                </a14:m>
+                <a:endParaRPr lang="en-US" altLang="zh-CN" dirty="0" smtClean="0"/>
+              </a:p>
+              <a:p>
+                <a:pPr lvl="1"/>
+                <a:r>
+                  <a:rPr lang="en-US" altLang="zh-CN" dirty="0"/>
+                  <a:t>Damped window model: assigns more weights to the </a:t>
+                </a:r>
+                <a:r>
+                  <a:rPr lang="en-US" altLang="zh-CN" dirty="0" smtClean="0"/>
+                  <a:t>recently arrived </a:t>
+                </a:r>
+                <a:r>
+                  <a:rPr lang="en-US" altLang="zh-CN" dirty="0"/>
+                  <a:t>transactions</a:t>
+                </a:r>
+                <a:endParaRPr lang="zh-CN" altLang="en-US" dirty="0"/>
+              </a:p>
+            </p:txBody>
+          </p:sp>
+        </mc:Choice>
+        <mc:Fallback>
+          <p:sp>
+            <p:nvSpPr>
+              <p:cNvPr id="3" name="内容占位符 2"/>
+              <p:cNvSpPr>
+                <a:spLocks noGrp="1" noRot="1" noChangeAspect="1" noMove="1" noResize="1" noEditPoints="1" noAdjustHandles="1" noChangeArrowheads="1" noChangeShapeType="1" noTextEdit="1"/>
+              </p:cNvSpPr>
+              <p:nvPr>
+                <p:ph idx="1"/>
+              </p:nvPr>
+            </p:nvSpPr>
+            <p:spPr>
+              <a:xfrm>
+                <a:off x="2589212" y="1749778"/>
+                <a:ext cx="8915400" cy="4161444"/>
+              </a:xfrm>
+              <a:blipFill rotWithShape="1">
+                <a:blip r:embed="rId2"/>
+                <a:stretch>
+                  <a:fillRect l="-616" t="-146"/>
+                </a:stretch>
+              </a:blipFill>
+            </p:spPr>
+            <p:txBody>
+              <a:bodyPr/>
+              <a:lstStyle/>
+              <a:p>
+                <a:r>
+                  <a:rPr lang="zh-CN" altLang="en-US">
+                    <a:noFill/>
+                  </a:rPr>
+                  <a:t> </a:t>
+                </a:r>
+              </a:p>
+            </p:txBody>
+          </p:sp>
+        </mc:Fallback>
+      </mc:AlternateContent>
+    </p:spTree>
+    <p:extLst>
+      <p:ext uri="{BB962C8B-B14F-4D97-AF65-F5344CB8AC3E}">
+        <p14:creationId xmlns:p14="http://schemas.microsoft.com/office/powerpoint/2010/main" val="3836732285"/>
+      </p:ext>
+    </p:extLst>
+  </p:cSld>
+  <p:clrMapOvr>
+    <a:masterClrMapping/>
+  </p:clrMapOvr>
 </p:sld>
 </file>
 
@@ -35219,7 +36210,7 @@
   <a:extraClrSchemeLst/>
   <a:extLst>
     <a:ext uri="{05A4C25C-085E-4340-85A3-A5531E510DB2}">
-      <thm15:themeFamily xmlns="" xmlns:thm15="http://schemas.microsoft.com/office/thememl/2012/main" name="Wisp" id="{7CB32D59-10C0-40DD-B7BD-2E94284A981C}" vid="{24B1A44C-C006-48B2-A4D7-E5549B3D8CD4}"/>
+      <thm15:themeFamily xmlns:thm15="http://schemas.microsoft.com/office/thememl/2012/main" xmlns="" name="Wisp" id="{7CB32D59-10C0-40DD-B7BD-2E94284A981C}" vid="{24B1A44C-C006-48B2-A4D7-E5549B3D8CD4}"/>
     </a:ext>
   </a:extLst>
 </a:theme>

</xml_diff>

<commit_message>
add motif and modify theme
</commit_message>
<xml_diff>
--- a/slide/tsdm.pptx
+++ b/slide/tsdm.pptx
@@ -52,7 +52,7 @@
     <p:sldId id="317" r:id="rId43"/>
     <p:sldId id="318" r:id="rId44"/>
     <p:sldId id="264" r:id="rId45"/>
-    <p:sldId id="267" r:id="rId46"/>
+    <p:sldId id="327" r:id="rId46"/>
     <p:sldId id="266" r:id="rId47"/>
     <p:sldId id="268" r:id="rId48"/>
     <p:sldId id="269" r:id="rId49"/>
@@ -246,7 +246,7 @@
           <a:p>
             <a:fld id="{EAC0FA0A-CAD4-4EB0-8284-87AAE1D94058}" type="datetimeFigureOut">
               <a:rPr lang="zh-CN" altLang="en-US" smtClean="0"/>
-              <a:t>2013/3/8</a:t>
+              <a:t>2013/3/9</a:t>
             </a:fld>
             <a:endParaRPr lang="zh-CN" altLang="en-US"/>
           </a:p>
@@ -657,7 +657,7 @@
           <a:p>
             <a:fld id="{F77B2EB1-EA88-4503-95EA-93923E5BA59E}" type="datetimeFigureOut">
               <a:rPr lang="en-US" smtClean="0"/>
-              <a:t>3/8/2013</a:t>
+              <a:t>3/9/2013</a:t>
             </a:fld>
             <a:endParaRPr lang="en-US"/>
           </a:p>
@@ -1016,7 +1016,7 @@
           <a:p>
             <a:fld id="{F77B2EB1-EA88-4503-95EA-93923E5BA59E}" type="datetimeFigureOut">
               <a:rPr lang="en-US" smtClean="0"/>
-              <a:t>3/8/2013</a:t>
+              <a:t>3/9/2013</a:t>
             </a:fld>
             <a:endParaRPr lang="en-US"/>
           </a:p>
@@ -1191,7 +1191,7 @@
           <a:p>
             <a:fld id="{F77B2EB1-EA88-4503-95EA-93923E5BA59E}" type="datetimeFigureOut">
               <a:rPr lang="en-US" smtClean="0"/>
-              <a:t>3/8/2013</a:t>
+              <a:t>3/9/2013</a:t>
             </a:fld>
             <a:endParaRPr lang="en-US"/>
           </a:p>
@@ -1426,7 +1426,7 @@
           <a:p>
             <a:fld id="{F77B2EB1-EA88-4503-95EA-93923E5BA59E}" type="datetimeFigureOut">
               <a:rPr lang="en-US" smtClean="0"/>
-              <a:t>3/8/2013</a:t>
+              <a:t>3/9/2013</a:t>
             </a:fld>
             <a:endParaRPr lang="en-US"/>
           </a:p>
@@ -1695,7 +1695,7 @@
           <a:p>
             <a:fld id="{F77B2EB1-EA88-4503-95EA-93923E5BA59E}" type="datetimeFigureOut">
               <a:rPr lang="en-US" smtClean="0"/>
-              <a:t>3/8/2013</a:t>
+              <a:t>3/9/2013</a:t>
             </a:fld>
             <a:endParaRPr lang="en-US"/>
           </a:p>
@@ -1915,7 +1915,7 @@
           <a:p>
             <a:fld id="{F77B2EB1-EA88-4503-95EA-93923E5BA59E}" type="datetimeFigureOut">
               <a:rPr lang="en-US" smtClean="0"/>
-              <a:t>3/8/2013</a:t>
+              <a:t>3/9/2013</a:t>
             </a:fld>
             <a:endParaRPr lang="en-US"/>
           </a:p>
@@ -2267,7 +2267,7 @@
           <a:p>
             <a:fld id="{F77B2EB1-EA88-4503-95EA-93923E5BA59E}" type="datetimeFigureOut">
               <a:rPr lang="en-US" smtClean="0"/>
-              <a:t>3/8/2013</a:t>
+              <a:t>3/9/2013</a:t>
             </a:fld>
             <a:endParaRPr lang="en-US"/>
           </a:p>
@@ -2499,7 +2499,7 @@
           <a:p>
             <a:fld id="{F77B2EB1-EA88-4503-95EA-93923E5BA59E}" type="datetimeFigureOut">
               <a:rPr lang="en-US" smtClean="0"/>
-              <a:t>3/8/2013</a:t>
+              <a:t>3/9/2013</a:t>
             </a:fld>
             <a:endParaRPr lang="en-US"/>
           </a:p>
@@ -2639,7 +2639,7 @@
           <a:p>
             <a:fld id="{F77B2EB1-EA88-4503-95EA-93923E5BA59E}" type="datetimeFigureOut">
               <a:rPr lang="en-US" smtClean="0"/>
-              <a:t>3/8/2013</a:t>
+              <a:t>3/9/2013</a:t>
             </a:fld>
             <a:endParaRPr lang="en-US"/>
           </a:p>
@@ -2916,7 +2916,7 @@
           <a:p>
             <a:fld id="{F77B2EB1-EA88-4503-95EA-93923E5BA59E}" type="datetimeFigureOut">
               <a:rPr lang="en-US" smtClean="0"/>
-              <a:t>3/8/2013</a:t>
+              <a:t>3/9/2013</a:t>
             </a:fld>
             <a:endParaRPr lang="en-US"/>
           </a:p>
@@ -3323,7 +3323,7 @@
           <a:p>
             <a:fld id="{F77B2EB1-EA88-4503-95EA-93923E5BA59E}" type="datetimeFigureOut">
               <a:rPr lang="en-US" smtClean="0"/>
-              <a:t>3/8/2013</a:t>
+              <a:t>3/9/2013</a:t>
             </a:fld>
             <a:endParaRPr lang="en-US"/>
           </a:p>
@@ -3661,7 +3661,7 @@
           <a:p>
             <a:fld id="{F77B2EB1-EA88-4503-95EA-93923E5BA59E}" type="datetimeFigureOut">
               <a:rPr lang="en-US" smtClean="0"/>
-              <a:t>3/8/2013</a:t>
+              <a:t>3/9/2013</a:t>
             </a:fld>
             <a:endParaRPr lang="en-US"/>
           </a:p>
@@ -10368,11 +10368,7 @@
             <a:pPr algn="ctr"/>
             <a:r>
               <a:rPr lang="en-US" altLang="zh-CN" dirty="0" smtClean="0"/>
-              <a:t>Time Delay </a:t>
-            </a:r>
-            <a:r>
-              <a:rPr lang="en-US" altLang="zh-CN" dirty="0" smtClean="0"/>
-              <a:t>Embedding[3]</a:t>
+              <a:t>Time Delay Embedding[3]</a:t>
             </a:r>
             <a:endParaRPr lang="en-US" dirty="0"/>
           </a:p>
@@ -11549,18 +11545,14 @@
             <a:pPr algn="ctr"/>
             <a:r>
               <a:rPr lang="en-US" altLang="zh-CN" dirty="0" smtClean="0"/>
-              <a:t>Object </a:t>
-            </a:r>
-            <a:r>
-              <a:rPr lang="en-US" altLang="zh-CN" dirty="0" smtClean="0"/>
-              <a:t>Function &amp; Optimization</a:t>
+              <a:t>Object Function &amp; Optimization</a:t>
             </a:r>
             <a:endParaRPr lang="en-US" dirty="0"/>
           </a:p>
         </p:txBody>
       </p:sp>
-      <mc:AlternateContent xmlns:mc="http://schemas.openxmlformats.org/markup-compatibility/2006">
-        <mc:Choice xmlns:a14="http://schemas.microsoft.com/office/drawing/2010/main" Requires="a14">
+      <mc:AlternateContent xmlns:mc="http://schemas.openxmlformats.org/markup-compatibility/2006" xmlns:a14="http://schemas.microsoft.com/office/drawing/2010/main">
+        <mc:Choice Requires="a14">
           <p:sp>
             <p:nvSpPr>
               <p:cNvPr id="3" name="Content Placeholder 2"/>
@@ -12630,7 +12622,7 @@
             </p:txBody>
           </p:sp>
         </mc:Choice>
-        <mc:Fallback>
+        <mc:Fallback xmlns="">
           <p:sp>
             <p:nvSpPr>
               <p:cNvPr id="3" name="Content Placeholder 2"/>
@@ -21570,7 +21562,7 @@
           <a:graphicData uri="http://schemas.openxmlformats.org/presentationml/2006/ole">
             <mc:AlternateContent xmlns:mc="http://schemas.openxmlformats.org/markup-compatibility/2006">
               <mc:Choice xmlns:v="urn:schemas-microsoft-com:vml" Requires="v">
-                <p:oleObj spid="_x0000_s2054" name="點陣圖影像" r:id="rId3" imgW="4638095" imgH="2534004" progId="PBrush">
+                <p:oleObj spid="_x0000_s2058" name="點陣圖影像" r:id="rId3" imgW="4638095" imgH="2534004" progId="PBrush">
                   <p:embed/>
                 </p:oleObj>
               </mc:Choice>
@@ -21641,7 +21633,7 @@
           <a:graphicData uri="http://schemas.openxmlformats.org/presentationml/2006/ole">
             <mc:AlternateContent xmlns:mc="http://schemas.openxmlformats.org/markup-compatibility/2006">
               <mc:Choice xmlns:v="urn:schemas-microsoft-com:vml" Requires="v">
-                <p:oleObj spid="_x0000_s2055" name="BMP 图像" r:id="rId5" imgW="4381560" imgH="1305000" progId="Paint.Picture">
+                <p:oleObj spid="_x0000_s2059" name="BMP 图像" r:id="rId5" imgW="4381560" imgH="1305000" progId="Paint.Picture">
                   <p:embed/>
                 </p:oleObj>
               </mc:Choice>
@@ -22294,7 +22286,7 @@
         <p:spPr>
           <a:xfrm>
             <a:off x="2584133" y="228456"/>
-            <a:ext cx="8911687" cy="1280890"/>
+            <a:ext cx="8911687" cy="704994"/>
           </a:xfrm>
         </p:spPr>
         <p:txBody>
@@ -22529,8 +22521,8 @@
           </a:p>
         </p:txBody>
       </p:sp>
-      <mc:AlternateContent xmlns:mc="http://schemas.openxmlformats.org/markup-compatibility/2006" xmlns:a14="http://schemas.microsoft.com/office/drawing/2010/main">
-        <mc:Choice Requires="a14">
+      <mc:AlternateContent xmlns:mc="http://schemas.openxmlformats.org/markup-compatibility/2006">
+        <mc:Choice xmlns:a14="http://schemas.microsoft.com/office/drawing/2010/main" Requires="a14">
           <p:sp>
             <p:nvSpPr>
               <p:cNvPr id="3" name="内容占位符 2"/>
@@ -22543,7 +22535,7 @@
             </p:nvSpPr>
             <p:spPr>
               <a:xfrm>
-                <a:off x="2589212" y="2133600"/>
+                <a:off x="1223257" y="1603023"/>
                 <a:ext cx="8915400" cy="4152900"/>
               </a:xfrm>
             </p:spPr>
@@ -24235,7 +24227,7 @@
             </p:txBody>
           </p:sp>
         </mc:Choice>
-        <mc:Fallback xmlns="">
+        <mc:Fallback>
           <p:sp>
             <p:nvSpPr>
               <p:cNvPr id="3" name="内容占位符 2"/>
@@ -24248,13 +24240,13 @@
             </p:nvSpPr>
             <p:spPr>
               <a:xfrm>
-                <a:off x="2589212" y="2133600"/>
+                <a:off x="1223257" y="1603023"/>
                 <a:ext cx="8915400" cy="4152900"/>
               </a:xfrm>
               <a:blipFill rotWithShape="1">
                 <a:blip r:embed="rId2"/>
                 <a:stretch>
-                  <a:fillRect l="-479" t="-734"/>
+                  <a:fillRect l="-479" t="-2937" b="-1028"/>
                 </a:stretch>
               </a:blipFill>
             </p:spPr>
@@ -24380,7 +24372,7 @@
         </p:blipFill>
         <p:spPr bwMode="auto">
           <a:xfrm>
-            <a:off x="4058017" y="2677623"/>
+            <a:off x="2567884" y="2113177"/>
             <a:ext cx="5324475" cy="3876675"/>
           </a:xfrm>
           <a:prstGeom prst="rect">
@@ -24522,7 +24514,7 @@
         </p:blipFill>
         <p:spPr bwMode="auto">
           <a:xfrm>
-            <a:off x="2896699" y="2544641"/>
+            <a:off x="2546743" y="2047930"/>
             <a:ext cx="4429125" cy="3562350"/>
           </a:xfrm>
           <a:prstGeom prst="rect">
@@ -24576,7 +24568,7 @@
         </p:blipFill>
         <p:spPr bwMode="auto">
           <a:xfrm>
-            <a:off x="7563583" y="3183185"/>
+            <a:off x="7213627" y="2686474"/>
             <a:ext cx="1162050" cy="2847975"/>
           </a:xfrm>
           <a:prstGeom prst="rect">
@@ -24630,7 +24622,7 @@
         </p:blipFill>
         <p:spPr bwMode="auto">
           <a:xfrm>
-            <a:off x="7470897" y="2661138"/>
+            <a:off x="7120941" y="2164427"/>
             <a:ext cx="1171575" cy="304800"/>
           </a:xfrm>
           <a:prstGeom prst="rect">
@@ -24768,7 +24760,7 @@
         </p:blipFill>
         <p:spPr bwMode="auto">
           <a:xfrm>
-            <a:off x="2096600" y="2580910"/>
+            <a:off x="1520867" y="2580910"/>
             <a:ext cx="4828107" cy="2764813"/>
           </a:xfrm>
           <a:prstGeom prst="rect">
@@ -24822,7 +24814,7 @@
         </p:blipFill>
         <p:spPr bwMode="auto">
           <a:xfrm>
-            <a:off x="7386637" y="2580910"/>
+            <a:off x="6810904" y="2580910"/>
             <a:ext cx="3848661" cy="2888639"/>
           </a:xfrm>
           <a:prstGeom prst="rect">
@@ -24908,11 +24900,7 @@
             <a:pPr algn="ctr"/>
             <a:r>
               <a:rPr lang="en-US" altLang="zh-CN" dirty="0" smtClean="0"/>
-              <a:t>Motif </a:t>
-            </a:r>
-            <a:r>
-              <a:rPr lang="en-US" altLang="zh-CN" dirty="0" smtClean="0"/>
-              <a:t>Discovery[5]</a:t>
+              <a:t>Motif Discovery[5]</a:t>
             </a:r>
             <a:endParaRPr lang="zh-CN" altLang="en-US" dirty="0"/>
           </a:p>
@@ -26766,8 +26754,8 @@
         </p:nvSpPr>
         <p:spPr>
           <a:xfrm>
-            <a:off x="2589212" y="1443487"/>
-            <a:ext cx="8915400" cy="5147094"/>
+            <a:off x="632178" y="1443487"/>
+            <a:ext cx="10872434" cy="5147094"/>
           </a:xfrm>
         </p:spPr>
         <p:txBody>
@@ -27024,8 +27012,8 @@
         </p:nvSpPr>
         <p:spPr>
           <a:xfrm>
-            <a:off x="2589212" y="1443487"/>
-            <a:ext cx="8915400" cy="5147094"/>
+            <a:off x="632178" y="1443487"/>
+            <a:ext cx="10872434" cy="5147094"/>
           </a:xfrm>
         </p:spPr>
         <p:txBody>
@@ -27044,7 +27032,7 @@
             </a:r>
             <a:r>
               <a:rPr lang="en-US" dirty="0" smtClean="0"/>
-              <a:t>)</a:t>
+              <a:t>).</a:t>
             </a:r>
           </a:p>
           <a:p>
@@ -27236,7 +27224,7 @@
     </p:spTree>
     <p:extLst>
       <p:ext uri="{BB962C8B-B14F-4D97-AF65-F5344CB8AC3E}">
-        <p14:creationId xmlns:p14="http://schemas.microsoft.com/office/powerpoint/2010/main" val="3942738112"/>
+        <p14:creationId xmlns:p14="http://schemas.microsoft.com/office/powerpoint/2010/main" val="1520328431"/>
       </p:ext>
     </p:extLst>
   </p:cSld>
@@ -27412,11 +27400,7 @@
             <a:pPr algn="ctr"/>
             <a:r>
               <a:rPr lang="en-US" altLang="zh-CN" dirty="0" smtClean="0"/>
-              <a:t>Feature Based </a:t>
-            </a:r>
-            <a:r>
-              <a:rPr lang="en-US" altLang="zh-CN" dirty="0" smtClean="0"/>
-              <a:t>Classification[7]</a:t>
+              <a:t>Feature Based Classification[7]</a:t>
             </a:r>
             <a:endParaRPr lang="en-US" dirty="0"/>
           </a:p>
@@ -28385,11 +28369,7 @@
             <a:pPr algn="ctr"/>
             <a:r>
               <a:rPr lang="en-US" altLang="zh-CN" dirty="0" smtClean="0"/>
-              <a:t>Segmentation Basic </a:t>
-            </a:r>
-            <a:r>
-              <a:rPr lang="en-US" altLang="zh-CN" dirty="0" smtClean="0"/>
-              <a:t>Approaches[1]</a:t>
+              <a:t>Segmentation Basic Approaches[1]</a:t>
             </a:r>
             <a:endParaRPr lang="en-US" dirty="0"/>
           </a:p>
@@ -29031,11 +29011,7 @@
             </a:r>
             <a:r>
               <a:rPr lang="en-US" dirty="0" smtClean="0"/>
-              <a:t>   </a:t>
-            </a:r>
-            <a:r>
-              <a:rPr lang="en-US" dirty="0" smtClean="0"/>
-              <a:t>anchor </a:t>
+              <a:t>   anchor </a:t>
             </a:r>
             <a:r>
               <a:rPr lang="en-US" dirty="0"/>

</xml_diff>